<commit_message>
changes to quals doc
</commit_message>
<xml_diff>
--- a/slides/11.26.12 Quals (v1b).pptx
+++ b/slides/11.26.12 Quals (v1b).pptx
@@ -5,7 +5,7 @@
     <p:sldMasterId id="2147483648" r:id="rId1"/>
   </p:sldMasterIdLst>
   <p:notesMasterIdLst>
-    <p:notesMasterId r:id="rId53"/>
+    <p:notesMasterId r:id="rId54"/>
   </p:notesMasterIdLst>
   <p:sldIdLst>
     <p:sldId id="256" r:id="rId2"/>
@@ -46,19 +46,20 @@
     <p:sldId id="300" r:id="rId37"/>
     <p:sldId id="298" r:id="rId38"/>
     <p:sldId id="299" r:id="rId39"/>
-    <p:sldId id="291" r:id="rId40"/>
-    <p:sldId id="297" r:id="rId41"/>
-    <p:sldId id="312" r:id="rId42"/>
-    <p:sldId id="295" r:id="rId43"/>
-    <p:sldId id="293" r:id="rId44"/>
-    <p:sldId id="315" r:id="rId45"/>
-    <p:sldId id="314" r:id="rId46"/>
-    <p:sldId id="302" r:id="rId47"/>
-    <p:sldId id="303" r:id="rId48"/>
-    <p:sldId id="316" r:id="rId49"/>
-    <p:sldId id="310" r:id="rId50"/>
-    <p:sldId id="311" r:id="rId51"/>
-    <p:sldId id="313" r:id="rId52"/>
+    <p:sldId id="319" r:id="rId40"/>
+    <p:sldId id="291" r:id="rId41"/>
+    <p:sldId id="297" r:id="rId42"/>
+    <p:sldId id="312" r:id="rId43"/>
+    <p:sldId id="295" r:id="rId44"/>
+    <p:sldId id="293" r:id="rId45"/>
+    <p:sldId id="315" r:id="rId46"/>
+    <p:sldId id="314" r:id="rId47"/>
+    <p:sldId id="302" r:id="rId48"/>
+    <p:sldId id="303" r:id="rId49"/>
+    <p:sldId id="316" r:id="rId50"/>
+    <p:sldId id="310" r:id="rId51"/>
+    <p:sldId id="311" r:id="rId52"/>
+    <p:sldId id="313" r:id="rId53"/>
   </p:sldIdLst>
   <p:sldSz cx="9144000" cy="6858000" type="screen4x3"/>
   <p:notesSz cx="6858000" cy="9144000"/>
@@ -302,11 +303,11 @@
           </c:yVal>
           <c:smooth val="1"/>
         </c:ser>
-        <c:axId val="516917176"/>
-        <c:axId val="624909480"/>
+        <c:axId val="555262200"/>
+        <c:axId val="547218888"/>
       </c:scatterChart>
       <c:valAx>
-        <c:axId val="516917176"/>
+        <c:axId val="555262200"/>
         <c:scaling>
           <c:orientation val="minMax"/>
         </c:scaling>
@@ -331,12 +332,12 @@
         </c:title>
         <c:numFmt formatCode="General" sourceLinked="1"/>
         <c:tickLblPos val="nextTo"/>
-        <c:crossAx val="624909480"/>
+        <c:crossAx val="547218888"/>
         <c:crosses val="autoZero"/>
         <c:crossBetween val="midCat"/>
       </c:valAx>
       <c:valAx>
-        <c:axId val="624909480"/>
+        <c:axId val="547218888"/>
         <c:scaling>
           <c:orientation val="minMax"/>
         </c:scaling>
@@ -362,7 +363,7 @@
         </c:title>
         <c:numFmt formatCode="General" sourceLinked="1"/>
         <c:tickLblPos val="nextTo"/>
-        <c:crossAx val="516917176"/>
+        <c:crossAx val="555262200"/>
         <c:crosses val="autoZero"/>
         <c:crossBetween val="midCat"/>
       </c:valAx>
@@ -510,8 +511,8 @@
           </c:yVal>
           <c:smooth val="1"/>
         </c:ser>
-        <c:axId val="619130728"/>
-        <c:axId val="612382440"/>
+        <c:axId val="554884056"/>
+        <c:axId val="547147896"/>
       </c:scatterChart>
       <c:scatterChart>
         <c:scatterStyle val="smoothMarker"/>
@@ -646,11 +647,11 @@
           </c:yVal>
           <c:smooth val="1"/>
         </c:ser>
-        <c:axId val="571202200"/>
-        <c:axId val="619393720"/>
+        <c:axId val="554954248"/>
+        <c:axId val="554948072"/>
       </c:scatterChart>
       <c:valAx>
-        <c:axId val="619130728"/>
+        <c:axId val="554884056"/>
         <c:scaling>
           <c:orientation val="minMax"/>
         </c:scaling>
@@ -675,12 +676,12 @@
         </c:title>
         <c:numFmt formatCode="General" sourceLinked="1"/>
         <c:tickLblPos val="nextTo"/>
-        <c:crossAx val="612382440"/>
+        <c:crossAx val="547147896"/>
         <c:crosses val="autoZero"/>
         <c:crossBetween val="midCat"/>
       </c:valAx>
       <c:valAx>
-        <c:axId val="612382440"/>
+        <c:axId val="547147896"/>
         <c:scaling>
           <c:orientation val="minMax"/>
         </c:scaling>
@@ -706,12 +707,12 @@
         </c:title>
         <c:numFmt formatCode="0.00%" sourceLinked="1"/>
         <c:tickLblPos val="nextTo"/>
-        <c:crossAx val="619130728"/>
+        <c:crossAx val="554884056"/>
         <c:crosses val="autoZero"/>
         <c:crossBetween val="midCat"/>
       </c:valAx>
       <c:valAx>
-        <c:axId val="619393720"/>
+        <c:axId val="554948072"/>
         <c:scaling>
           <c:orientation val="minMax"/>
         </c:scaling>
@@ -736,12 +737,12 @@
         </c:title>
         <c:numFmt formatCode="0.00%" sourceLinked="1"/>
         <c:tickLblPos val="nextTo"/>
-        <c:crossAx val="571202200"/>
+        <c:crossAx val="554954248"/>
         <c:crosses val="max"/>
         <c:crossBetween val="midCat"/>
       </c:valAx>
       <c:valAx>
-        <c:axId val="571202200"/>
+        <c:axId val="554954248"/>
         <c:scaling>
           <c:orientation val="minMax"/>
         </c:scaling>
@@ -749,7 +750,7 @@
         <c:axPos val="b"/>
         <c:numFmt formatCode="General" sourceLinked="1"/>
         <c:tickLblPos val="nextTo"/>
-        <c:crossAx val="619393720"/>
+        <c:crossAx val="554948072"/>
         <c:crosses val="autoZero"/>
         <c:crossBetween val="midCat"/>
       </c:valAx>
@@ -939,6 +940,604 @@
 </c:chartSpace>
 </file>
 
+<file path=ppt/charts/chart5.xml><?xml version="1.0" encoding="utf-8"?>
+<c:chartSpace xmlns:c="http://schemas.openxmlformats.org/drawingml/2006/chart" xmlns:a="http://schemas.openxmlformats.org/drawingml/2006/main" xmlns:r="http://schemas.openxmlformats.org/officeDocument/2006/relationships">
+  <c:date1904 val="1"/>
+  <c:lang val="en-US"/>
+  <c:style val="2"/>
+  <c:chart>
+    <c:title>
+      <c:tx>
+        <c:rich>
+          <a:bodyPr/>
+          <a:lstStyle/>
+          <a:p>
+            <a:pPr>
+              <a:defRPr/>
+            </a:pPr>
+            <a:r>
+              <a:rPr lang="en-US" dirty="0" smtClean="0"/>
+              <a:t>% Error </a:t>
+            </a:r>
+            <a:r>
+              <a:rPr lang="en-US" dirty="0"/>
+              <a:t>vs. Time</a:t>
+            </a:r>
+          </a:p>
+        </c:rich>
+      </c:tx>
+      <c:layout>
+        <c:manualLayout>
+          <c:xMode val="edge"/>
+          <c:yMode val="edge"/>
+          <c:x val="0.314174045657598"/>
+          <c:y val="0.0"/>
+        </c:manualLayout>
+      </c:layout>
+    </c:title>
+    <c:plotArea>
+      <c:layout/>
+      <c:scatterChart>
+        <c:scatterStyle val="smoothMarker"/>
+        <c:ser>
+          <c:idx val="0"/>
+          <c:order val="0"/>
+          <c:tx>
+            <c:v>SNAP</c:v>
+          </c:tx>
+          <c:xVal>
+            <c:numRef>
+              <c:f>Sheet1!$L$4:$L$19</c:f>
+              <c:numCache>
+                <c:formatCode>General</c:formatCode>
+                <c:ptCount val="16"/>
+                <c:pt idx="0">
+                  <c:v>11.6679306924917</c:v>
+                </c:pt>
+                <c:pt idx="1">
+                  <c:v>15.33389557617113</c:v>
+                </c:pt>
+                <c:pt idx="2">
+                  <c:v>18.46892603195122</c:v>
+                </c:pt>
+                <c:pt idx="3">
+                  <c:v>21.36067499732992</c:v>
+                </c:pt>
+                <c:pt idx="4">
+                  <c:v>24.25594877143619</c:v>
+                </c:pt>
+                <c:pt idx="5">
+                  <c:v>26.88750268875027</c:v>
+                </c:pt>
+                <c:pt idx="6">
+                  <c:v>29.79560216911984</c:v>
+                </c:pt>
+                <c:pt idx="7">
+                  <c:v>32.72893892779997</c:v>
+                </c:pt>
+                <c:pt idx="8">
+                  <c:v>36.12977816316208</c:v>
+                </c:pt>
+                <c:pt idx="9">
+                  <c:v>48.0215136381099</c:v>
+                </c:pt>
+                <c:pt idx="10">
+                  <c:v>57.04831992697817</c:v>
+                </c:pt>
+                <c:pt idx="11">
+                  <c:v>59.93407252022775</c:v>
+                </c:pt>
+                <c:pt idx="12">
+                  <c:v>69.12283127116881</c:v>
+                </c:pt>
+                <c:pt idx="13">
+                  <c:v>81.47967082212983</c:v>
+                </c:pt>
+                <c:pt idx="14">
+                  <c:v>77.724234416291</c:v>
+                </c:pt>
+                <c:pt idx="15">
+                  <c:v>84.07600470825625</c:v>
+                </c:pt>
+              </c:numCache>
+            </c:numRef>
+          </c:xVal>
+          <c:yVal>
+            <c:numRef>
+              <c:f>Sheet1!$J$4:$J$19</c:f>
+              <c:numCache>
+                <c:formatCode>0.00%</c:formatCode>
+                <c:ptCount val="16"/>
+                <c:pt idx="0">
+                  <c:v>0.00135</c:v>
+                </c:pt>
+                <c:pt idx="1">
+                  <c:v>0.0008</c:v>
+                </c:pt>
+                <c:pt idx="2">
+                  <c:v>0.00058</c:v>
+                </c:pt>
+                <c:pt idx="3">
+                  <c:v>0.00048</c:v>
+                </c:pt>
+                <c:pt idx="4">
+                  <c:v>0.0004</c:v>
+                </c:pt>
+                <c:pt idx="5">
+                  <c:v>0.00035</c:v>
+                </c:pt>
+                <c:pt idx="6">
+                  <c:v>0.00032</c:v>
+                </c:pt>
+                <c:pt idx="7">
+                  <c:v>0.00029</c:v>
+                </c:pt>
+                <c:pt idx="8">
+                  <c:v>0.00025</c:v>
+                </c:pt>
+                <c:pt idx="9">
+                  <c:v>0.00019</c:v>
+                </c:pt>
+                <c:pt idx="10">
+                  <c:v>0.00015</c:v>
+                </c:pt>
+                <c:pt idx="11">
+                  <c:v>0.00013</c:v>
+                </c:pt>
+                <c:pt idx="12">
+                  <c:v>0.00011</c:v>
+                </c:pt>
+                <c:pt idx="13">
+                  <c:v>0.0001</c:v>
+                </c:pt>
+                <c:pt idx="14">
+                  <c:v>8.0E-5</c:v>
+                </c:pt>
+                <c:pt idx="15">
+                  <c:v>6.0E-5</c:v>
+                </c:pt>
+              </c:numCache>
+            </c:numRef>
+          </c:yVal>
+          <c:smooth val="1"/>
+        </c:ser>
+        <c:ser>
+          <c:idx val="1"/>
+          <c:order val="1"/>
+          <c:tx>
+            <c:v>BWA</c:v>
+          </c:tx>
+          <c:xVal>
+            <c:numRef>
+              <c:f>Sheet1!$Q$4</c:f>
+              <c:numCache>
+                <c:formatCode>General</c:formatCode>
+                <c:ptCount val="1"/>
+                <c:pt idx="0">
+                  <c:v>925.9259259259258</c:v>
+                </c:pt>
+              </c:numCache>
+            </c:numRef>
+          </c:xVal>
+          <c:yVal>
+            <c:numRef>
+              <c:f>Sheet1!$O$4</c:f>
+              <c:numCache>
+                <c:formatCode>0.00%</c:formatCode>
+                <c:ptCount val="1"/>
+                <c:pt idx="0">
+                  <c:v>0.0004</c:v>
+                </c:pt>
+              </c:numCache>
+            </c:numRef>
+          </c:yVal>
+          <c:smooth val="1"/>
+        </c:ser>
+        <c:ser>
+          <c:idx val="2"/>
+          <c:order val="2"/>
+          <c:tx>
+            <c:v>Novoalign</c:v>
+          </c:tx>
+          <c:xVal>
+            <c:numRef>
+              <c:f>Sheet1!$U$4</c:f>
+              <c:numCache>
+                <c:formatCode>General</c:formatCode>
+                <c:ptCount val="1"/>
+                <c:pt idx="0">
+                  <c:v>1078.748651564186</c:v>
+                </c:pt>
+              </c:numCache>
+            </c:numRef>
+          </c:xVal>
+          <c:yVal>
+            <c:numRef>
+              <c:f>Sheet1!$S$4</c:f>
+              <c:numCache>
+                <c:formatCode>0.00%</c:formatCode>
+                <c:ptCount val="1"/>
+                <c:pt idx="0">
+                  <c:v>0.0002</c:v>
+                </c:pt>
+              </c:numCache>
+            </c:numRef>
+          </c:yVal>
+          <c:smooth val="1"/>
+        </c:ser>
+        <c:axId val="69304440"/>
+        <c:axId val="481106520"/>
+      </c:scatterChart>
+      <c:valAx>
+        <c:axId val="69304440"/>
+        <c:scaling>
+          <c:logBase val="10.0"/>
+          <c:orientation val="minMax"/>
+          <c:max val="1200.0"/>
+          <c:min val="10.0"/>
+        </c:scaling>
+        <c:axPos val="b"/>
+        <c:title>
+          <c:tx>
+            <c:rich>
+              <a:bodyPr/>
+              <a:lstStyle/>
+              <a:p>
+                <a:pPr>
+                  <a:defRPr sz="1800"/>
+                </a:pPr>
+                <a:r>
+                  <a:rPr lang="en-US" sz="1800"/>
+                  <a:t>Time (s)</a:t>
+                </a:r>
+              </a:p>
+            </c:rich>
+          </c:tx>
+          <c:layout/>
+        </c:title>
+        <c:numFmt formatCode="General" sourceLinked="1"/>
+        <c:tickLblPos val="nextTo"/>
+        <c:crossAx val="481106520"/>
+        <c:crosses val="autoZero"/>
+        <c:crossBetween val="midCat"/>
+      </c:valAx>
+      <c:valAx>
+        <c:axId val="481106520"/>
+        <c:scaling>
+          <c:orientation val="minMax"/>
+        </c:scaling>
+        <c:axPos val="l"/>
+        <c:majorGridlines/>
+        <c:title>
+          <c:tx>
+            <c:rich>
+              <a:bodyPr/>
+              <a:lstStyle/>
+              <a:p>
+                <a:pPr>
+                  <a:defRPr sz="1800"/>
+                </a:pPr>
+                <a:r>
+                  <a:rPr lang="en-US" sz="1800"/>
+                  <a:t>% Error</a:t>
+                </a:r>
+              </a:p>
+            </c:rich>
+          </c:tx>
+          <c:layout/>
+        </c:title>
+        <c:numFmt formatCode="0.00%" sourceLinked="1"/>
+        <c:tickLblPos val="nextTo"/>
+        <c:crossAx val="69304440"/>
+        <c:crosses val="autoZero"/>
+        <c:crossBetween val="midCat"/>
+      </c:valAx>
+    </c:plotArea>
+    <c:legend>
+      <c:legendPos val="r"/>
+      <c:layout/>
+    </c:legend>
+    <c:plotVisOnly val="1"/>
+  </c:chart>
+  <c:externalData r:id="rId1"/>
+</c:chartSpace>
+</file>
+
+<file path=ppt/charts/chart6.xml><?xml version="1.0" encoding="utf-8"?>
+<c:chartSpace xmlns:c="http://schemas.openxmlformats.org/drawingml/2006/chart" xmlns:a="http://schemas.openxmlformats.org/drawingml/2006/main" xmlns:r="http://schemas.openxmlformats.org/officeDocument/2006/relationships">
+  <c:date1904 val="1"/>
+  <c:lang val="en-US"/>
+  <c:style val="2"/>
+  <c:chart>
+    <c:title>
+      <c:tx>
+        <c:rich>
+          <a:bodyPr/>
+          <a:lstStyle/>
+          <a:p>
+            <a:pPr>
+              <a:defRPr/>
+            </a:pPr>
+            <a:r>
+              <a:rPr lang="en-US"/>
+              <a:t>% Aligned vs. Time</a:t>
+            </a:r>
+          </a:p>
+        </c:rich>
+      </c:tx>
+      <c:layout>
+        <c:manualLayout>
+          <c:xMode val="edge"/>
+          <c:yMode val="edge"/>
+          <c:x val="0.363462324505422"/>
+          <c:y val="0.0"/>
+        </c:manualLayout>
+      </c:layout>
+    </c:title>
+    <c:plotArea>
+      <c:layout/>
+      <c:scatterChart>
+        <c:scatterStyle val="smoothMarker"/>
+        <c:ser>
+          <c:idx val="0"/>
+          <c:order val="0"/>
+          <c:tx>
+            <c:v>SNAP</c:v>
+          </c:tx>
+          <c:xVal>
+            <c:numRef>
+              <c:f>Sheet1!$L$4:$L$19</c:f>
+              <c:numCache>
+                <c:formatCode>General</c:formatCode>
+                <c:ptCount val="16"/>
+                <c:pt idx="0">
+                  <c:v>11.6679306924917</c:v>
+                </c:pt>
+                <c:pt idx="1">
+                  <c:v>15.33389557617113</c:v>
+                </c:pt>
+                <c:pt idx="2">
+                  <c:v>18.46892603195122</c:v>
+                </c:pt>
+                <c:pt idx="3">
+                  <c:v>21.36067499732992</c:v>
+                </c:pt>
+                <c:pt idx="4">
+                  <c:v>24.25594877143619</c:v>
+                </c:pt>
+                <c:pt idx="5">
+                  <c:v>26.88750268875027</c:v>
+                </c:pt>
+                <c:pt idx="6">
+                  <c:v>29.79560216911984</c:v>
+                </c:pt>
+                <c:pt idx="7">
+                  <c:v>32.72893892779997</c:v>
+                </c:pt>
+                <c:pt idx="8">
+                  <c:v>36.12977816316208</c:v>
+                </c:pt>
+                <c:pt idx="9">
+                  <c:v>48.0215136381099</c:v>
+                </c:pt>
+                <c:pt idx="10">
+                  <c:v>57.04831992697817</c:v>
+                </c:pt>
+                <c:pt idx="11">
+                  <c:v>59.93407252022775</c:v>
+                </c:pt>
+                <c:pt idx="12">
+                  <c:v>69.12283127116881</c:v>
+                </c:pt>
+                <c:pt idx="13">
+                  <c:v>81.47967082212983</c:v>
+                </c:pt>
+                <c:pt idx="14">
+                  <c:v>77.724234416291</c:v>
+                </c:pt>
+                <c:pt idx="15">
+                  <c:v>84.07600470825625</c:v>
+                </c:pt>
+              </c:numCache>
+            </c:numRef>
+          </c:xVal>
+          <c:yVal>
+            <c:numRef>
+              <c:f>Sheet1!$G$4:$G$19</c:f>
+              <c:numCache>
+                <c:formatCode>0.0%</c:formatCode>
+                <c:ptCount val="16"/>
+                <c:pt idx="0">
+                  <c:v>0.9111</c:v>
+                </c:pt>
+                <c:pt idx="1">
+                  <c:v>0.9137</c:v>
+                </c:pt>
+                <c:pt idx="2">
+                  <c:v>0.9149</c:v>
+                </c:pt>
+                <c:pt idx="3">
+                  <c:v>0.9158</c:v>
+                </c:pt>
+                <c:pt idx="4">
+                  <c:v>0.9164</c:v>
+                </c:pt>
+                <c:pt idx="5">
+                  <c:v>0.9169</c:v>
+                </c:pt>
+                <c:pt idx="6">
+                  <c:v>0.9173</c:v>
+                </c:pt>
+                <c:pt idx="7">
+                  <c:v>0.9176</c:v>
+                </c:pt>
+                <c:pt idx="8">
+                  <c:v>0.9181</c:v>
+                </c:pt>
+                <c:pt idx="9">
+                  <c:v>0.9187</c:v>
+                </c:pt>
+                <c:pt idx="10">
+                  <c:v>0.9191</c:v>
+                </c:pt>
+                <c:pt idx="11">
+                  <c:v>0.9194</c:v>
+                </c:pt>
+                <c:pt idx="12">
+                  <c:v>0.9195</c:v>
+                </c:pt>
+                <c:pt idx="13">
+                  <c:v>0.9197</c:v>
+                </c:pt>
+                <c:pt idx="14">
+                  <c:v>0.9198</c:v>
+                </c:pt>
+                <c:pt idx="15">
+                  <c:v>0.9199</c:v>
+                </c:pt>
+              </c:numCache>
+            </c:numRef>
+          </c:yVal>
+          <c:smooth val="1"/>
+        </c:ser>
+        <c:ser>
+          <c:idx val="1"/>
+          <c:order val="1"/>
+          <c:tx>
+            <c:v>BWA</c:v>
+          </c:tx>
+          <c:xVal>
+            <c:numRef>
+              <c:f>Sheet1!$Q$4</c:f>
+              <c:numCache>
+                <c:formatCode>General</c:formatCode>
+                <c:ptCount val="1"/>
+                <c:pt idx="0">
+                  <c:v>925.9259259259258</c:v>
+                </c:pt>
+              </c:numCache>
+            </c:numRef>
+          </c:xVal>
+          <c:yVal>
+            <c:numRef>
+              <c:f>Sheet1!$N$4</c:f>
+              <c:numCache>
+                <c:formatCode>0.00%</c:formatCode>
+                <c:ptCount val="1"/>
+                <c:pt idx="0">
+                  <c:v>0.908</c:v>
+                </c:pt>
+              </c:numCache>
+            </c:numRef>
+          </c:yVal>
+          <c:smooth val="1"/>
+        </c:ser>
+        <c:ser>
+          <c:idx val="2"/>
+          <c:order val="2"/>
+          <c:tx>
+            <c:v>Novoalign</c:v>
+          </c:tx>
+          <c:xVal>
+            <c:numRef>
+              <c:f>Sheet1!$U$4</c:f>
+              <c:numCache>
+                <c:formatCode>General</c:formatCode>
+                <c:ptCount val="1"/>
+                <c:pt idx="0">
+                  <c:v>1078.748651564186</c:v>
+                </c:pt>
+              </c:numCache>
+            </c:numRef>
+          </c:xVal>
+          <c:yVal>
+            <c:numRef>
+              <c:f>Sheet1!$R$4</c:f>
+              <c:numCache>
+                <c:formatCode>0.00%</c:formatCode>
+                <c:ptCount val="1"/>
+                <c:pt idx="0">
+                  <c:v>0.946</c:v>
+                </c:pt>
+              </c:numCache>
+            </c:numRef>
+          </c:yVal>
+          <c:smooth val="1"/>
+        </c:ser>
+        <c:axId val="563632568"/>
+        <c:axId val="564035000"/>
+      </c:scatterChart>
+      <c:valAx>
+        <c:axId val="563632568"/>
+        <c:scaling>
+          <c:logBase val="10.0"/>
+          <c:orientation val="minMax"/>
+          <c:max val="1200.0"/>
+          <c:min val="10.0"/>
+        </c:scaling>
+        <c:axPos val="b"/>
+        <c:title>
+          <c:tx>
+            <c:rich>
+              <a:bodyPr/>
+              <a:lstStyle/>
+              <a:p>
+                <a:pPr>
+                  <a:defRPr sz="1800"/>
+                </a:pPr>
+                <a:r>
+                  <a:rPr lang="en-US" sz="1800"/>
+                  <a:t>Time (s)</a:t>
+                </a:r>
+              </a:p>
+            </c:rich>
+          </c:tx>
+          <c:layout/>
+        </c:title>
+        <c:numFmt formatCode="General" sourceLinked="1"/>
+        <c:tickLblPos val="nextTo"/>
+        <c:crossAx val="564035000"/>
+        <c:crosses val="autoZero"/>
+        <c:crossBetween val="midCat"/>
+      </c:valAx>
+      <c:valAx>
+        <c:axId val="564035000"/>
+        <c:scaling>
+          <c:orientation val="minMax"/>
+        </c:scaling>
+        <c:axPos val="l"/>
+        <c:majorGridlines/>
+        <c:title>
+          <c:tx>
+            <c:rich>
+              <a:bodyPr/>
+              <a:lstStyle/>
+              <a:p>
+                <a:pPr>
+                  <a:defRPr sz="1800"/>
+                </a:pPr>
+                <a:r>
+                  <a:rPr lang="en-US" sz="1800"/>
+                  <a:t>% Aligned</a:t>
+                </a:r>
+              </a:p>
+            </c:rich>
+          </c:tx>
+          <c:layout/>
+        </c:title>
+        <c:numFmt formatCode="0.0%" sourceLinked="1"/>
+        <c:tickLblPos val="nextTo"/>
+        <c:crossAx val="563632568"/>
+        <c:crosses val="autoZero"/>
+        <c:crossBetween val="midCat"/>
+      </c:valAx>
+    </c:plotArea>
+    <c:plotVisOnly val="1"/>
+  </c:chart>
+  <c:externalData r:id="rId1"/>
+</c:chartSpace>
+</file>
+
 <file path=ppt/notesMasters/notesMaster1.xml><?xml version="1.0" encoding="utf-8"?>
 <p:notesMaster xmlns:a="http://schemas.openxmlformats.org/drawingml/2006/main" xmlns:r="http://schemas.openxmlformats.org/officeDocument/2006/relationships" xmlns:mc="http://schemas.openxmlformats.org/markup-compatibility/2006" xmlns:mv="urn:schemas-microsoft-com:mac:vml" xmlns:p="http://schemas.openxmlformats.org/presentationml/2006/main" mc:Ignorable="mv" mc:PreserveAttributes="mv:*">
   <p:cSld>
@@ -1022,7 +1621,7 @@
             <a:fld id="{275DB8CA-94BD-8D45-A455-2D119630D46C}" type="datetimeFigureOut">
               <a:rPr lang="en-US" smtClean="0"/>
               <a:pPr/>
-              <a:t>11/27/12</a:t>
+              <a:t>11/28/12</a:t>
             </a:fld>
             <a:endParaRPr lang="en-US"/>
           </a:p>
@@ -2229,29 +2828,48 @@
           <a:p>
             <a:r>
               <a:rPr lang="en-US" dirty="0" smtClean="0"/>
-              <a:t>TODO:  add results</a:t>
-            </a:r>
-          </a:p>
-          <a:p>
-            <a:r>
-              <a:rPr lang="en-US" dirty="0" smtClean="0"/>
-              <a:t>Compare to </a:t>
-            </a:r>
-            <a:r>
-              <a:rPr lang="en-US" dirty="0" err="1" smtClean="0"/>
-              <a:t>mr</a:t>
-            </a:r>
-            <a:r>
-              <a:rPr lang="en-US" dirty="0" smtClean="0"/>
-              <a:t> fast, </a:t>
-            </a:r>
-            <a:r>
-              <a:rPr lang="en-US" dirty="0" err="1" smtClean="0"/>
-              <a:t>mrs</a:t>
-            </a:r>
-            <a:r>
-              <a:rPr lang="en-US" dirty="0" smtClean="0"/>
-              <a:t> fast (others?)</a:t>
+              <a:t>TODO: </a:t>
+            </a:r>
+            <a:r>
+              <a:rPr lang="en-US" baseline="0" dirty="0" smtClean="0"/>
+              <a:t> add real #</a:t>
+            </a:r>
+            <a:r>
+              <a:rPr lang="en-US" baseline="0" dirty="0" err="1" smtClean="0"/>
+              <a:t>s</a:t>
+            </a:r>
+            <a:r>
+              <a:rPr lang="en-US" baseline="0" dirty="0" smtClean="0"/>
+              <a:t> for </a:t>
+            </a:r>
+            <a:r>
+              <a:rPr lang="en-US" baseline="0" dirty="0" err="1" smtClean="0"/>
+              <a:t>sim</a:t>
+            </a:r>
+            <a:r>
+              <a:rPr lang="en-US" baseline="0" dirty="0" smtClean="0"/>
+              <a:t>-aware SNAP</a:t>
+            </a:r>
+          </a:p>
+          <a:p>
+            <a:r>
+              <a:rPr lang="en-US" baseline="0" dirty="0" smtClean="0"/>
+              <a:t>Aligning 1e6 simulated reads to the whole genome, single end, best matcher</a:t>
+            </a:r>
+          </a:p>
+          <a:p>
+            <a:r>
+              <a:rPr lang="en-US" baseline="0" dirty="0" smtClean="0"/>
+              <a:t>Used cc2.8xlarge</a:t>
+            </a:r>
+          </a:p>
+          <a:p>
+            <a:endParaRPr lang="en-US" baseline="0" dirty="0" smtClean="0"/>
+          </a:p>
+          <a:p>
+            <a:r>
+              <a:rPr lang="en-US" baseline="0" dirty="0" smtClean="0"/>
+              <a:t>** may change this to be from c95</a:t>
             </a:r>
             <a:endParaRPr lang="en-US" dirty="0"/>
           </a:p>
@@ -2492,41 +3110,63 @@
           <a:p>
             <a:r>
               <a:rPr lang="en-US" dirty="0" smtClean="0"/>
-              <a:t>TODO:  talk about insights from</a:t>
+              <a:t>TODO:  add results</a:t>
+            </a:r>
+          </a:p>
+          <a:p>
+            <a:r>
+              <a:rPr lang="en-US" dirty="0" smtClean="0"/>
+              <a:t>Compare to </a:t>
+            </a:r>
+            <a:r>
+              <a:rPr lang="en-US" dirty="0" err="1" smtClean="0"/>
+              <a:t>mr</a:t>
+            </a:r>
+            <a:r>
+              <a:rPr lang="en-US" dirty="0" smtClean="0"/>
+              <a:t> fast, </a:t>
+            </a:r>
+            <a:r>
+              <a:rPr lang="en-US" dirty="0" err="1" smtClean="0"/>
+              <a:t>mrs</a:t>
+            </a:r>
+            <a:r>
+              <a:rPr lang="en-US" dirty="0" smtClean="0"/>
+              <a:t> fast (others?)</a:t>
+            </a:r>
+          </a:p>
+          <a:p>
+            <a:r>
+              <a:rPr lang="en-US" dirty="0" smtClean="0"/>
+              <a:t>Might want to change this to be speedup over regular, so 2</a:t>
+            </a:r>
+            <a:r>
+              <a:rPr lang="en-US" baseline="30000" dirty="0" smtClean="0"/>
+              <a:t>nd</a:t>
+            </a:r>
+            <a:r>
+              <a:rPr lang="en-US" dirty="0" smtClean="0"/>
+              <a:t> &amp; 3</a:t>
+            </a:r>
+            <a:r>
+              <a:rPr lang="en-US" baseline="30000" dirty="0" smtClean="0"/>
+              <a:t>rd</a:t>
             </a:r>
             <a:r>
               <a:rPr lang="en-US" baseline="0" dirty="0" smtClean="0"/>
-              <a:t> profiling &amp; plans to improve speed</a:t>
-            </a:r>
-          </a:p>
-          <a:p>
-            <a:r>
-              <a:rPr lang="en-US" baseline="0" dirty="0" smtClean="0"/>
-              <a:t>Add more here</a:t>
-            </a:r>
-            <a:r>
-              <a:rPr lang="en-US" baseline="0" dirty="0" smtClean="0"/>
-              <a:t>!</a:t>
-            </a:r>
-          </a:p>
-          <a:p>
-            <a:r>
-              <a:rPr lang="en-US" baseline="0" dirty="0" smtClean="0"/>
-              <a:t>Might have to distinguish this from the current index – difference is that the current index gives you a position for the cluster id, but it doesn’t tell you whether that pos is in a cluster</a:t>
-            </a:r>
-          </a:p>
-          <a:p>
-            <a:r>
-              <a:rPr lang="en-US" baseline="0" dirty="0" smtClean="0"/>
-              <a:t>Can you modify </a:t>
-            </a:r>
-            <a:r>
-              <a:rPr lang="en-US" baseline="0" dirty="0" err="1" smtClean="0"/>
-              <a:t>getClusterInfo</a:t>
-            </a:r>
-            <a:r>
-              <a:rPr lang="en-US" baseline="0" dirty="0" smtClean="0"/>
-              <a:t> to only have cluster IDs rather than pos?  Like, rather than “is this in a cluster”, it would be “is this a cluster id” – might fit in cache</a:t>
+              <a:t> row would have the speedup.  This makes it look like I get no speedup on the </a:t>
+            </a:r>
+            <a:r>
+              <a:rPr lang="en-US" baseline="0" smtClean="0"/>
+              <a:t>3</a:t>
+            </a:r>
+            <a:r>
+              <a:rPr lang="en-US" baseline="30000" smtClean="0"/>
+              <a:t>rd</a:t>
+            </a:r>
+            <a:r>
+              <a:rPr lang="en-US" baseline="0" smtClean="0"/>
+              <a:t> row.</a:t>
             </a:r>
             <a:endParaRPr lang="en-US" dirty="0"/>
           </a:p>
@@ -2612,37 +3252,37 @@
           <a:p>
             <a:r>
               <a:rPr lang="en-US" dirty="0" smtClean="0"/>
-              <a:t>Not</a:t>
+              <a:t>TODO:  talk about insights from</a:t>
             </a:r>
             <a:r>
               <a:rPr lang="en-US" baseline="0" dirty="0" smtClean="0"/>
-              <a:t> tied to SNAP</a:t>
+              <a:t> profiling &amp; plans to improve speed</a:t>
             </a:r>
           </a:p>
           <a:p>
             <a:r>
               <a:rPr lang="en-US" baseline="0" dirty="0" smtClean="0"/>
-              <a:t>More detail on initial thoughts</a:t>
+              <a:t>Add more here!</a:t>
             </a:r>
           </a:p>
           <a:p>
             <a:r>
               <a:rPr lang="en-US" baseline="0" dirty="0" smtClean="0"/>
-              <a:t>Evaluation methodology – how to convince people that these values are reliable?</a:t>
+              <a:t>Might have to distinguish this from the current index – difference is that the current index gives you a position for the cluster id, but it doesn’t tell you whether that pos is in a cluster</a:t>
             </a:r>
           </a:p>
           <a:p>
             <a:r>
               <a:rPr lang="en-US" baseline="0" dirty="0" smtClean="0"/>
-              <a:t>Even the </a:t>
+              <a:t>Can you modify </a:t>
             </a:r>
             <a:r>
               <a:rPr lang="en-US" baseline="0" dirty="0" err="1" smtClean="0"/>
-              <a:t>eval</a:t>
+              <a:t>getClusterInfo</a:t>
             </a:r>
             <a:r>
               <a:rPr lang="en-US" baseline="0" dirty="0" smtClean="0"/>
-              <a:t> methodology is the goal</a:t>
+              <a:t> to only have cluster IDs rather than pos?  Like, rather than “is this in a cluster”, it would be “is this a cluster id” – might fit in cache</a:t>
             </a:r>
             <a:endParaRPr lang="en-US" dirty="0"/>
           </a:p>
@@ -2666,7 +3306,7 @@
             <a:fld id="{56D28874-1678-3448-827B-018601F8A9DB}" type="slidenum">
               <a:rPr lang="en-US" smtClean="0"/>
               <a:pPr/>
-              <a:t>42</a:t>
+              <a:t>41</a:t>
             </a:fld>
             <a:endParaRPr lang="en-US"/>
           </a:p>
@@ -2728,15 +3368,37 @@
           <a:p>
             <a:r>
               <a:rPr lang="en-US" dirty="0" smtClean="0"/>
-              <a:t>TODO:  get #</a:t>
-            </a:r>
-            <a:r>
-              <a:rPr lang="en-US" dirty="0" err="1" smtClean="0"/>
-              <a:t>s</a:t>
-            </a:r>
-            <a:r>
-              <a:rPr lang="en-US" dirty="0" smtClean="0"/>
-              <a:t> for experiment</a:t>
+              <a:t>Not</a:t>
+            </a:r>
+            <a:r>
+              <a:rPr lang="en-US" baseline="0" dirty="0" smtClean="0"/>
+              <a:t> tied to SNAP</a:t>
+            </a:r>
+          </a:p>
+          <a:p>
+            <a:r>
+              <a:rPr lang="en-US" baseline="0" dirty="0" smtClean="0"/>
+              <a:t>More detail on initial thoughts</a:t>
+            </a:r>
+          </a:p>
+          <a:p>
+            <a:r>
+              <a:rPr lang="en-US" baseline="0" dirty="0" smtClean="0"/>
+              <a:t>Evaluation methodology – how to convince people that these values are reliable?</a:t>
+            </a:r>
+          </a:p>
+          <a:p>
+            <a:r>
+              <a:rPr lang="en-US" baseline="0" dirty="0" smtClean="0"/>
+              <a:t>Even the </a:t>
+            </a:r>
+            <a:r>
+              <a:rPr lang="en-US" baseline="0" dirty="0" err="1" smtClean="0"/>
+              <a:t>eval</a:t>
+            </a:r>
+            <a:r>
+              <a:rPr lang="en-US" baseline="0" dirty="0" smtClean="0"/>
+              <a:t> methodology is the goal</a:t>
             </a:r>
             <a:endParaRPr lang="en-US" dirty="0"/>
           </a:p>
@@ -2822,7 +3484,15 @@
           <a:p>
             <a:r>
               <a:rPr lang="en-US" dirty="0" smtClean="0"/>
-              <a:t>Dates for submission to journal (month granularity); also specific journal</a:t>
+              <a:t>TODO:  get #</a:t>
+            </a:r>
+            <a:r>
+              <a:rPr lang="en-US" dirty="0" err="1" smtClean="0"/>
+              <a:t>s</a:t>
+            </a:r>
+            <a:r>
+              <a:rPr lang="en-US" dirty="0" smtClean="0"/>
+              <a:t> for experiment</a:t>
             </a:r>
             <a:endParaRPr lang="en-US" dirty="0"/>
           </a:p>
@@ -2846,7 +3516,7 @@
             <a:fld id="{56D28874-1678-3448-827B-018601F8A9DB}" type="slidenum">
               <a:rPr lang="en-US" smtClean="0"/>
               <a:pPr/>
-              <a:t>45</a:t>
+              <a:t>44</a:t>
             </a:fld>
             <a:endParaRPr lang="en-US"/>
           </a:p>
@@ -2908,19 +3578,7 @@
           <a:p>
             <a:r>
               <a:rPr lang="en-US" dirty="0" smtClean="0"/>
-              <a:t>TODO:  add Blast,</a:t>
-            </a:r>
-            <a:r>
-              <a:rPr lang="en-US" baseline="0" dirty="0" smtClean="0"/>
-              <a:t> </a:t>
-            </a:r>
-            <a:r>
-              <a:rPr lang="en-US" baseline="0" dirty="0" err="1" smtClean="0"/>
-              <a:t>Ukkonen</a:t>
-            </a:r>
-            <a:r>
-              <a:rPr lang="en-US" baseline="0" dirty="0" smtClean="0"/>
-              <a:t>, Smith-Waterman</a:t>
+              <a:t>Dates for submission to journal (month granularity); also specific journal</a:t>
             </a:r>
             <a:endParaRPr lang="en-US" dirty="0"/>
           </a:p>
@@ -2944,7 +3602,7 @@
             <a:fld id="{56D28874-1678-3448-827B-018601F8A9DB}" type="slidenum">
               <a:rPr lang="en-US" smtClean="0"/>
               <a:pPr/>
-              <a:t>47</a:t>
+              <a:t>46</a:t>
             </a:fld>
             <a:endParaRPr lang="en-US"/>
           </a:p>
@@ -3006,17 +3664,19 @@
           <a:p>
             <a:r>
               <a:rPr lang="en-US" dirty="0" smtClean="0"/>
-              <a:t>TODO:  add results</a:t>
-            </a:r>
-          </a:p>
-          <a:p>
-            <a:r>
-              <a:rPr lang="en-US" dirty="0" smtClean="0"/>
-              <a:t>TODO:  show profiling &amp; talk about how to</a:t>
+              <a:t>TODO:  add Blast,</a:t>
             </a:r>
             <a:r>
               <a:rPr lang="en-US" baseline="0" dirty="0" smtClean="0"/>
-              <a:t> improve speed</a:t>
+              <a:t> </a:t>
+            </a:r>
+            <a:r>
+              <a:rPr lang="en-US" baseline="0" dirty="0" err="1" smtClean="0"/>
+              <a:t>Ukkonen</a:t>
+            </a:r>
+            <a:r>
+              <a:rPr lang="en-US" baseline="0" dirty="0" smtClean="0"/>
+              <a:t>, Smith-Waterman</a:t>
             </a:r>
             <a:endParaRPr lang="en-US" dirty="0"/>
           </a:p>
@@ -3040,7 +3700,103 @@
             <a:fld id="{56D28874-1678-3448-827B-018601F8A9DB}" type="slidenum">
               <a:rPr lang="en-US" smtClean="0"/>
               <a:pPr/>
-              <a:t>50</a:t>
+              <a:t>48</a:t>
+            </a:fld>
+            <a:endParaRPr lang="en-US"/>
+          </a:p>
+        </p:txBody>
+      </p:sp>
+    </p:spTree>
+  </p:cSld>
+  <p:clrMapOvr>
+    <a:masterClrMapping/>
+  </p:clrMapOvr>
+</p:notes>
+</file>
+
+<file path=ppt/notesSlides/notesSlide26.xml><?xml version="1.0" encoding="utf-8"?>
+<p:notes xmlns:a="http://schemas.openxmlformats.org/drawingml/2006/main" xmlns:r="http://schemas.openxmlformats.org/officeDocument/2006/relationships" xmlns:mc="http://schemas.openxmlformats.org/markup-compatibility/2006" xmlns:mv="urn:schemas-microsoft-com:mac:vml" xmlns:p="http://schemas.openxmlformats.org/presentationml/2006/main" mc:Ignorable="mv" mc:PreserveAttributes="mv:*">
+  <p:cSld>
+    <p:spTree>
+      <p:nvGrpSpPr>
+        <p:cNvPr id="1" name=""/>
+        <p:cNvGrpSpPr/>
+        <p:nvPr/>
+      </p:nvGrpSpPr>
+      <p:grpSpPr>
+        <a:xfrm>
+          <a:off x="0" y="0"/>
+          <a:ext cx="0" cy="0"/>
+          <a:chOff x="0" y="0"/>
+          <a:chExt cx="0" cy="0"/>
+        </a:xfrm>
+      </p:grpSpPr>
+      <p:sp>
+        <p:nvSpPr>
+          <p:cNvPr id="2" name="Slide Image Placeholder 1"/>
+          <p:cNvSpPr>
+            <a:spLocks noGrp="1" noRot="1" noChangeAspect="1"/>
+          </p:cNvSpPr>
+          <p:nvPr>
+            <p:ph type="sldImg"/>
+          </p:nvPr>
+        </p:nvSpPr>
+        <p:spPr/>
+      </p:sp>
+      <p:sp>
+        <p:nvSpPr>
+          <p:cNvPr id="3" name="Notes Placeholder 2"/>
+          <p:cNvSpPr>
+            <a:spLocks noGrp="1"/>
+          </p:cNvSpPr>
+          <p:nvPr>
+            <p:ph type="body" idx="1"/>
+          </p:nvPr>
+        </p:nvSpPr>
+        <p:spPr/>
+        <p:txBody>
+          <a:bodyPr>
+            <a:normAutofit/>
+          </a:bodyPr>
+          <a:lstStyle/>
+          <a:p>
+            <a:r>
+              <a:rPr lang="en-US" dirty="0" smtClean="0"/>
+              <a:t>TODO:  add results</a:t>
+            </a:r>
+          </a:p>
+          <a:p>
+            <a:r>
+              <a:rPr lang="en-US" dirty="0" smtClean="0"/>
+              <a:t>TODO:  show profiling &amp; talk about how to</a:t>
+            </a:r>
+            <a:r>
+              <a:rPr lang="en-US" baseline="0" dirty="0" smtClean="0"/>
+              <a:t> improve speed</a:t>
+            </a:r>
+            <a:endParaRPr lang="en-US" dirty="0"/>
+          </a:p>
+        </p:txBody>
+      </p:sp>
+      <p:sp>
+        <p:nvSpPr>
+          <p:cNvPr id="4" name="Slide Number Placeholder 3"/>
+          <p:cNvSpPr>
+            <a:spLocks noGrp="1"/>
+          </p:cNvSpPr>
+          <p:nvPr>
+            <p:ph type="sldNum" sz="quarter" idx="10"/>
+          </p:nvPr>
+        </p:nvSpPr>
+        <p:spPr/>
+        <p:txBody>
+          <a:bodyPr/>
+          <a:lstStyle/>
+          <a:p>
+            <a:fld id="{56D28874-1678-3448-827B-018601F8A9DB}" type="slidenum">
+              <a:rPr lang="en-US" smtClean="0"/>
+              <a:pPr/>
+              <a:t>51</a:t>
             </a:fld>
             <a:endParaRPr lang="en-US"/>
           </a:p>
@@ -3290,11 +4046,7 @@
           <a:p>
             <a:r>
               <a:rPr lang="en-US" dirty="0" smtClean="0"/>
-              <a:t>TODO:  add names/citations (or, citations can appear in backup slides</a:t>
-            </a:r>
-            <a:r>
-              <a:rPr lang="en-US" dirty="0" smtClean="0"/>
-              <a:t>) – add blast to #1</a:t>
+              <a:t>TODO:  add names/citations (or, citations can appear in backup slides) – add blast to #1</a:t>
             </a:r>
           </a:p>
           <a:p>
@@ -3667,10 +4419,6 @@
           </a:bodyPr>
           <a:lstStyle/>
           <a:p>
-            <a:r>
-              <a:rPr lang="en-US" baseline="0" dirty="0" smtClean="0"/>
-              <a:t>TODO:  example as pie charts instead of words</a:t>
-            </a:r>
             <a:endParaRPr lang="en-US" dirty="0"/>
           </a:p>
         </p:txBody>
@@ -3889,7 +4637,7 @@
             <a:fld id="{8BF18853-1D5D-4D4C-9B2E-E0406925FFDC}" type="datetimeFigureOut">
               <a:rPr lang="en-US" smtClean="0"/>
               <a:pPr/>
-              <a:t>11/27/12</a:t>
+              <a:t>11/28/12</a:t>
             </a:fld>
             <a:endParaRPr lang="en-US"/>
           </a:p>
@@ -4056,7 +4804,7 @@
             <a:fld id="{8BF18853-1D5D-4D4C-9B2E-E0406925FFDC}" type="datetimeFigureOut">
               <a:rPr lang="en-US" smtClean="0"/>
               <a:pPr/>
-              <a:t>11/27/12</a:t>
+              <a:t>11/28/12</a:t>
             </a:fld>
             <a:endParaRPr lang="en-US"/>
           </a:p>
@@ -4233,7 +4981,7 @@
             <a:fld id="{8BF18853-1D5D-4D4C-9B2E-E0406925FFDC}" type="datetimeFigureOut">
               <a:rPr lang="en-US" smtClean="0"/>
               <a:pPr/>
-              <a:t>11/27/12</a:t>
+              <a:t>11/28/12</a:t>
             </a:fld>
             <a:endParaRPr lang="en-US"/>
           </a:p>
@@ -4400,7 +5148,7 @@
             <a:fld id="{8BF18853-1D5D-4D4C-9B2E-E0406925FFDC}" type="datetimeFigureOut">
               <a:rPr lang="en-US" smtClean="0"/>
               <a:pPr/>
-              <a:t>11/27/12</a:t>
+              <a:t>11/28/12</a:t>
             </a:fld>
             <a:endParaRPr lang="en-US"/>
           </a:p>
@@ -4643,7 +5391,7 @@
             <a:fld id="{8BF18853-1D5D-4D4C-9B2E-E0406925FFDC}" type="datetimeFigureOut">
               <a:rPr lang="en-US" smtClean="0"/>
               <a:pPr/>
-              <a:t>11/27/12</a:t>
+              <a:t>11/28/12</a:t>
             </a:fld>
             <a:endParaRPr lang="en-US"/>
           </a:p>
@@ -4928,7 +5676,7 @@
             <a:fld id="{8BF18853-1D5D-4D4C-9B2E-E0406925FFDC}" type="datetimeFigureOut">
               <a:rPr lang="en-US" smtClean="0"/>
               <a:pPr/>
-              <a:t>11/27/12</a:t>
+              <a:t>11/28/12</a:t>
             </a:fld>
             <a:endParaRPr lang="en-US"/>
           </a:p>
@@ -5347,7 +6095,7 @@
             <a:fld id="{8BF18853-1D5D-4D4C-9B2E-E0406925FFDC}" type="datetimeFigureOut">
               <a:rPr lang="en-US" smtClean="0"/>
               <a:pPr/>
-              <a:t>11/27/12</a:t>
+              <a:t>11/28/12</a:t>
             </a:fld>
             <a:endParaRPr lang="en-US"/>
           </a:p>
@@ -5462,7 +6210,7 @@
             <a:fld id="{8BF18853-1D5D-4D4C-9B2E-E0406925FFDC}" type="datetimeFigureOut">
               <a:rPr lang="en-US" smtClean="0"/>
               <a:pPr/>
-              <a:t>11/27/12</a:t>
+              <a:t>11/28/12</a:t>
             </a:fld>
             <a:endParaRPr lang="en-US"/>
           </a:p>
@@ -5554,7 +6302,7 @@
             <a:fld id="{8BF18853-1D5D-4D4C-9B2E-E0406925FFDC}" type="datetimeFigureOut">
               <a:rPr lang="en-US" smtClean="0"/>
               <a:pPr/>
-              <a:t>11/27/12</a:t>
+              <a:t>11/28/12</a:t>
             </a:fld>
             <a:endParaRPr lang="en-US"/>
           </a:p>
@@ -5828,7 +6576,7 @@
             <a:fld id="{8BF18853-1D5D-4D4C-9B2E-E0406925FFDC}" type="datetimeFigureOut">
               <a:rPr lang="en-US" smtClean="0"/>
               <a:pPr/>
-              <a:t>11/27/12</a:t>
+              <a:t>11/28/12</a:t>
             </a:fld>
             <a:endParaRPr lang="en-US"/>
           </a:p>
@@ -6078,7 +6826,7 @@
             <a:fld id="{8BF18853-1D5D-4D4C-9B2E-E0406925FFDC}" type="datetimeFigureOut">
               <a:rPr lang="en-US" smtClean="0"/>
               <a:pPr/>
-              <a:t>11/27/12</a:t>
+              <a:t>11/28/12</a:t>
             </a:fld>
             <a:endParaRPr lang="en-US"/>
           </a:p>
@@ -6288,7 +7036,7 @@
             <a:fld id="{8BF18853-1D5D-4D4C-9B2E-E0406925FFDC}" type="datetimeFigureOut">
               <a:rPr lang="en-US" smtClean="0"/>
               <a:pPr/>
-              <a:t>11/27/12</a:t>
+              <a:t>11/28/12</a:t>
             </a:fld>
             <a:endParaRPr lang="en-US"/>
           </a:p>
@@ -7267,11 +8015,7 @@
             <a:pPr lvl="1"/>
             <a:r>
               <a:rPr lang="en-US" dirty="0" smtClean="0"/>
-              <a:t>Search </a:t>
-            </a:r>
-            <a:r>
-              <a:rPr lang="en-US" dirty="0" smtClean="0"/>
-              <a:t>a prefix </a:t>
+              <a:t>Search a prefix </a:t>
             </a:r>
             <a:r>
               <a:rPr lang="en-US" dirty="0" err="1" smtClean="0"/>
@@ -13250,11 +13994,7 @@
           <a:p>
             <a:r>
               <a:rPr lang="en-US" dirty="0" smtClean="0"/>
-              <a:t>If the genome were a random string, alignment &amp; subsequent processing would be </a:t>
-            </a:r>
-            <a:r>
-              <a:rPr lang="en-US" dirty="0" smtClean="0"/>
-              <a:t>easy</a:t>
+              <a:t>If the genome were a random string, alignment &amp; subsequent processing would be easy</a:t>
             </a:r>
           </a:p>
           <a:p>
@@ -13271,7 +14011,6 @@
               <a:rPr lang="en-US" dirty="0" smtClean="0"/>
               <a:t> string, there would be only 0.004 false hits</a:t>
             </a:r>
-            <a:endParaRPr lang="en-US" dirty="0" smtClean="0"/>
           </a:p>
           <a:p>
             <a:r>
@@ -13290,11 +14029,7 @@
             <a:pPr lvl="1"/>
             <a:r>
               <a:rPr lang="en-US" dirty="0" smtClean="0"/>
-              <a:t>For reference:  only 8% of positions in hg19 are in </a:t>
-            </a:r>
-            <a:r>
-              <a:rPr lang="en-US" dirty="0" smtClean="0"/>
-              <a:t>clusters</a:t>
+              <a:t>For reference:  only 8% of positions in hg19 are in clusters</a:t>
             </a:r>
           </a:p>
           <a:p>
@@ -18029,17 +18764,8 @@
             <a:pPr lvl="1"/>
             <a:r>
               <a:rPr lang="en-US" dirty="0" smtClean="0"/>
-              <a:t>Scalable through use of partitioning, </a:t>
-            </a:r>
-            <a:r>
-              <a:rPr lang="en-US" dirty="0" smtClean="0"/>
-              <a:t>Spark [Zaharia</a:t>
-            </a:r>
-            <a:r>
-              <a:rPr lang="en-US" dirty="0" smtClean="0"/>
-              <a:t>12]</a:t>
-            </a:r>
-            <a:endParaRPr lang="en-US" dirty="0" smtClean="0"/>
+              <a:t>Scalable through use of partitioning, Spark [Zaharia12]</a:t>
+            </a:r>
           </a:p>
           <a:p>
             <a:pPr lvl="1"/>
@@ -18065,11 +18791,7 @@
             <a:pPr lvl="1"/>
             <a:r>
               <a:rPr lang="en-US" dirty="0" smtClean="0"/>
-              <a:t>Hard to use intrinsic evaluation criteria</a:t>
-            </a:r>
-            <a:r>
-              <a:rPr lang="en-US" dirty="0" smtClean="0"/>
-              <a:t> (no labeled data)</a:t>
+              <a:t>Hard to use intrinsic evaluation criteria (no labeled data)</a:t>
             </a:r>
           </a:p>
           <a:p>
@@ -18179,22 +18901,14 @@
             <a:pPr lvl="1"/>
             <a:r>
               <a:rPr lang="en-US" dirty="0" smtClean="0"/>
-              <a:t>Serial to parallel, with </a:t>
-            </a:r>
+              <a:t>Serial to parallel, with Spark</a:t>
+            </a:r>
+          </a:p>
+          <a:p>
+            <a:pPr lvl="1"/>
             <a:r>
               <a:rPr lang="en-US" dirty="0" smtClean="0"/>
-              <a:t>Spark</a:t>
-            </a:r>
-          </a:p>
-          <a:p>
-            <a:pPr lvl="1"/>
-            <a:r>
-              <a:rPr lang="en-US" dirty="0" smtClean="0"/>
-              <a:t>To </a:t>
-            </a:r>
-            <a:r>
-              <a:rPr lang="en-US" dirty="0" smtClean="0"/>
-              <a:t>reduce memory demands:</a:t>
+              <a:t>To reduce memory demands:</a:t>
             </a:r>
           </a:p>
           <a:p>
@@ -18215,27 +18929,15 @@
             <a:pPr lvl="2"/>
             <a:r>
               <a:rPr lang="en-US" dirty="0" smtClean="0"/>
-              <a:t>Long representation to</a:t>
+              <a:t>Long representation to </a:t>
+            </a:r>
+            <a:r>
+              <a:rPr lang="en-US" dirty="0" err="1" smtClean="0"/>
+              <a:t>Int</a:t>
             </a:r>
             <a:r>
               <a:rPr lang="en-US" dirty="0" smtClean="0"/>
-              <a:t> </a:t>
-            </a:r>
-            <a:r>
-              <a:rPr lang="en-US" dirty="0" err="1" smtClean="0"/>
-              <a:t>I</a:t>
-            </a:r>
-            <a:r>
-              <a:rPr lang="en-US" dirty="0" err="1" smtClean="0"/>
-              <a:t>nt</a:t>
-            </a:r>
-            <a:r>
-              <a:rPr lang="en-US" dirty="0" smtClean="0"/>
-              <a:t> </a:t>
-            </a:r>
-            <a:r>
-              <a:rPr lang="en-US" dirty="0" smtClean="0"/>
-              <a:t>representation</a:t>
+              <a:t> representation</a:t>
             </a:r>
           </a:p>
           <a:p>
@@ -18329,32 +19031,19 @@
               <a:rPr lang="en-US" dirty="0" smtClean="0"/>
               <a:t> on 16 CPUs =&gt; 2016 CPU-hours</a:t>
             </a:r>
-            <a:endParaRPr lang="en-US" dirty="0" smtClean="0"/>
           </a:p>
           <a:p>
             <a:pPr lvl="1"/>
             <a:r>
               <a:rPr lang="en-US" dirty="0" smtClean="0"/>
-              <a:t>Memory usage:  </a:t>
-            </a:r>
+              <a:t>Memory usage:  100 GB</a:t>
+            </a:r>
+          </a:p>
+          <a:p>
+            <a:pPr lvl="1"/>
             <a:r>
               <a:rPr lang="en-US" dirty="0" smtClean="0"/>
-              <a:t>100 </a:t>
-            </a:r>
-            <a:r>
-              <a:rPr lang="en-US" dirty="0" smtClean="0"/>
-              <a:t>GB</a:t>
-            </a:r>
-          </a:p>
-          <a:p>
-            <a:pPr lvl="1"/>
-            <a:r>
-              <a:rPr lang="en-US" dirty="0" smtClean="0"/>
-              <a:t>Output </a:t>
-            </a:r>
-            <a:r>
-              <a:rPr lang="en-US" dirty="0" smtClean="0"/>
-              <a:t>size:  2.8 GB</a:t>
+              <a:t>Output size:  2.8 GB</a:t>
             </a:r>
           </a:p>
           <a:p>
@@ -23561,20 +24250,11 @@
               <a:rPr lang="en-US" dirty="0" smtClean="0"/>
               <a:t>Similarity-aware index</a:t>
             </a:r>
-            <a:endParaRPr lang="en-US" dirty="0" smtClean="0"/>
           </a:p>
           <a:p>
             <a:r>
               <a:rPr lang="en-US" dirty="0" smtClean="0"/>
-              <a:t>Intra</a:t>
-            </a:r>
-            <a:r>
-              <a:rPr lang="en-US" dirty="0" smtClean="0"/>
-              <a:t>-cluster </a:t>
-            </a:r>
-            <a:r>
-              <a:rPr lang="en-US" dirty="0" smtClean="0"/>
-              <a:t>pruning</a:t>
+              <a:t>Intra-cluster pruning</a:t>
             </a:r>
           </a:p>
           <a:p>
@@ -23659,11 +24339,7 @@
           <a:p>
             <a:r>
               <a:rPr lang="en-US" dirty="0" smtClean="0"/>
-              <a:t>Modify </a:t>
-            </a:r>
-            <a:r>
-              <a:rPr lang="en-US" dirty="0" smtClean="0"/>
-              <a:t>SNAP index creation</a:t>
+              <a:t>Modify SNAP index creation</a:t>
             </a:r>
           </a:p>
           <a:p>
@@ -23675,11 +24351,7 @@
           <a:p>
             <a:r>
               <a:rPr lang="en-US" dirty="0" smtClean="0"/>
-              <a:t>Then, when aligning results in a lookup to that seed, you’ll hit the </a:t>
-            </a:r>
-            <a:r>
-              <a:rPr lang="en-US" dirty="0" smtClean="0"/>
-              <a:t>cluster</a:t>
+              <a:t>Then, when aligning results in a lookup to that seed, you’ll hit the cluster</a:t>
             </a:r>
           </a:p>
           <a:p>
@@ -23776,11 +24448,7 @@
             </a:pPr>
             <a:r>
               <a:rPr lang="en-US" dirty="0" smtClean="0"/>
-              <a:t>For </a:t>
-            </a:r>
-            <a:r>
-              <a:rPr lang="en-US" dirty="0" smtClean="0"/>
-              <a:t>each cluster, </a:t>
+              <a:t>For each cluster, </a:t>
             </a:r>
             <a:r>
               <a:rPr lang="en-US" dirty="0" err="1" smtClean="0"/>
@@ -23814,11 +24482,7 @@
             </a:r>
             <a:r>
               <a:rPr lang="en-US" dirty="0" smtClean="0"/>
-              <a:t> the consensus, use the triangle inequality to rule out cluster members that are too far </a:t>
-            </a:r>
-            <a:r>
-              <a:rPr lang="en-US" dirty="0" smtClean="0"/>
-              <a:t>away</a:t>
+              <a:t> the consensus, use the triangle inequality to rule out cluster members that are too far away</a:t>
             </a:r>
           </a:p>
           <a:p>
@@ -23902,15 +24566,7 @@
             </a:pPr>
             <a:r>
               <a:rPr lang="en-US" dirty="0" smtClean="0"/>
-              <a:t>Goal</a:t>
-            </a:r>
-            <a:r>
-              <a:rPr lang="en-US" dirty="0" smtClean="0"/>
-              <a:t>:  Exploit similarity to reuse </a:t>
-            </a:r>
-            <a:r>
-              <a:rPr lang="en-US" dirty="0" smtClean="0"/>
-              <a:t>work</a:t>
+              <a:t>Goal:  Exploit similarity to reuse work</a:t>
             </a:r>
           </a:p>
           <a:p>
@@ -23920,11 +24576,7 @@
             </a:pPr>
             <a:r>
               <a:rPr lang="en-US" sz="2800" dirty="0" smtClean="0"/>
-              <a:t>Compute </a:t>
-            </a:r>
-            <a:r>
-              <a:rPr lang="en-US" sz="2800" dirty="0" smtClean="0"/>
-              <a:t>the cluster’s consensus string</a:t>
+              <a:t>Compute the cluster’s consensus string</a:t>
             </a:r>
           </a:p>
           <a:p>
@@ -23946,11 +24598,7 @@
             </a:r>
             <a:r>
               <a:rPr lang="en-US" sz="2800" dirty="0" smtClean="0"/>
-              <a:t> the </a:t>
-            </a:r>
-            <a:r>
-              <a:rPr lang="en-US" sz="2800" dirty="0" smtClean="0"/>
-              <a:t>consensus</a:t>
+              <a:t> the consensus</a:t>
             </a:r>
           </a:p>
           <a:p>
@@ -23966,7 +24614,6 @@
               <a:rPr lang="en-US" sz="2800" dirty="0" smtClean="0"/>
               <a:t>, rather than all strings in full</a:t>
             </a:r>
-            <a:endParaRPr lang="en-US" sz="2800" dirty="0" smtClean="0"/>
           </a:p>
           <a:p>
             <a:r>
@@ -23977,13 +24624,8 @@
           <a:p>
             <a:r>
               <a:rPr lang="en-US" sz="2800" dirty="0" smtClean="0"/>
-              <a:t>For all-matcher:  find all within given </a:t>
-            </a:r>
-            <a:r>
-              <a:rPr lang="en-US" sz="2800" dirty="0" smtClean="0"/>
-              <a:t>distance</a:t>
-            </a:r>
-            <a:endParaRPr lang="en-US" sz="2800" dirty="0" smtClean="0"/>
+              <a:t>For all-matcher:  find all within given distance</a:t>
+            </a:r>
           </a:p>
         </p:txBody>
       </p:sp>
@@ -23996,6 +24638,624 @@
 </file>
 
 <file path=ppt/slides/slide39.xml><?xml version="1.0" encoding="utf-8"?>
+<p:sld xmlns:a="http://schemas.openxmlformats.org/drawingml/2006/main" xmlns:r="http://schemas.openxmlformats.org/officeDocument/2006/relationships" xmlns:mc="http://schemas.openxmlformats.org/markup-compatibility/2006" xmlns:mv="urn:schemas-microsoft-com:mac:vml" xmlns:p="http://schemas.openxmlformats.org/presentationml/2006/main" mc:Ignorable="mv" mc:PreserveAttributes="mv:*">
+  <p:cSld>
+    <p:spTree>
+      <p:nvGrpSpPr>
+        <p:cNvPr id="1" name=""/>
+        <p:cNvGrpSpPr/>
+        <p:nvPr/>
+      </p:nvGrpSpPr>
+      <p:grpSpPr>
+        <a:xfrm>
+          <a:off x="0" y="0"/>
+          <a:ext cx="0" cy="0"/>
+          <a:chOff x="0" y="0"/>
+          <a:chExt cx="0" cy="0"/>
+        </a:xfrm>
+      </p:grpSpPr>
+      <p:sp>
+        <p:nvSpPr>
+          <p:cNvPr id="2" name="Title 1"/>
+          <p:cNvSpPr>
+            <a:spLocks noGrp="1"/>
+          </p:cNvSpPr>
+          <p:nvPr>
+            <p:ph type="title"/>
+          </p:nvPr>
+        </p:nvSpPr>
+        <p:spPr/>
+        <p:txBody>
+          <a:bodyPr/>
+          <a:lstStyle/>
+          <a:p>
+            <a:r>
+              <a:rPr lang="en-US" dirty="0" smtClean="0"/>
+              <a:t>Performance Goal</a:t>
+            </a:r>
+            <a:endParaRPr lang="en-US" dirty="0"/>
+          </a:p>
+        </p:txBody>
+      </p:sp>
+      <p:graphicFrame>
+        <p:nvGraphicFramePr>
+          <p:cNvPr id="5" name="Content Placeholder 4"/>
+          <p:cNvGraphicFramePr>
+            <a:graphicFrameLocks noGrp="1"/>
+          </p:cNvGraphicFramePr>
+          <p:nvPr>
+            <p:ph sz="half" idx="1"/>
+          </p:nvPr>
+        </p:nvGraphicFramePr>
+        <p:xfrm>
+          <a:off x="47036" y="1600200"/>
+          <a:ext cx="5091595" cy="4525963"/>
+        </p:xfrm>
+        <a:graphic>
+          <a:graphicData uri="http://schemas.openxmlformats.org/drawingml/2006/chart">
+            <c:chart xmlns:c="http://schemas.openxmlformats.org/drawingml/2006/chart" xmlns:r="http://schemas.openxmlformats.org/officeDocument/2006/relationships" r:id="rId3"/>
+          </a:graphicData>
+        </a:graphic>
+      </p:graphicFrame>
+      <p:graphicFrame>
+        <p:nvGraphicFramePr>
+          <p:cNvPr id="6" name="Content Placeholder 5"/>
+          <p:cNvGraphicFramePr>
+            <a:graphicFrameLocks noGrp="1"/>
+          </p:cNvGraphicFramePr>
+          <p:nvPr>
+            <p:ph sz="half" idx="2"/>
+          </p:nvPr>
+        </p:nvGraphicFramePr>
+        <p:xfrm>
+          <a:off x="4962247" y="1600200"/>
+          <a:ext cx="4068573" cy="4525963"/>
+        </p:xfrm>
+        <a:graphic>
+          <a:graphicData uri="http://schemas.openxmlformats.org/drawingml/2006/chart">
+            <c:chart xmlns:c="http://schemas.openxmlformats.org/drawingml/2006/chart" xmlns:r="http://schemas.openxmlformats.org/officeDocument/2006/relationships" r:id="rId4"/>
+          </a:graphicData>
+        </a:graphic>
+      </p:graphicFrame>
+      <p:sp>
+        <p:nvSpPr>
+          <p:cNvPr id="18" name="Freeform 17"/>
+          <p:cNvSpPr/>
+          <p:nvPr/>
+        </p:nvSpPr>
+        <p:spPr>
+          <a:xfrm>
+            <a:off x="1046540" y="2657365"/>
+            <a:ext cx="2763338" cy="2624050"/>
+          </a:xfrm>
+          <a:custGeom>
+            <a:avLst/>
+            <a:gdLst>
+              <a:gd name="connsiteX0" fmla="*/ 0 w 2763338"/>
+              <a:gd name="connsiteY0" fmla="*/ 0 h 2624050"/>
+              <a:gd name="connsiteX1" fmla="*/ 58795 w 2763338"/>
+              <a:gd name="connsiteY1" fmla="*/ 1681430 h 2624050"/>
+              <a:gd name="connsiteX2" fmla="*/ 282214 w 2763338"/>
+              <a:gd name="connsiteY2" fmla="*/ 2304617 h 2624050"/>
+              <a:gd name="connsiteX3" fmla="*/ 1081817 w 2763338"/>
+              <a:gd name="connsiteY3" fmla="*/ 2575057 h 2624050"/>
+              <a:gd name="connsiteX4" fmla="*/ 2763338 w 2763338"/>
+              <a:gd name="connsiteY4" fmla="*/ 2598573 h 2624050"/>
+            </a:gdLst>
+            <a:ahLst/>
+            <a:cxnLst>
+              <a:cxn ang="0">
+                <a:pos x="connsiteX0" y="connsiteY0"/>
+              </a:cxn>
+              <a:cxn ang="0">
+                <a:pos x="connsiteX1" y="connsiteY1"/>
+              </a:cxn>
+              <a:cxn ang="0">
+                <a:pos x="connsiteX2" y="connsiteY2"/>
+              </a:cxn>
+              <a:cxn ang="0">
+                <a:pos x="connsiteX3" y="connsiteY3"/>
+              </a:cxn>
+              <a:cxn ang="0">
+                <a:pos x="connsiteX4" y="connsiteY4"/>
+              </a:cxn>
+            </a:cxnLst>
+            <a:rect l="l" t="t" r="r" b="b"/>
+            <a:pathLst>
+              <a:path w="2763338" h="2624050">
+                <a:moveTo>
+                  <a:pt x="0" y="0"/>
+                </a:moveTo>
+                <a:cubicBezTo>
+                  <a:pt x="5879" y="648663"/>
+                  <a:pt x="11759" y="1297327"/>
+                  <a:pt x="58795" y="1681430"/>
+                </a:cubicBezTo>
+                <a:cubicBezTo>
+                  <a:pt x="105831" y="2065533"/>
+                  <a:pt x="111710" y="2155679"/>
+                  <a:pt x="282214" y="2304617"/>
+                </a:cubicBezTo>
+                <a:cubicBezTo>
+                  <a:pt x="452718" y="2453555"/>
+                  <a:pt x="668296" y="2526064"/>
+                  <a:pt x="1081817" y="2575057"/>
+                </a:cubicBezTo>
+                <a:cubicBezTo>
+                  <a:pt x="1495338" y="2624050"/>
+                  <a:pt x="2763338" y="2598573"/>
+                  <a:pt x="2763338" y="2598573"/>
+                </a:cubicBezTo>
+              </a:path>
+            </a:pathLst>
+          </a:custGeom>
+          <a:ln>
+            <a:solidFill>
+              <a:schemeClr val="accent6"/>
+            </a:solidFill>
+          </a:ln>
+        </p:spPr>
+        <p:style>
+          <a:lnRef idx="2">
+            <a:schemeClr val="accent1"/>
+          </a:lnRef>
+          <a:fillRef idx="0">
+            <a:schemeClr val="accent1"/>
+          </a:fillRef>
+          <a:effectRef idx="1">
+            <a:schemeClr val="accent1"/>
+          </a:effectRef>
+          <a:fontRef idx="minor">
+            <a:schemeClr val="tx1"/>
+          </a:fontRef>
+        </p:style>
+        <p:txBody>
+          <a:bodyPr rtlCol="0" anchor="ctr"/>
+          <a:lstStyle/>
+          <a:p>
+            <a:pPr algn="ctr"/>
+            <a:endParaRPr lang="en-US"/>
+          </a:p>
+        </p:txBody>
+      </p:sp>
+      <p:sp>
+        <p:nvSpPr>
+          <p:cNvPr id="19" name="Freeform 18"/>
+          <p:cNvSpPr/>
+          <p:nvPr/>
+        </p:nvSpPr>
+        <p:spPr>
+          <a:xfrm>
+            <a:off x="5985271" y="2457474"/>
+            <a:ext cx="2798613" cy="2598574"/>
+          </a:xfrm>
+          <a:custGeom>
+            <a:avLst/>
+            <a:gdLst>
+              <a:gd name="connsiteX0" fmla="*/ 0 w 2798613"/>
+              <a:gd name="connsiteY0" fmla="*/ 2598574 h 2598574"/>
+              <a:gd name="connsiteX1" fmla="*/ 141106 w 2798613"/>
+              <a:gd name="connsiteY1" fmla="*/ 999452 h 2598574"/>
+              <a:gd name="connsiteX2" fmla="*/ 787845 w 2798613"/>
+              <a:gd name="connsiteY2" fmla="*/ 188133 h 2598574"/>
+              <a:gd name="connsiteX3" fmla="*/ 2798613 w 2798613"/>
+              <a:gd name="connsiteY3" fmla="*/ 0 h 2598574"/>
+            </a:gdLst>
+            <a:ahLst/>
+            <a:cxnLst>
+              <a:cxn ang="0">
+                <a:pos x="connsiteX0" y="connsiteY0"/>
+              </a:cxn>
+              <a:cxn ang="0">
+                <a:pos x="connsiteX1" y="connsiteY1"/>
+              </a:cxn>
+              <a:cxn ang="0">
+                <a:pos x="connsiteX2" y="connsiteY2"/>
+              </a:cxn>
+              <a:cxn ang="0">
+                <a:pos x="connsiteX3" y="connsiteY3"/>
+              </a:cxn>
+            </a:cxnLst>
+            <a:rect l="l" t="t" r="r" b="b"/>
+            <a:pathLst>
+              <a:path w="2798613" h="2598574">
+                <a:moveTo>
+                  <a:pt x="0" y="2598574"/>
+                </a:moveTo>
+                <a:cubicBezTo>
+                  <a:pt x="4899" y="1999883"/>
+                  <a:pt x="9798" y="1401192"/>
+                  <a:pt x="141106" y="999452"/>
+                </a:cubicBezTo>
+                <a:cubicBezTo>
+                  <a:pt x="272414" y="597712"/>
+                  <a:pt x="344927" y="354708"/>
+                  <a:pt x="787845" y="188133"/>
+                </a:cubicBezTo>
+                <a:cubicBezTo>
+                  <a:pt x="1230763" y="21558"/>
+                  <a:pt x="2351776" y="11758"/>
+                  <a:pt x="2798613" y="0"/>
+                </a:cubicBezTo>
+              </a:path>
+            </a:pathLst>
+          </a:custGeom>
+          <a:ln>
+            <a:solidFill>
+              <a:srgbClr val="F79646"/>
+            </a:solidFill>
+          </a:ln>
+        </p:spPr>
+        <p:style>
+          <a:lnRef idx="2">
+            <a:schemeClr val="accent1"/>
+          </a:lnRef>
+          <a:fillRef idx="0">
+            <a:schemeClr val="accent1"/>
+          </a:fillRef>
+          <a:effectRef idx="1">
+            <a:schemeClr val="accent1"/>
+          </a:effectRef>
+          <a:fontRef idx="minor">
+            <a:schemeClr val="tx1"/>
+          </a:fontRef>
+        </p:style>
+        <p:txBody>
+          <a:bodyPr rtlCol="0" anchor="ctr"/>
+          <a:lstStyle/>
+          <a:p>
+            <a:pPr algn="ctr"/>
+            <a:endParaRPr lang="en-US"/>
+          </a:p>
+        </p:txBody>
+      </p:sp>
+      <p:grpSp>
+        <p:nvGrpSpPr>
+          <p:cNvPr id="3" name="Group 23"/>
+          <p:cNvGrpSpPr/>
+          <p:nvPr/>
+        </p:nvGrpSpPr>
+        <p:grpSpPr>
+          <a:xfrm>
+            <a:off x="4209687" y="6079131"/>
+            <a:ext cx="1316995" cy="369332"/>
+            <a:chOff x="3433593" y="6126163"/>
+            <a:chExt cx="1316995" cy="369332"/>
+          </a:xfrm>
+        </p:grpSpPr>
+        <p:sp>
+          <p:nvSpPr>
+            <p:cNvPr id="20" name="TextBox 19"/>
+            <p:cNvSpPr txBox="1"/>
+            <p:nvPr/>
+          </p:nvSpPr>
+          <p:spPr>
+            <a:xfrm>
+              <a:off x="4068573" y="6126163"/>
+              <a:ext cx="682015" cy="369332"/>
+            </a:xfrm>
+            <a:prstGeom prst="rect">
+              <a:avLst/>
+            </a:prstGeom>
+            <a:noFill/>
+          </p:spPr>
+          <p:txBody>
+            <a:bodyPr wrap="square" rtlCol="0">
+              <a:spAutoFit/>
+            </a:bodyPr>
+            <a:lstStyle/>
+            <a:p>
+              <a:r>
+                <a:rPr lang="en-US" dirty="0" smtClean="0"/>
+                <a:t>Goal</a:t>
+              </a:r>
+              <a:endParaRPr lang="en-US" dirty="0"/>
+            </a:p>
+          </p:txBody>
+        </p:sp>
+        <p:cxnSp>
+          <p:nvCxnSpPr>
+            <p:cNvPr id="22" name="Straight Connector 21"/>
+            <p:cNvCxnSpPr/>
+            <p:nvPr/>
+          </p:nvCxnSpPr>
+          <p:spPr>
+            <a:xfrm>
+              <a:off x="3433593" y="6337697"/>
+              <a:ext cx="634980" cy="1588"/>
+            </a:xfrm>
+            <a:prstGeom prst="line">
+              <a:avLst/>
+            </a:prstGeom>
+            <a:ln>
+              <a:solidFill>
+                <a:srgbClr val="F79646"/>
+              </a:solidFill>
+            </a:ln>
+          </p:spPr>
+          <p:style>
+            <a:lnRef idx="2">
+              <a:schemeClr val="accent1"/>
+            </a:lnRef>
+            <a:fillRef idx="0">
+              <a:schemeClr val="accent1"/>
+            </a:fillRef>
+            <a:effectRef idx="1">
+              <a:schemeClr val="accent1"/>
+            </a:effectRef>
+            <a:fontRef idx="minor">
+              <a:schemeClr val="tx1"/>
+            </a:fontRef>
+          </p:style>
+        </p:cxnSp>
+      </p:grpSp>
+    </p:spTree>
+  </p:cSld>
+  <p:clrMapOvr>
+    <a:masterClrMapping/>
+  </p:clrMapOvr>
+  <p:timing>
+    <p:tnLst>
+      <p:par>
+        <p:cTn id="1" dur="indefinite" restart="never" nodeType="tmRoot">
+          <p:childTnLst>
+            <p:seq concurrent="1" nextAc="seek">
+              <p:cTn id="2" dur="indefinite" nodeType="mainSeq">
+                <p:childTnLst>
+                  <p:par>
+                    <p:cTn id="3" fill="hold">
+                      <p:stCondLst>
+                        <p:cond delay="indefinite"/>
+                      </p:stCondLst>
+                      <p:childTnLst>
+                        <p:par>
+                          <p:cTn id="4" fill="hold">
+                            <p:stCondLst>
+                              <p:cond delay="0"/>
+                            </p:stCondLst>
+                            <p:childTnLst>
+                              <p:par>
+                                <p:cTn id="5" presetID="1" presetClass="entr" presetSubtype="0" fill="hold" grpId="0" nodeType="clickEffect">
+                                  <p:stCondLst>
+                                    <p:cond delay="0"/>
+                                  </p:stCondLst>
+                                  <p:childTnLst>
+                                    <p:set>
+                                      <p:cBhvr>
+                                        <p:cTn id="6" dur="1" fill="hold">
+                                          <p:stCondLst>
+                                            <p:cond delay="0"/>
+                                          </p:stCondLst>
+                                        </p:cTn>
+                                        <p:tgtEl>
+                                          <p:spTgt spid="18"/>
+                                        </p:tgtEl>
+                                        <p:attrNameLst>
+                                          <p:attrName>style.visibility</p:attrName>
+                                        </p:attrNameLst>
+                                      </p:cBhvr>
+                                      <p:to>
+                                        <p:strVal val="visible"/>
+                                      </p:to>
+                                    </p:set>
+                                  </p:childTnLst>
+                                </p:cTn>
+                              </p:par>
+                              <p:par>
+                                <p:cTn id="7" presetID="1" presetClass="entr" presetSubtype="0" fill="hold" grpId="0" nodeType="withEffect">
+                                  <p:stCondLst>
+                                    <p:cond delay="0"/>
+                                  </p:stCondLst>
+                                  <p:childTnLst>
+                                    <p:set>
+                                      <p:cBhvr>
+                                        <p:cTn id="8" dur="1" fill="hold">
+                                          <p:stCondLst>
+                                            <p:cond delay="0"/>
+                                          </p:stCondLst>
+                                        </p:cTn>
+                                        <p:tgtEl>
+                                          <p:spTgt spid="19"/>
+                                        </p:tgtEl>
+                                        <p:attrNameLst>
+                                          <p:attrName>style.visibility</p:attrName>
+                                        </p:attrNameLst>
+                                      </p:cBhvr>
+                                      <p:to>
+                                        <p:strVal val="visible"/>
+                                      </p:to>
+                                    </p:set>
+                                  </p:childTnLst>
+                                </p:cTn>
+                              </p:par>
+                              <p:par>
+                                <p:cTn id="9" presetID="1" presetClass="entr" presetSubtype="0" fill="hold" nodeType="withEffect">
+                                  <p:stCondLst>
+                                    <p:cond delay="0"/>
+                                  </p:stCondLst>
+                                  <p:childTnLst>
+                                    <p:set>
+                                      <p:cBhvr>
+                                        <p:cTn id="10" dur="1" fill="hold">
+                                          <p:stCondLst>
+                                            <p:cond delay="0"/>
+                                          </p:stCondLst>
+                                        </p:cTn>
+                                        <p:tgtEl>
+                                          <p:spTgt spid="3"/>
+                                        </p:tgtEl>
+                                        <p:attrNameLst>
+                                          <p:attrName>style.visibility</p:attrName>
+                                        </p:attrNameLst>
+                                      </p:cBhvr>
+                                      <p:to>
+                                        <p:strVal val="visible"/>
+                                      </p:to>
+                                    </p:set>
+                                  </p:childTnLst>
+                                </p:cTn>
+                              </p:par>
+                            </p:childTnLst>
+                          </p:cTn>
+                        </p:par>
+                      </p:childTnLst>
+                    </p:cTn>
+                  </p:par>
+                </p:childTnLst>
+              </p:cTn>
+              <p:prevCondLst>
+                <p:cond evt="onPrev" delay="0">
+                  <p:tgtEl>
+                    <p:sldTgt/>
+                  </p:tgtEl>
+                </p:cond>
+              </p:prevCondLst>
+              <p:nextCondLst>
+                <p:cond evt="onNext" delay="0">
+                  <p:tgtEl>
+                    <p:sldTgt/>
+                  </p:tgtEl>
+                </p:cond>
+              </p:nextCondLst>
+            </p:seq>
+          </p:childTnLst>
+        </p:cTn>
+      </p:par>
+    </p:tnLst>
+    <p:bldLst>
+      <p:bldP spid="18" grpId="0" animBg="1"/>
+      <p:bldP spid="19" grpId="0" animBg="1"/>
+    </p:bldLst>
+  </p:timing>
+</p:sld>
+</file>
+
+<file path=ppt/slides/slide4.xml><?xml version="1.0" encoding="utf-8"?>
+<p:sld xmlns:a="http://schemas.openxmlformats.org/drawingml/2006/main" xmlns:r="http://schemas.openxmlformats.org/officeDocument/2006/relationships" xmlns:mc="http://schemas.openxmlformats.org/markup-compatibility/2006" xmlns:mv="urn:schemas-microsoft-com:mac:vml" xmlns:p="http://schemas.openxmlformats.org/presentationml/2006/main" mc:Ignorable="mv" mc:PreserveAttributes="mv:*">
+  <p:cSld>
+    <p:spTree>
+      <p:nvGrpSpPr>
+        <p:cNvPr id="1" name=""/>
+        <p:cNvGrpSpPr/>
+        <p:nvPr/>
+      </p:nvGrpSpPr>
+      <p:grpSpPr>
+        <a:xfrm>
+          <a:off x="0" y="0"/>
+          <a:ext cx="0" cy="0"/>
+          <a:chOff x="0" y="0"/>
+          <a:chExt cx="0" cy="0"/>
+        </a:xfrm>
+      </p:grpSpPr>
+      <p:sp>
+        <p:nvSpPr>
+          <p:cNvPr id="2" name="Title 1"/>
+          <p:cNvSpPr>
+            <a:spLocks noGrp="1"/>
+          </p:cNvSpPr>
+          <p:nvPr>
+            <p:ph type="title"/>
+          </p:nvPr>
+        </p:nvSpPr>
+        <p:spPr/>
+        <p:txBody>
+          <a:bodyPr/>
+          <a:lstStyle/>
+          <a:p>
+            <a:r>
+              <a:rPr lang="en-US" dirty="0" smtClean="0"/>
+              <a:t>Computational Challenge</a:t>
+            </a:r>
+            <a:endParaRPr lang="en-US" dirty="0"/>
+          </a:p>
+        </p:txBody>
+      </p:sp>
+      <p:sp>
+        <p:nvSpPr>
+          <p:cNvPr id="3" name="Content Placeholder 2"/>
+          <p:cNvSpPr>
+            <a:spLocks noGrp="1"/>
+          </p:cNvSpPr>
+          <p:nvPr>
+            <p:ph idx="1"/>
+          </p:nvPr>
+        </p:nvSpPr>
+        <p:spPr>
+          <a:xfrm>
+            <a:off x="457200" y="1600200"/>
+            <a:ext cx="8305800" cy="4525963"/>
+          </a:xfrm>
+        </p:spPr>
+        <p:txBody>
+          <a:bodyPr>
+            <a:normAutofit lnSpcReduction="10000"/>
+          </a:bodyPr>
+          <a:lstStyle/>
+          <a:p>
+            <a:r>
+              <a:rPr lang="en-US" dirty="0" smtClean="0"/>
+              <a:t>Although the chemistry of sequencing is cheap, the </a:t>
+            </a:r>
+            <a:r>
+              <a:rPr lang="en-US" i="1" dirty="0" smtClean="0"/>
+              <a:t>processing </a:t>
+            </a:r>
+            <a:r>
+              <a:rPr lang="en-US" dirty="0" smtClean="0"/>
+              <a:t>needed on the resulting data is not</a:t>
+            </a:r>
+          </a:p>
+          <a:p>
+            <a:r>
+              <a:rPr lang="en-US" dirty="0" smtClean="0"/>
+              <a:t>Difficult algorithmic, systems, and ML problems to accurately </a:t>
+            </a:r>
+            <a:r>
+              <a:rPr lang="en-US" dirty="0"/>
+              <a:t>put together DNA </a:t>
+            </a:r>
+            <a:r>
+              <a:rPr lang="en-US" dirty="0" smtClean="0"/>
+              <a:t>“read” data</a:t>
+            </a:r>
+          </a:p>
+          <a:p>
+            <a:r>
+              <a:rPr lang="en-US" dirty="0" smtClean="0"/>
+              <a:t>Current pipelines take multiple days per genome and cost $1000’s in compute time</a:t>
+            </a:r>
+          </a:p>
+          <a:p>
+            <a:pPr lvl="1"/>
+            <a:r>
+              <a:rPr lang="en-US" dirty="0" smtClean="0"/>
+              <a:t>Problematic for both clinical use and scaling up</a:t>
+            </a:r>
+            <a:endParaRPr lang="en-US" dirty="0"/>
+          </a:p>
+        </p:txBody>
+      </p:sp>
+    </p:spTree>
+    <p:extLst>
+      <p:ext uri="{BB962C8B-B14F-4D97-AF65-F5344CB8AC3E}">
+        <p14:creationId xmlns="" xmlns:a="http://schemas.openxmlformats.org/drawingml/2006/main" xmlns:r="http://schemas.openxmlformats.org/officeDocument/2006/relationships" xmlns:p="http://schemas.openxmlformats.org/presentationml/2006/main" xmlns:p14="http://schemas.microsoft.com/office/powerpoint/2010/main" xmlns:mv="urn:schemas-microsoft-com:mac:vml" xmlns:mc="http://schemas.openxmlformats.org/markup-compatibility/2006" val="585510965"/>
+      </p:ext>
+    </p:extLst>
+  </p:cSld>
+  <p:clrMapOvr>
+    <a:masterClrMapping/>
+  </p:clrMapOvr>
+  <p:timing>
+    <p:tnLst>
+      <p:par>
+        <p:cTn id="1" dur="indefinite" restart="never" nodeType="tmRoot"/>
+      </p:par>
+    </p:tnLst>
+  </p:timing>
+</p:sld>
+</file>
+
+<file path=ppt/slides/slide40.xml><?xml version="1.0" encoding="utf-8"?>
 <p:sld xmlns:a="http://schemas.openxmlformats.org/drawingml/2006/main" xmlns:r="http://schemas.openxmlformats.org/officeDocument/2006/relationships" xmlns:mc="http://schemas.openxmlformats.org/markup-compatibility/2006" xmlns:mv="urn:schemas-microsoft-com:mac:vml" xmlns:p="http://schemas.openxmlformats.org/presentationml/2006/main" mc:Ignorable="mv" mc:PreserveAttributes="mv:*">
   <p:cSld>
     <p:spTree>
@@ -24180,7 +25440,7 @@
                       <a:pPr algn="ctr"/>
                       <a:r>
                         <a:rPr lang="en-US" sz="3000" dirty="0" smtClean="0"/>
-                        <a:t>37%</a:t>
+                        <a:t>1</a:t>
                       </a:r>
                       <a:endParaRPr lang="en-US" sz="3000" dirty="0"/>
                     </a:p>
@@ -24235,7 +25495,7 @@
                       <a:pPr algn="ctr"/>
                       <a:r>
                         <a:rPr lang="en-US" sz="3000" dirty="0" smtClean="0"/>
-                        <a:t>24%</a:t>
+                        <a:t>1.1</a:t>
                       </a:r>
                       <a:endParaRPr lang="en-US" sz="3000" dirty="0"/>
                     </a:p>
@@ -24294,7 +25554,7 @@
                       <a:pPr algn="ctr"/>
                       <a:r>
                         <a:rPr lang="en-US" sz="3000" dirty="0" smtClean="0"/>
-                        <a:t>-</a:t>
+                        <a:t>1.4</a:t>
                       </a:r>
                       <a:endParaRPr lang="en-US" sz="3000" dirty="0"/>
                     </a:p>
@@ -24342,228 +25602,6 @@
               <a:t> reads with 2% differences</a:t>
             </a:r>
             <a:endParaRPr lang="en-US" sz="3200" dirty="0"/>
-          </a:p>
-        </p:txBody>
-      </p:sp>
-    </p:spTree>
-  </p:cSld>
-  <p:clrMapOvr>
-    <a:masterClrMapping/>
-  </p:clrMapOvr>
-</p:sld>
-</file>
-
-<file path=ppt/slides/slide4.xml><?xml version="1.0" encoding="utf-8"?>
-<p:sld xmlns:a="http://schemas.openxmlformats.org/drawingml/2006/main" xmlns:r="http://schemas.openxmlformats.org/officeDocument/2006/relationships" xmlns:mc="http://schemas.openxmlformats.org/markup-compatibility/2006" xmlns:mv="urn:schemas-microsoft-com:mac:vml" xmlns:p="http://schemas.openxmlformats.org/presentationml/2006/main" mc:Ignorable="mv" mc:PreserveAttributes="mv:*">
-  <p:cSld>
-    <p:spTree>
-      <p:nvGrpSpPr>
-        <p:cNvPr id="1" name=""/>
-        <p:cNvGrpSpPr/>
-        <p:nvPr/>
-      </p:nvGrpSpPr>
-      <p:grpSpPr>
-        <a:xfrm>
-          <a:off x="0" y="0"/>
-          <a:ext cx="0" cy="0"/>
-          <a:chOff x="0" y="0"/>
-          <a:chExt cx="0" cy="0"/>
-        </a:xfrm>
-      </p:grpSpPr>
-      <p:sp>
-        <p:nvSpPr>
-          <p:cNvPr id="2" name="Title 1"/>
-          <p:cNvSpPr>
-            <a:spLocks noGrp="1"/>
-          </p:cNvSpPr>
-          <p:nvPr>
-            <p:ph type="title"/>
-          </p:nvPr>
-        </p:nvSpPr>
-        <p:spPr/>
-        <p:txBody>
-          <a:bodyPr/>
-          <a:lstStyle/>
-          <a:p>
-            <a:r>
-              <a:rPr lang="en-US" dirty="0" smtClean="0"/>
-              <a:t>Computational Challenge</a:t>
-            </a:r>
-            <a:endParaRPr lang="en-US" dirty="0"/>
-          </a:p>
-        </p:txBody>
-      </p:sp>
-      <p:sp>
-        <p:nvSpPr>
-          <p:cNvPr id="3" name="Content Placeholder 2"/>
-          <p:cNvSpPr>
-            <a:spLocks noGrp="1"/>
-          </p:cNvSpPr>
-          <p:nvPr>
-            <p:ph idx="1"/>
-          </p:nvPr>
-        </p:nvSpPr>
-        <p:spPr>
-          <a:xfrm>
-            <a:off x="457200" y="1600200"/>
-            <a:ext cx="8305800" cy="4525963"/>
-          </a:xfrm>
-        </p:spPr>
-        <p:txBody>
-          <a:bodyPr>
-            <a:normAutofit lnSpcReduction="10000"/>
-          </a:bodyPr>
-          <a:lstStyle/>
-          <a:p>
-            <a:r>
-              <a:rPr lang="en-US" dirty="0" smtClean="0"/>
-              <a:t>Although the chemistry of sequencing is cheap, the </a:t>
-            </a:r>
-            <a:r>
-              <a:rPr lang="en-US" i="1" dirty="0" smtClean="0"/>
-              <a:t>processing </a:t>
-            </a:r>
-            <a:r>
-              <a:rPr lang="en-US" dirty="0" smtClean="0"/>
-              <a:t>needed on the resulting data is not</a:t>
-            </a:r>
-          </a:p>
-          <a:p>
-            <a:r>
-              <a:rPr lang="en-US" dirty="0" smtClean="0"/>
-              <a:t>Difficult algorithmic, systems, and ML problems to accurately </a:t>
-            </a:r>
-            <a:r>
-              <a:rPr lang="en-US" dirty="0"/>
-              <a:t>put together DNA </a:t>
-            </a:r>
-            <a:r>
-              <a:rPr lang="en-US" dirty="0" smtClean="0"/>
-              <a:t>“read” data</a:t>
-            </a:r>
-          </a:p>
-          <a:p>
-            <a:r>
-              <a:rPr lang="en-US" dirty="0" smtClean="0"/>
-              <a:t>Current pipelines take multiple days per genome and cost $1000’s in compute time</a:t>
-            </a:r>
-          </a:p>
-          <a:p>
-            <a:pPr lvl="1"/>
-            <a:r>
-              <a:rPr lang="en-US" dirty="0" smtClean="0"/>
-              <a:t>Problematic for both clinical use and scaling up</a:t>
-            </a:r>
-            <a:endParaRPr lang="en-US" dirty="0"/>
-          </a:p>
-        </p:txBody>
-      </p:sp>
-    </p:spTree>
-    <p:extLst>
-      <p:ext uri="{BB962C8B-B14F-4D97-AF65-F5344CB8AC3E}">
-        <p14:creationId xmlns="" xmlns:a="http://schemas.openxmlformats.org/drawingml/2006/main" xmlns:r="http://schemas.openxmlformats.org/officeDocument/2006/relationships" xmlns:p="http://schemas.openxmlformats.org/presentationml/2006/main" xmlns:p14="http://schemas.microsoft.com/office/powerpoint/2010/main" xmlns:mv="urn:schemas-microsoft-com:mac:vml" xmlns:mc="http://schemas.openxmlformats.org/markup-compatibility/2006" val="585510965"/>
-      </p:ext>
-    </p:extLst>
-  </p:cSld>
-  <p:clrMapOvr>
-    <a:masterClrMapping/>
-  </p:clrMapOvr>
-  <p:timing>
-    <p:tnLst>
-      <p:par>
-        <p:cTn id="1" dur="indefinite" restart="never" nodeType="tmRoot"/>
-      </p:par>
-    </p:tnLst>
-  </p:timing>
-</p:sld>
-</file>
-
-<file path=ppt/slides/slide40.xml><?xml version="1.0" encoding="utf-8"?>
-<p:sld xmlns:a="http://schemas.openxmlformats.org/drawingml/2006/main" xmlns:r="http://schemas.openxmlformats.org/officeDocument/2006/relationships" xmlns:mc="http://schemas.openxmlformats.org/markup-compatibility/2006" xmlns:mv="urn:schemas-microsoft-com:mac:vml" xmlns:p="http://schemas.openxmlformats.org/presentationml/2006/main" mc:Ignorable="mv" mc:PreserveAttributes="mv:*">
-  <p:cSld>
-    <p:spTree>
-      <p:nvGrpSpPr>
-        <p:cNvPr id="1" name=""/>
-        <p:cNvGrpSpPr/>
-        <p:nvPr/>
-      </p:nvGrpSpPr>
-      <p:grpSpPr>
-        <a:xfrm>
-          <a:off x="0" y="0"/>
-          <a:ext cx="0" cy="0"/>
-          <a:chOff x="0" y="0"/>
-          <a:chExt cx="0" cy="0"/>
-        </a:xfrm>
-      </p:grpSpPr>
-      <p:sp>
-        <p:nvSpPr>
-          <p:cNvPr id="2" name="Title 1"/>
-          <p:cNvSpPr>
-            <a:spLocks noGrp="1"/>
-          </p:cNvSpPr>
-          <p:nvPr>
-            <p:ph type="title"/>
-          </p:nvPr>
-        </p:nvSpPr>
-        <p:spPr/>
-        <p:txBody>
-          <a:bodyPr/>
-          <a:lstStyle/>
-          <a:p>
-            <a:r>
-              <a:rPr lang="en-US" dirty="0" smtClean="0"/>
-              <a:t>Ideas for Improvement</a:t>
-            </a:r>
-            <a:endParaRPr lang="en-US" dirty="0"/>
-          </a:p>
-        </p:txBody>
-      </p:sp>
-      <p:sp>
-        <p:nvSpPr>
-          <p:cNvPr id="3" name="Content Placeholder 2"/>
-          <p:cNvSpPr>
-            <a:spLocks noGrp="1"/>
-          </p:cNvSpPr>
-          <p:nvPr>
-            <p:ph idx="1"/>
-          </p:nvPr>
-        </p:nvSpPr>
-        <p:spPr/>
-        <p:txBody>
-          <a:bodyPr>
-            <a:normAutofit/>
-          </a:bodyPr>
-          <a:lstStyle/>
-          <a:p>
-            <a:r>
-              <a:rPr lang="en-US" dirty="0" smtClean="0"/>
-              <a:t>Through profiling, we observed that about half of the time is spent in bookkeeping (e.g., determining whether a point is in a cluster)</a:t>
-            </a:r>
-          </a:p>
-          <a:p>
-            <a:r>
-              <a:rPr lang="en-US" dirty="0" smtClean="0"/>
-              <a:t>Involves lots of cache misses</a:t>
-            </a:r>
-          </a:p>
-          <a:p>
-            <a:r>
-              <a:rPr lang="en-US" dirty="0" smtClean="0"/>
-              <a:t>Idea: </a:t>
-            </a:r>
-            <a:r>
-              <a:rPr lang="en-US" dirty="0" smtClean="0"/>
-              <a:t> Improve memory access pattern by optimizing </a:t>
-            </a:r>
-            <a:r>
-              <a:rPr lang="en-US" dirty="0" smtClean="0"/>
-              <a:t>index to co-locate information about cluster membership with</a:t>
-            </a:r>
-            <a:r>
-              <a:rPr lang="en-US" dirty="0" smtClean="0"/>
-              <a:t> seed position</a:t>
-            </a:r>
-            <a:endParaRPr lang="en-US" dirty="0" smtClean="0"/>
           </a:p>
         </p:txBody>
       </p:sp>
@@ -24609,7 +25647,7 @@
           <a:p>
             <a:r>
               <a:rPr lang="en-US" dirty="0" smtClean="0"/>
-              <a:t>Outline</a:t>
+              <a:t>Ideas for Improvement</a:t>
             </a:r>
             <a:endParaRPr lang="en-US" dirty="0"/>
           </a:p>
@@ -24627,47 +25665,27 @@
         </p:nvSpPr>
         <p:spPr/>
         <p:txBody>
-          <a:bodyPr/>
+          <a:bodyPr>
+            <a:normAutofit/>
+          </a:bodyPr>
           <a:lstStyle/>
           <a:p>
             <a:r>
               <a:rPr lang="en-US" dirty="0" smtClean="0"/>
-              <a:t>Motivation</a:t>
+              <a:t>Through profiling, we observed that about half of the time is spent in bookkeeping (e.g., determining whether a point is in a cluster)</a:t>
             </a:r>
           </a:p>
           <a:p>
             <a:r>
               <a:rPr lang="en-US" dirty="0" smtClean="0"/>
-              <a:t>SNAP, a new alignment algorithm</a:t>
+              <a:t>Involves lots of cache misses</a:t>
             </a:r>
           </a:p>
           <a:p>
             <a:r>
               <a:rPr lang="en-US" dirty="0" smtClean="0"/>
-              <a:t>Problem:  Similarity</a:t>
-            </a:r>
-          </a:p>
-          <a:p>
-            <a:r>
-              <a:rPr lang="en-US" dirty="0" smtClean="0"/>
-              <a:t>Exploiting similarity in alignment</a:t>
-            </a:r>
-          </a:p>
-          <a:p>
-            <a:r>
-              <a:rPr lang="en-US" dirty="0" smtClean="0">
-                <a:solidFill>
-                  <a:srgbClr val="3366FF"/>
-                </a:solidFill>
-              </a:rPr>
-              <a:t>Exploiting similarity in next processing steps</a:t>
-            </a:r>
-          </a:p>
-          <a:p>
-            <a:endParaRPr lang="en-US" dirty="0" smtClean="0"/>
-          </a:p>
-          <a:p>
-            <a:endParaRPr lang="en-US" dirty="0"/>
+              <a:t>Idea:  Improve memory access pattern by optimizing index to co-locate information about cluster membership with seed position</a:t>
+            </a:r>
           </a:p>
         </p:txBody>
       </p:sp>
@@ -24713,7 +25731,7 @@
           <a:p>
             <a:r>
               <a:rPr lang="en-US" dirty="0" smtClean="0"/>
-              <a:t>MAPQ</a:t>
+              <a:t>Outline</a:t>
             </a:r>
             <a:endParaRPr lang="en-US" dirty="0"/>
           </a:p>
@@ -24736,32 +25754,42 @@
           <a:p>
             <a:r>
               <a:rPr lang="en-US" dirty="0" smtClean="0"/>
-              <a:t>Current MAPQ values are questionable; however, variant calling tools rely on them</a:t>
+              <a:t>Motivation</a:t>
             </a:r>
           </a:p>
           <a:p>
             <a:r>
               <a:rPr lang="en-US" dirty="0" smtClean="0"/>
-              <a:t>Can </a:t>
-            </a:r>
+              <a:t>SNAP, a new alignment algorithm</a:t>
+            </a:r>
+          </a:p>
+          <a:p>
             <a:r>
               <a:rPr lang="en-US" dirty="0" smtClean="0"/>
-              <a:t>we make reliable MAPQ values that require less recalibration?</a:t>
+              <a:t>Problem:  Similarity</a:t>
             </a:r>
           </a:p>
           <a:p>
             <a:r>
               <a:rPr lang="en-US" dirty="0" smtClean="0"/>
-              <a:t>Use </a:t>
-            </a:r>
-            <a:r>
-              <a:rPr lang="en-US" dirty="0" smtClean="0"/>
-              <a:t>cluster information to make more meaningful MAPQ </a:t>
-            </a:r>
-            <a:r>
-              <a:rPr lang="en-US" dirty="0" smtClean="0"/>
-              <a:t>values [H.Li08], [Lunter11]</a:t>
-            </a:r>
+              <a:t>Exploiting similarity in alignment</a:t>
+            </a:r>
+          </a:p>
+          <a:p>
+            <a:r>
+              <a:rPr lang="en-US" dirty="0" smtClean="0">
+                <a:solidFill>
+                  <a:srgbClr val="3366FF"/>
+                </a:solidFill>
+              </a:rPr>
+              <a:t>Exploiting similarity in next processing steps</a:t>
+            </a:r>
+          </a:p>
+          <a:p>
+            <a:endParaRPr lang="en-US" dirty="0" smtClean="0"/>
+          </a:p>
+          <a:p>
+            <a:endParaRPr lang="en-US" dirty="0"/>
           </a:p>
         </p:txBody>
       </p:sp>
@@ -24770,6 +25798,13 @@
   <p:clrMapOvr>
     <a:masterClrMapping/>
   </p:clrMapOvr>
+  <p:timing>
+    <p:tnLst>
+      <p:par>
+        <p:cTn id="1" dur="indefinite" restart="never" nodeType="tmRoot"/>
+      </p:par>
+    </p:tnLst>
+  </p:timing>
 </p:sld>
 </file>
 
@@ -24807,7 +25842,7 @@
           <a:p>
             <a:r>
               <a:rPr lang="en-US" dirty="0" smtClean="0"/>
-              <a:t>Impact on Pipeline</a:t>
+              <a:t>MAPQ</a:t>
             </a:r>
             <a:endParaRPr lang="en-US" dirty="0"/>
           </a:p>
@@ -24830,35 +25865,20 @@
           <a:p>
             <a:r>
               <a:rPr lang="en-US" dirty="0" smtClean="0"/>
-              <a:t>Investigate </a:t>
-            </a:r>
+              <a:t>Current MAPQ values are questionable; however, variant calling tools rely on them</a:t>
+            </a:r>
+          </a:p>
+          <a:p>
             <a:r>
               <a:rPr lang="en-US" dirty="0" smtClean="0"/>
-              <a:t>how alignment errors are impacting pipeline as a whole</a:t>
+              <a:t>Can we make reliable MAPQ values that require less recalibration?</a:t>
             </a:r>
           </a:p>
           <a:p>
             <a:r>
               <a:rPr lang="en-US" dirty="0" smtClean="0"/>
-              <a:t>E.g., what fraction of spurious SNP calls are related to alignment errors? To alignment errors near similar regions?</a:t>
-            </a:r>
-          </a:p>
-          <a:p>
-            <a:r>
-              <a:rPr lang="en-US" dirty="0" smtClean="0"/>
-              <a:t>Can we decrease trio conflict rates by leveraging alignment improvement</a:t>
-            </a:r>
-            <a:r>
-              <a:rPr lang="en-US" dirty="0" smtClean="0"/>
-              <a:t>?</a:t>
-            </a:r>
-          </a:p>
-          <a:p>
-            <a:r>
-              <a:rPr lang="en-US" dirty="0" smtClean="0"/>
-              <a:t>Does this improve SV detection as well?</a:t>
-            </a:r>
-            <a:endParaRPr lang="en-US" dirty="0"/>
+              <a:t>Use cluster information to make more meaningful MAPQ values [H.Li08], [Lunter11]</a:t>
+            </a:r>
           </a:p>
         </p:txBody>
       </p:sp>
@@ -24904,7 +25924,7 @@
           <a:p>
             <a:r>
               <a:rPr lang="en-US" dirty="0" smtClean="0"/>
-              <a:t>Filtering</a:t>
+              <a:t>Impact on Pipeline</a:t>
             </a:r>
             <a:endParaRPr lang="en-US" dirty="0"/>
           </a:p>
@@ -24922,41 +25942,30 @@
         </p:nvSpPr>
         <p:spPr/>
         <p:txBody>
-          <a:bodyPr>
-            <a:normAutofit lnSpcReduction="10000"/>
-          </a:bodyPr>
+          <a:bodyPr/>
           <a:lstStyle/>
           <a:p>
             <a:r>
               <a:rPr lang="en-US" dirty="0" smtClean="0"/>
-              <a:t>Application:  given a set of reads, identify the species to which the read belongs</a:t>
-            </a:r>
-          </a:p>
-          <a:p>
-            <a:pPr lvl="1"/>
+              <a:t>Investigate how alignment errors are impacting pipeline as a whole</a:t>
+            </a:r>
+          </a:p>
+          <a:p>
             <a:r>
               <a:rPr lang="en-US" dirty="0" smtClean="0"/>
-              <a:t>Identify new pathogens in a patient’s sample (Charles Chiu, UCSF)</a:t>
-            </a:r>
-          </a:p>
-          <a:p>
-            <a:pPr lvl="1"/>
+              <a:t>E.g., what fraction of spurious SNP calls are related to alignment errors? To alignment errors near similar regions?</a:t>
+            </a:r>
+          </a:p>
+          <a:p>
             <a:r>
               <a:rPr lang="en-US" dirty="0" smtClean="0"/>
-              <a:t>Recognize contamination when sequencing a patient’s sample</a:t>
-            </a:r>
-          </a:p>
-          <a:p>
-            <a:pPr lvl="1"/>
+              <a:t>Can we decrease trio conflict rates by leveraging alignment improvement?</a:t>
+            </a:r>
+          </a:p>
+          <a:p>
             <a:r>
               <a:rPr lang="en-US" dirty="0" smtClean="0"/>
-              <a:t>Support different versions of the reference genome for a given species [Nguyen]</a:t>
-            </a:r>
-          </a:p>
-          <a:p>
-            <a:r>
-              <a:rPr lang="en-US" dirty="0" smtClean="0"/>
-              <a:t>Potential for speedup over naïve SNAP filter using clusters</a:t>
+              <a:t>Does this improve SV detection as well?</a:t>
             </a:r>
             <a:endParaRPr lang="en-US" dirty="0"/>
           </a:p>
@@ -25004,7 +26013,7 @@
           <a:p>
             <a:r>
               <a:rPr lang="en-US" dirty="0" smtClean="0"/>
-              <a:t>Research Timeline</a:t>
+              <a:t>Filtering</a:t>
             </a:r>
             <a:endParaRPr lang="en-US" dirty="0"/>
           </a:p>
@@ -25023,96 +26032,42 @@
         <p:spPr/>
         <p:txBody>
           <a:bodyPr>
-            <a:normAutofit fontScale="70000" lnSpcReduction="20000"/>
+            <a:normAutofit lnSpcReduction="10000"/>
           </a:bodyPr>
           <a:lstStyle/>
           <a:p>
             <a:r>
               <a:rPr lang="en-US" dirty="0" smtClean="0"/>
-              <a:t>Spring 2013</a:t>
+              <a:t>Application:  given a set of reads, identify the species to which the read belongs</a:t>
             </a:r>
           </a:p>
           <a:p>
             <a:pPr lvl="1"/>
             <a:r>
               <a:rPr lang="en-US" dirty="0" smtClean="0"/>
-              <a:t>Cluster-informed MAPQ</a:t>
+              <a:t>Identify new pathogens in a patient’s sample (Charles Chiu, UCSF)</a:t>
             </a:r>
           </a:p>
           <a:p>
             <a:pPr lvl="1"/>
             <a:r>
               <a:rPr lang="en-US" dirty="0" smtClean="0"/>
-              <a:t>Submit SNAP paper</a:t>
-            </a:r>
-          </a:p>
-          <a:p>
+              <a:t>Recognize contamination when sequencing a patient’s sample</a:t>
+            </a:r>
+          </a:p>
+          <a:p>
+            <a:pPr lvl="1"/>
             <a:r>
               <a:rPr lang="en-US" dirty="0" smtClean="0"/>
-              <a:t>Summer 2013</a:t>
-            </a:r>
-          </a:p>
-          <a:p>
-            <a:pPr lvl="1"/>
+              <a:t>Support different versions of the reference genome for a given species [Nguyen]</a:t>
+            </a:r>
+          </a:p>
+          <a:p>
             <a:r>
               <a:rPr lang="en-US" dirty="0" smtClean="0"/>
-              <a:t>Improve memory access patterns of best-, all-matchers for enhanced </a:t>
-            </a:r>
-            <a:r>
-              <a:rPr lang="en-US" dirty="0" smtClean="0"/>
-              <a:t>speedup</a:t>
-            </a:r>
-          </a:p>
-          <a:p>
-            <a:pPr lvl="1"/>
-            <a:r>
-              <a:rPr lang="en-US" dirty="0" smtClean="0"/>
-              <a:t>Investigate </a:t>
-            </a:r>
-            <a:r>
-              <a:rPr lang="en-US" dirty="0" smtClean="0"/>
-              <a:t>filtering</a:t>
-            </a:r>
-          </a:p>
-          <a:p>
-            <a:pPr lvl="1"/>
-            <a:r>
-              <a:rPr lang="en-US" dirty="0" smtClean="0"/>
-              <a:t>Submit similarity-exploiting SNAP paper</a:t>
-            </a:r>
-          </a:p>
-          <a:p>
-            <a:r>
-              <a:rPr lang="en-US" dirty="0" smtClean="0"/>
-              <a:t>Fall 2013</a:t>
-            </a:r>
-          </a:p>
-          <a:p>
-            <a:pPr lvl="1"/>
-            <a:r>
-              <a:rPr lang="en-US" dirty="0" smtClean="0"/>
-              <a:t>Analyze how errors in alignment impact variant calling</a:t>
-            </a:r>
-          </a:p>
-          <a:p>
-            <a:pPr lvl="1"/>
-            <a:r>
-              <a:rPr lang="en-US" dirty="0" smtClean="0"/>
-              <a:t>Leverage alignment uncertainty to improve accuracy of variant calling</a:t>
-            </a:r>
-          </a:p>
-          <a:p>
-            <a:r>
-              <a:rPr lang="en-US" dirty="0" smtClean="0"/>
-              <a:t>Spring 2014</a:t>
-            </a:r>
-          </a:p>
-          <a:p>
-            <a:pPr lvl="1"/>
-            <a:r>
-              <a:rPr lang="en-US" dirty="0" smtClean="0"/>
-              <a:t>File dissertation</a:t>
-            </a:r>
+              <a:t>Potential for speedup over naïve SNAP filter using clusters</a:t>
+            </a:r>
+            <a:endParaRPr lang="en-US" dirty="0"/>
           </a:p>
         </p:txBody>
       </p:sp>
@@ -25158,7 +26113,7 @@
           <a:p>
             <a:r>
               <a:rPr lang="en-US" dirty="0" smtClean="0"/>
-              <a:t>Conclusion</a:t>
+              <a:t>Research Timeline</a:t>
             </a:r>
             <a:endParaRPr lang="en-US" dirty="0"/>
           </a:p>
@@ -25176,26 +26131,89 @@
         </p:nvSpPr>
         <p:spPr/>
         <p:txBody>
-          <a:bodyPr/>
+          <a:bodyPr>
+            <a:normAutofit fontScale="70000" lnSpcReduction="20000"/>
+          </a:bodyPr>
           <a:lstStyle/>
           <a:p>
             <a:r>
               <a:rPr lang="en-US" dirty="0" smtClean="0"/>
-              <a:t>As short-read DNA sequence data proliferates, faster &amp; more accurate tools will be needed</a:t>
-            </a:r>
-          </a:p>
-          <a:p>
+              <a:t>Spring 2013</a:t>
+            </a:r>
+          </a:p>
+          <a:p>
+            <a:pPr lvl="1"/>
             <a:r>
               <a:rPr lang="en-US" dirty="0" smtClean="0"/>
-              <a:t>Leveraging prior knowledge about the genome’s structure leads to improved alignment performance (speed &amp; accuracy)</a:t>
-            </a:r>
-          </a:p>
-          <a:p>
+              <a:t>Cluster-informed MAPQ</a:t>
+            </a:r>
+          </a:p>
+          <a:p>
+            <a:pPr lvl="1"/>
             <a:r>
               <a:rPr lang="en-US" dirty="0" smtClean="0"/>
-              <a:t>These gains will improve subsequent variant calling, leading to better decisions</a:t>
-            </a:r>
-            <a:endParaRPr lang="en-US" dirty="0"/>
+              <a:t>Submit SNAP paper</a:t>
+            </a:r>
+          </a:p>
+          <a:p>
+            <a:r>
+              <a:rPr lang="en-US" dirty="0" smtClean="0"/>
+              <a:t>Summer 2013</a:t>
+            </a:r>
+          </a:p>
+          <a:p>
+            <a:pPr lvl="1"/>
+            <a:r>
+              <a:rPr lang="en-US" dirty="0" smtClean="0"/>
+              <a:t>Improve memory access patterns of best-, all-matchers for enhanced speedup</a:t>
+            </a:r>
+          </a:p>
+          <a:p>
+            <a:pPr lvl="1"/>
+            <a:r>
+              <a:rPr lang="en-US" dirty="0" smtClean="0"/>
+              <a:t>Investigate filtering</a:t>
+            </a:r>
+          </a:p>
+          <a:p>
+            <a:pPr lvl="1"/>
+            <a:r>
+              <a:rPr lang="en-US" dirty="0" smtClean="0"/>
+              <a:t>Submit similarity-exploiting SNAP paper</a:t>
+            </a:r>
+          </a:p>
+          <a:p>
+            <a:r>
+              <a:rPr lang="en-US" dirty="0" smtClean="0"/>
+              <a:t>Fall 2013</a:t>
+            </a:r>
+          </a:p>
+          <a:p>
+            <a:pPr lvl="1"/>
+            <a:r>
+              <a:rPr lang="en-US" dirty="0" smtClean="0"/>
+              <a:t>Analyze how errors in alignment impact variant calling</a:t>
+            </a:r>
+          </a:p>
+          <a:p>
+            <a:pPr lvl="1"/>
+            <a:r>
+              <a:rPr lang="en-US" dirty="0" smtClean="0"/>
+              <a:t>Leverage alignment uncertainty to improve accuracy of variant calling</a:t>
+            </a:r>
+          </a:p>
+          <a:p>
+            <a:r>
+              <a:rPr lang="en-US" dirty="0" smtClean="0"/>
+              <a:t>Spring 2014</a:t>
+            </a:r>
+          </a:p>
+          <a:p>
+            <a:pPr lvl="1"/>
+            <a:r>
+              <a:rPr lang="en-US" dirty="0" smtClean="0"/>
+              <a:t>File dissertation</a:t>
+            </a:r>
           </a:p>
         </p:txBody>
       </p:sp>
@@ -25241,7 +26259,7 @@
           <a:p>
             <a:r>
               <a:rPr lang="en-US" dirty="0" smtClean="0"/>
-              <a:t>References</a:t>
+              <a:t>Conclusion</a:t>
             </a:r>
             <a:endParaRPr lang="en-US" dirty="0"/>
           </a:p>
@@ -25259,298 +26277,26 @@
         </p:nvSpPr>
         <p:spPr/>
         <p:txBody>
-          <a:bodyPr>
-            <a:noAutofit/>
-          </a:bodyPr>
+          <a:bodyPr/>
           <a:lstStyle/>
           <a:p>
-            <a:pPr>
-              <a:buNone/>
-            </a:pPr>
-            <a:r>
-              <a:rPr lang="en-US" sz="1400" dirty="0" smtClean="0"/>
-              <a:t>[Agarwal94]  P. </a:t>
-            </a:r>
-            <a:r>
-              <a:rPr lang="en-US" sz="1400" dirty="0" err="1" smtClean="0"/>
-              <a:t>Agarwal</a:t>
-            </a:r>
-            <a:r>
-              <a:rPr lang="en-US" sz="1400" dirty="0" smtClean="0"/>
-              <a:t> and D. States.  The Repeat Pattern Toolkit (RPT):  Analyzing the Structure and Evolution of the C. </a:t>
-            </a:r>
-            <a:r>
-              <a:rPr lang="en-US" sz="1400" dirty="0" err="1" smtClean="0"/>
-              <a:t>elegans</a:t>
-            </a:r>
-            <a:r>
-              <a:rPr lang="en-US" sz="1400" dirty="0" smtClean="0"/>
-              <a:t> Genome.  In the Proceedings of the Second International Conference on Intelligent Systems for Molecular Biology (ISMB-94), AAAI Press, pp. 1-9.</a:t>
-            </a:r>
-            <a:endParaRPr lang="en-US" sz="1400" dirty="0" smtClean="0"/>
-          </a:p>
-          <a:p>
-            <a:pPr>
-              <a:buNone/>
-            </a:pPr>
-            <a:r>
-              <a:rPr lang="en-US" sz="1400" dirty="0" smtClean="0"/>
-              <a:t>[Alkan09]  C. </a:t>
-            </a:r>
-            <a:r>
-              <a:rPr lang="en-US" sz="1400" dirty="0" err="1" smtClean="0"/>
-              <a:t>Alkan</a:t>
-            </a:r>
-            <a:r>
-              <a:rPr lang="en-US" sz="1400" dirty="0" smtClean="0"/>
-              <a:t> et al.  Personalized copy number and segmental duplication maps using next-generation sequencing (</a:t>
-            </a:r>
-            <a:r>
-              <a:rPr lang="en-US" sz="1400" dirty="0" err="1" smtClean="0"/>
-              <a:t>mrFAST</a:t>
-            </a:r>
-            <a:r>
-              <a:rPr lang="en-US" sz="1400" dirty="0" smtClean="0"/>
-              <a:t>).  </a:t>
-            </a:r>
-            <a:r>
-              <a:rPr lang="en-US" sz="1400" i="1" dirty="0" smtClean="0"/>
-              <a:t>Nature Genetics</a:t>
-            </a:r>
-            <a:r>
-              <a:rPr lang="en-US" sz="1400" dirty="0" smtClean="0"/>
-              <a:t>, 41(10), 1061-1067.</a:t>
-            </a:r>
-          </a:p>
-          <a:p>
-            <a:pPr>
-              <a:buNone/>
-            </a:pPr>
-            <a:r>
-              <a:rPr lang="en-US" sz="1400" dirty="0" smtClean="0"/>
-              <a:t>[</a:t>
-            </a:r>
-            <a:r>
-              <a:rPr lang="en-US" sz="1400" dirty="0" smtClean="0"/>
-              <a:t>Bao02]  Z. </a:t>
-            </a:r>
-            <a:r>
-              <a:rPr lang="en-US" sz="1400" dirty="0" err="1" smtClean="0"/>
-              <a:t>Bao</a:t>
-            </a:r>
-            <a:r>
-              <a:rPr lang="en-US" sz="1400" dirty="0" smtClean="0"/>
-              <a:t> and S. Eddy.  Automated De Novo Identification of Repeat Sequence Families in Sequenced Genomes (RECON).  </a:t>
-            </a:r>
-            <a:r>
-              <a:rPr lang="en-US" sz="1400" i="1" dirty="0" smtClean="0"/>
-              <a:t>Genome Research</a:t>
-            </a:r>
-            <a:r>
-              <a:rPr lang="en-US" sz="1400" dirty="0" smtClean="0"/>
-              <a:t>, 12, 1269-1276.</a:t>
-            </a:r>
-            <a:endParaRPr lang="en-US" sz="1400" dirty="0" smtClean="0"/>
-          </a:p>
-          <a:p>
-            <a:pPr>
-              <a:buNone/>
-            </a:pPr>
-            <a:r>
-              <a:rPr lang="en-US" sz="1400" dirty="0" smtClean="0"/>
-              <a:t>[Cohen05]  I. Cohen et al.  Capturing, indexing, clustering, and retrieving system history.  In Proceedings of SOSP 2005, pp. 105-118.</a:t>
-            </a:r>
-            <a:endParaRPr lang="en-US" sz="1400" dirty="0" smtClean="0"/>
-          </a:p>
-          <a:p>
-            <a:pPr>
-              <a:buNone/>
-            </a:pPr>
-            <a:r>
-              <a:rPr lang="en-US" sz="1400" dirty="0" smtClean="0"/>
-              <a:t>[Hach10]  F. </a:t>
-            </a:r>
-            <a:r>
-              <a:rPr lang="en-US" sz="1400" dirty="0" err="1" smtClean="0"/>
-              <a:t>Hach</a:t>
-            </a:r>
-            <a:r>
-              <a:rPr lang="en-US" sz="1400" dirty="0" smtClean="0"/>
-              <a:t> et al.  </a:t>
-            </a:r>
-            <a:r>
-              <a:rPr lang="en-US" sz="1400" dirty="0" err="1" smtClean="0"/>
-              <a:t>mrsFAST</a:t>
-            </a:r>
-            <a:r>
-              <a:rPr lang="en-US" sz="1400" dirty="0" smtClean="0"/>
-              <a:t>:  a cache-oblivious algorithm for short-read mapping.  </a:t>
-            </a:r>
-            <a:r>
-              <a:rPr lang="en-US" sz="1400" i="1" dirty="0" smtClean="0"/>
-              <a:t>Nature Methods</a:t>
-            </a:r>
-            <a:r>
-              <a:rPr lang="en-US" sz="1400" dirty="0" smtClean="0"/>
-              <a:t>, 7(8), 576-577.</a:t>
-            </a:r>
-          </a:p>
-          <a:p>
-            <a:pPr>
-              <a:buNone/>
-            </a:pPr>
-            <a:r>
-              <a:rPr lang="en-US" sz="1400" dirty="0" smtClean="0"/>
-              <a:t>[Hormozdiari09]  F. </a:t>
-            </a:r>
-            <a:r>
-              <a:rPr lang="en-US" sz="1400" dirty="0" err="1" smtClean="0"/>
-              <a:t>Hormozdiari</a:t>
-            </a:r>
-            <a:r>
-              <a:rPr lang="en-US" sz="1400" dirty="0" smtClean="0"/>
-              <a:t>, C. </a:t>
-            </a:r>
-            <a:r>
-              <a:rPr lang="en-US" sz="1400" dirty="0" err="1" smtClean="0"/>
-              <a:t>Alkan</a:t>
-            </a:r>
-            <a:r>
-              <a:rPr lang="en-US" sz="1400" dirty="0" smtClean="0"/>
-              <a:t>, E. </a:t>
-            </a:r>
-            <a:r>
-              <a:rPr lang="en-US" sz="1400" dirty="0" err="1" smtClean="0"/>
-              <a:t>Eichler</a:t>
-            </a:r>
-            <a:r>
-              <a:rPr lang="en-US" sz="1400" dirty="0" smtClean="0"/>
-              <a:t>, and S. </a:t>
-            </a:r>
-            <a:r>
-              <a:rPr lang="en-US" sz="1400" dirty="0" err="1" smtClean="0"/>
-              <a:t>Sahinalp</a:t>
-            </a:r>
-            <a:r>
-              <a:rPr lang="en-US" sz="1400" dirty="0" smtClean="0"/>
-              <a:t>.  Combinatorial algorithms for structural variation detection in high-throughput sequenced genomes (</a:t>
-            </a:r>
-            <a:r>
-              <a:rPr lang="en-US" sz="1400" dirty="0" err="1" smtClean="0"/>
-              <a:t>VariationHunter</a:t>
-            </a:r>
-            <a:r>
-              <a:rPr lang="en-US" sz="1400" dirty="0" smtClean="0"/>
-              <a:t>).  </a:t>
-            </a:r>
-            <a:r>
-              <a:rPr lang="en-US" sz="1400" i="1" dirty="0" smtClean="0"/>
-              <a:t>Genome Research</a:t>
-            </a:r>
-            <a:r>
-              <a:rPr lang="en-US" sz="1400" dirty="0" smtClean="0"/>
-              <a:t>, 19, 1270-1278.</a:t>
-            </a:r>
-          </a:p>
-          <a:p>
-            <a:pPr>
-              <a:buNone/>
-            </a:pPr>
-            <a:r>
-              <a:rPr lang="en-US" sz="1400" dirty="0" smtClean="0"/>
-              <a:t>[</a:t>
-            </a:r>
-            <a:r>
-              <a:rPr lang="en-US" sz="1400" dirty="0" smtClean="0"/>
-              <a:t>Kurtz99]  S. Kurtz and C. Schleiermacher.  </a:t>
-            </a:r>
-            <a:r>
-              <a:rPr lang="en-US" sz="1400" dirty="0" err="1" smtClean="0"/>
-              <a:t>REPuter</a:t>
-            </a:r>
-            <a:r>
-              <a:rPr lang="en-US" sz="1400" dirty="0" smtClean="0"/>
-              <a:t>:  fast computation of maximal repeats in complete genomes.  </a:t>
-            </a:r>
-            <a:r>
-              <a:rPr lang="en-US" sz="1400" i="1" dirty="0" smtClean="0"/>
-              <a:t>Bioinformatics</a:t>
-            </a:r>
-            <a:r>
-              <a:rPr lang="en-US" sz="1400" dirty="0" smtClean="0"/>
-              <a:t>, 15(5), 426-427.</a:t>
-            </a:r>
-          </a:p>
-          <a:p>
-            <a:pPr>
-              <a:buNone/>
-            </a:pPr>
-            <a:r>
-              <a:rPr lang="en-US" sz="1400" dirty="0" smtClean="0"/>
-              <a:t>[</a:t>
-            </a:r>
-            <a:r>
-              <a:rPr lang="en-US" sz="1400" dirty="0" smtClean="0"/>
-              <a:t>Langmead12]  B. </a:t>
-            </a:r>
-            <a:r>
-              <a:rPr lang="en-US" sz="1400" dirty="0" err="1" smtClean="0"/>
-              <a:t>Langmead</a:t>
-            </a:r>
-            <a:r>
-              <a:rPr lang="en-US" sz="1400" dirty="0" smtClean="0"/>
-              <a:t> and S. </a:t>
-            </a:r>
-            <a:r>
-              <a:rPr lang="en-US" sz="1400" dirty="0" err="1" smtClean="0"/>
-              <a:t>Salzberg</a:t>
-            </a:r>
-            <a:r>
-              <a:rPr lang="en-US" sz="1400" dirty="0" smtClean="0"/>
-              <a:t>.  Fast gapped-read alignment with Bowtie 2.  </a:t>
-            </a:r>
-            <a:r>
-              <a:rPr lang="en-US" sz="1400" i="1" dirty="0" smtClean="0"/>
-              <a:t>Nature Methods</a:t>
-            </a:r>
-            <a:r>
-              <a:rPr lang="en-US" sz="1400" dirty="0" smtClean="0"/>
-              <a:t>, 9(4), 357-359</a:t>
-            </a:r>
-            <a:r>
-              <a:rPr lang="en-US" sz="1400" dirty="0" smtClean="0"/>
-              <a:t>.</a:t>
-            </a:r>
-          </a:p>
-          <a:p>
-            <a:pPr>
-              <a:buNone/>
-            </a:pPr>
-            <a:r>
-              <a:rPr lang="en-US" sz="1400" dirty="0" smtClean="0"/>
-              <a:t>[H.Li08]  H. Li, J. </a:t>
-            </a:r>
-            <a:r>
-              <a:rPr lang="en-US" sz="1400" dirty="0" err="1" smtClean="0"/>
-              <a:t>Ruan</a:t>
-            </a:r>
-            <a:r>
-              <a:rPr lang="en-US" sz="1400" dirty="0" smtClean="0"/>
-              <a:t>, and R. Durbin.  Mapping short DNA sequencing reads and calling variants using mapping quality scores (MAQ).  </a:t>
-            </a:r>
-            <a:r>
-              <a:rPr lang="en-US" sz="1400" i="1" dirty="0" smtClean="0"/>
-              <a:t>Genome Research</a:t>
-            </a:r>
-            <a:r>
-              <a:rPr lang="en-US" sz="1400" dirty="0" smtClean="0"/>
-              <a:t>, 18, 1851-1858</a:t>
-            </a:r>
-            <a:r>
-              <a:rPr lang="en-US" sz="1400" dirty="0" smtClean="0"/>
-              <a:t>.</a:t>
-            </a:r>
-            <a:endParaRPr lang="en-US" sz="1400" dirty="0" smtClean="0"/>
+            <a:r>
+              <a:rPr lang="en-US" dirty="0" smtClean="0"/>
+              <a:t>As short-read DNA sequence data proliferates, faster &amp; more accurate tools will be needed</a:t>
+            </a:r>
+          </a:p>
+          <a:p>
+            <a:r>
+              <a:rPr lang="en-US" dirty="0" smtClean="0"/>
+              <a:t>Leveraging prior knowledge about the genome’s structure leads to improved alignment performance (speed &amp; accuracy)</a:t>
+            </a:r>
+          </a:p>
+          <a:p>
+            <a:r>
+              <a:rPr lang="en-US" dirty="0" smtClean="0"/>
+              <a:t>These gains will improve subsequent variant calling, leading to better decisions</a:t>
+            </a:r>
+            <a:endParaRPr lang="en-US" dirty="0"/>
           </a:p>
         </p:txBody>
       </p:sp>
@@ -25615,7 +26361,7 @@
         <p:spPr/>
         <p:txBody>
           <a:bodyPr>
-            <a:normAutofit/>
+            <a:noAutofit/>
           </a:bodyPr>
           <a:lstStyle/>
           <a:p>
@@ -25624,19 +26370,23 @@
             </a:pPr>
             <a:r>
               <a:rPr lang="en-US" sz="1400" dirty="0" smtClean="0"/>
-              <a:t>[</a:t>
+              <a:t>[Agarwal94]  P. </a:t>
+            </a:r>
+            <a:r>
+              <a:rPr lang="en-US" sz="1400" dirty="0" err="1" smtClean="0"/>
+              <a:t>Agarwal</a:t>
             </a:r>
             <a:r>
               <a:rPr lang="en-US" sz="1400" dirty="0" smtClean="0"/>
-              <a:t>H.Li09]  H. Li and R. Durbin.  Fast and accurate short read alignment with Burrows-Wheeler transform.  </a:t>
-            </a:r>
-            <a:r>
-              <a:rPr lang="en-US" sz="1400" i="1" dirty="0" smtClean="0"/>
-              <a:t>Bioinformatics</a:t>
+              <a:t> and D. States.  The Repeat Pattern Toolkit (RPT):  Analyzing the Structure and Evolution of the C. </a:t>
+            </a:r>
+            <a:r>
+              <a:rPr lang="en-US" sz="1400" dirty="0" err="1" smtClean="0"/>
+              <a:t>elegans</a:t>
             </a:r>
             <a:r>
               <a:rPr lang="en-US" sz="1400" dirty="0" smtClean="0"/>
-              <a:t>, 25(14), 1754-1760.</a:t>
+              <a:t> Genome.  In the Proceedings of the Second International Conference on Intelligent Systems for Molecular Biology (ISMB-94), AAAI Press, pp. 1-9.</a:t>
             </a:r>
           </a:p>
           <a:p>
@@ -25645,25 +26395,32 @@
             </a:pPr>
             <a:r>
               <a:rPr lang="en-US" sz="1400" dirty="0" smtClean="0"/>
-              <a:t>[R.Li09]  R. Li, C. Yu, Y. Li, T. Lam, S. </a:t>
+              <a:t>[Alkan09]  C. </a:t>
             </a:r>
             <a:r>
               <a:rPr lang="en-US" sz="1400" dirty="0" err="1" smtClean="0"/>
-              <a:t>Yiu</a:t>
+              <a:t>Alkan</a:t>
             </a:r>
             <a:r>
               <a:rPr lang="en-US" sz="1400" dirty="0" smtClean="0"/>
-              <a:t>, K. Kristiansen, and J. Wang.  SOAP2:  an improved ultrafast tool for short read alignment.  </a:t>
+              <a:t> et al.  Personalized copy number and segmental duplication maps using next-generation sequencing (</a:t>
+            </a:r>
+            <a:r>
+              <a:rPr lang="en-US" sz="1400" dirty="0" err="1" smtClean="0"/>
+              <a:t>mrFAST</a:t>
+            </a:r>
+            <a:r>
+              <a:rPr lang="en-US" sz="1400" dirty="0" smtClean="0"/>
+              <a:t>).  </a:t>
             </a:r>
             <a:r>
               <a:rPr lang="en-US" sz="1400" i="1" dirty="0" smtClean="0"/>
-              <a:t>Bioinformatics</a:t>
+              <a:t>Nature Genetics</a:t>
             </a:r>
             <a:r>
               <a:rPr lang="en-US" sz="1400" dirty="0" smtClean="0"/>
-              <a:t>, 25(15), 1966-1967.</a:t>
-            </a:r>
-            <a:endParaRPr lang="en-US" sz="1400" dirty="0" smtClean="0"/>
+              <a:t>, 41(10), 1061-1067.</a:t>
+            </a:r>
           </a:p>
           <a:p>
             <a:pPr>
@@ -25671,31 +26428,15 @@
             </a:pPr>
             <a:r>
               <a:rPr lang="en-US" sz="1400" dirty="0" smtClean="0"/>
-              <a:t>[Lunter11]  G. </a:t>
+              <a:t>[Bao02]  Z. </a:t>
             </a:r>
             <a:r>
               <a:rPr lang="en-US" sz="1400" dirty="0" err="1" smtClean="0"/>
-              <a:t>Lunter</a:t>
+              <a:t>Bao</a:t>
             </a:r>
             <a:r>
               <a:rPr lang="en-US" sz="1400" dirty="0" smtClean="0"/>
-              <a:t> and M. Goodson.  </a:t>
-            </a:r>
-            <a:r>
-              <a:rPr lang="en-US" sz="1400" dirty="0" err="1" smtClean="0"/>
-              <a:t>Stampy</a:t>
-            </a:r>
-            <a:r>
-              <a:rPr lang="en-US" sz="1400" dirty="0" smtClean="0"/>
-              <a:t>:  A statistical algorithm for sensitive and fast mapping of </a:t>
-            </a:r>
-            <a:r>
-              <a:rPr lang="en-US" sz="1400" dirty="0" err="1" smtClean="0"/>
-              <a:t>Illumina</a:t>
-            </a:r>
-            <a:r>
-              <a:rPr lang="en-US" sz="1400" dirty="0" smtClean="0"/>
-              <a:t> sequence reads.  </a:t>
+              <a:t> and S. Eddy.  Automated De Novo Identification of Repeat Sequence Families in Sequenced Genomes (RECON).  </a:t>
             </a:r>
             <a:r>
               <a:rPr lang="en-US" sz="1400" i="1" dirty="0" smtClean="0"/>
@@ -25703,7 +26444,7 @@
             </a:r>
             <a:r>
               <a:rPr lang="en-US" sz="1400" dirty="0" smtClean="0"/>
-              <a:t>, 936-939.</a:t>
+              <a:t>, 12, 1269-1276.</a:t>
             </a:r>
           </a:p>
           <a:p>
@@ -25712,27 +26453,7 @@
             </a:pPr>
             <a:r>
               <a:rPr lang="en-US" sz="1400" dirty="0" smtClean="0"/>
-              <a:t>[</a:t>
-            </a:r>
-            <a:r>
-              <a:rPr lang="en-US" sz="1400" dirty="0" smtClean="0"/>
-              <a:t>Nguyen]  N. Nguyen et al.  Towards the Universal Human Reference Genome:  Building a Comprehensive </a:t>
-            </a:r>
-            <a:r>
-              <a:rPr lang="en-US" sz="1400" dirty="0" smtClean="0"/>
-              <a:t>Consensus </a:t>
-            </a:r>
-            <a:r>
-              <a:rPr lang="en-US" sz="1400" dirty="0" smtClean="0"/>
-              <a:t>Sequence for the Major </a:t>
-            </a:r>
-            <a:r>
-              <a:rPr lang="en-US" sz="1400" dirty="0" err="1" smtClean="0"/>
-              <a:t>Histocompatibility</a:t>
-            </a:r>
-            <a:r>
-              <a:rPr lang="en-US" sz="1400" dirty="0" smtClean="0"/>
-              <a:t> Complex.  Unpublished.</a:t>
+              <a:t>[Cohen05]  I. Cohen et al.  Capturing, indexing, clustering, and retrieving system history.  In Proceedings of SOSP 2005, pp. 105-118.</a:t>
             </a:r>
           </a:p>
           <a:p>
@@ -25741,31 +26462,31 @@
             </a:pPr>
             <a:r>
               <a:rPr lang="en-US" sz="1400" dirty="0" smtClean="0"/>
-              <a:t>[Price05]  A. Price, N. Jones, and P. </a:t>
+              <a:t>[Hach10]  F. </a:t>
             </a:r>
             <a:r>
               <a:rPr lang="en-US" sz="1400" dirty="0" err="1" smtClean="0"/>
-              <a:t>Pevzner</a:t>
+              <a:t>Hach</a:t>
             </a:r>
             <a:r>
               <a:rPr lang="en-US" sz="1400" dirty="0" smtClean="0"/>
-              <a:t>.  De novo identification of repeat families in large genomes (</a:t>
+              <a:t> et al.  </a:t>
             </a:r>
             <a:r>
               <a:rPr lang="en-US" sz="1400" dirty="0" err="1" smtClean="0"/>
-              <a:t>RepeatScout</a:t>
+              <a:t>mrsFAST</a:t>
             </a:r>
             <a:r>
               <a:rPr lang="en-US" sz="1400" dirty="0" smtClean="0"/>
-              <a:t>).  </a:t>
+              <a:t>:  a cache-oblivious algorithm for short-read mapping.  </a:t>
             </a:r>
             <a:r>
               <a:rPr lang="en-US" sz="1400" i="1" dirty="0" smtClean="0"/>
-              <a:t>Bioinformatics</a:t>
+              <a:t>Nature Methods</a:t>
             </a:r>
             <a:r>
               <a:rPr lang="en-US" sz="1400" dirty="0" smtClean="0"/>
-              <a:t>, 21, i351-i358.  </a:t>
+              <a:t>, 7(8), 576-577.</a:t>
             </a:r>
           </a:p>
           <a:p>
@@ -25774,31 +26495,55 @@
             </a:pPr>
             <a:r>
               <a:rPr lang="en-US" sz="1400" dirty="0" smtClean="0"/>
-              <a:t>[Treangen12]  T. </a:t>
+              <a:t>[Hormozdiari09]  F. </a:t>
             </a:r>
             <a:r>
               <a:rPr lang="en-US" sz="1400" dirty="0" err="1" smtClean="0"/>
-              <a:t>Treangen</a:t>
+              <a:t>Hormozdiari</a:t>
             </a:r>
             <a:r>
               <a:rPr lang="en-US" sz="1400" dirty="0" smtClean="0"/>
-              <a:t> and S. </a:t>
+              <a:t>, C. </a:t>
             </a:r>
             <a:r>
               <a:rPr lang="en-US" sz="1400" dirty="0" err="1" smtClean="0"/>
-              <a:t>Salzberg</a:t>
+              <a:t>Alkan</a:t>
             </a:r>
             <a:r>
               <a:rPr lang="en-US" sz="1400" dirty="0" smtClean="0"/>
-              <a:t>.  Repetitive DNA and next-generation sequencing:  computational challenges and solutions.  </a:t>
+              <a:t>, E. </a:t>
+            </a:r>
+            <a:r>
+              <a:rPr lang="en-US" sz="1400" dirty="0" err="1" smtClean="0"/>
+              <a:t>Eichler</a:t>
+            </a:r>
+            <a:r>
+              <a:rPr lang="en-US" sz="1400" dirty="0" smtClean="0"/>
+              <a:t>, and S. </a:t>
+            </a:r>
+            <a:r>
+              <a:rPr lang="en-US" sz="1400" dirty="0" err="1" smtClean="0"/>
+              <a:t>Sahinalp</a:t>
+            </a:r>
+            <a:r>
+              <a:rPr lang="en-US" sz="1400" dirty="0" smtClean="0"/>
+              <a:t>.  Combinatorial algorithms for structural variation detection in high-throughput sequenced genomes (</a:t>
+            </a:r>
+            <a:r>
+              <a:rPr lang="en-US" sz="1400" dirty="0" err="1" smtClean="0"/>
+              <a:t>VariationHunter</a:t>
+            </a:r>
+            <a:r>
+              <a:rPr lang="en-US" sz="1400" dirty="0" smtClean="0"/>
+              <a:t>).  </a:t>
             </a:r>
             <a:r>
               <a:rPr lang="en-US" sz="1400" i="1" dirty="0" smtClean="0"/>
-              <a:t>Nature Reviews Genetics</a:t>
+              <a:t>Genome Research</a:t>
             </a:r>
             <a:r>
               <a:rPr lang="en-US" sz="1400" dirty="0" smtClean="0"/>
-              <a:t>, 13, 36-46.</a:t>
+              <a:t>, 19, 1270-1278.</a:t>
             </a:r>
           </a:p>
           <a:p>
@@ -25807,39 +26552,23 @@
             </a:pPr>
             <a:r>
               <a:rPr lang="en-US" sz="1400" dirty="0" smtClean="0"/>
-              <a:t>[Volfovsky01]  N. </a:t>
+              <a:t>[Kurtz99]  S. Kurtz and C. Schleiermacher.  </a:t>
             </a:r>
             <a:r>
               <a:rPr lang="en-US" sz="1400" dirty="0" err="1" smtClean="0"/>
-              <a:t>Volfovsky</a:t>
+              <a:t>REPuter</a:t>
             </a:r>
             <a:r>
               <a:rPr lang="en-US" sz="1400" dirty="0" smtClean="0"/>
-              <a:t>, B. Haas, and S. </a:t>
-            </a:r>
-            <a:r>
-              <a:rPr lang="en-US" sz="1400" dirty="0" err="1" smtClean="0"/>
-              <a:t>Salzberg</a:t>
+              <a:t>:  fast computation of maximal repeats in complete genomes.  </a:t>
+            </a:r>
+            <a:r>
+              <a:rPr lang="en-US" sz="1400" i="1" dirty="0" smtClean="0"/>
+              <a:t>Bioinformatics</a:t>
             </a:r>
             <a:r>
               <a:rPr lang="en-US" sz="1400" dirty="0" smtClean="0"/>
-              <a:t>.  A clustering method for repeat analysis in DNA sequences (</a:t>
-            </a:r>
-            <a:r>
-              <a:rPr lang="en-US" sz="1400" dirty="0" err="1" smtClean="0"/>
-              <a:t>RepeatFinder</a:t>
-            </a:r>
-            <a:r>
-              <a:rPr lang="en-US" sz="1400" dirty="0" smtClean="0"/>
-              <a:t>).  </a:t>
-            </a:r>
-            <a:r>
-              <a:rPr lang="en-US" sz="1400" i="1" dirty="0" smtClean="0"/>
-              <a:t>Genome Biology</a:t>
-            </a:r>
-            <a:r>
-              <a:rPr lang="en-US" sz="1400" dirty="0" smtClean="0"/>
-              <a:t>, 2(8).</a:t>
+              <a:t>, 15(5), 426-427.</a:t>
             </a:r>
           </a:p>
           <a:p>
@@ -25848,21 +26577,57 @@
             </a:pPr>
             <a:r>
               <a:rPr lang="en-US" sz="1400" dirty="0" smtClean="0"/>
-              <a:t>[Zaharia12]  M. </a:t>
+              <a:t>[Langmead12]  B. </a:t>
             </a:r>
             <a:r>
               <a:rPr lang="en-US" sz="1400" dirty="0" err="1" smtClean="0"/>
-              <a:t>Zaharia</a:t>
+              <a:t>Langmead</a:t>
             </a:r>
             <a:r>
               <a:rPr lang="en-US" sz="1400" dirty="0" smtClean="0"/>
-              <a:t> et al.  Resilient Distributed Datasets:  A Fault-Tolerant Abstraction for In-Memory Cluster Computing (Spark).  In Proceedings of NSDI 2012</a:t>
+              <a:t> and S. </a:t>
+            </a:r>
+            <a:r>
+              <a:rPr lang="en-US" sz="1400" dirty="0" err="1" smtClean="0"/>
+              <a:t>Salzberg</a:t>
             </a:r>
             <a:r>
               <a:rPr lang="en-US" sz="1400" dirty="0" smtClean="0"/>
-              <a:t>.</a:t>
-            </a:r>
-            <a:endParaRPr lang="en-US" sz="1400" dirty="0" smtClean="0"/>
+              <a:t>.  Fast gapped-read alignment with Bowtie 2.  </a:t>
+            </a:r>
+            <a:r>
+              <a:rPr lang="en-US" sz="1400" i="1" dirty="0" smtClean="0"/>
+              <a:t>Nature Methods</a:t>
+            </a:r>
+            <a:r>
+              <a:rPr lang="en-US" sz="1400" dirty="0" smtClean="0"/>
+              <a:t>, 9(4), 357-359.</a:t>
+            </a:r>
+          </a:p>
+          <a:p>
+            <a:pPr>
+              <a:buNone/>
+            </a:pPr>
+            <a:r>
+              <a:rPr lang="en-US" sz="1400" dirty="0" smtClean="0"/>
+              <a:t>[H.Li08]  H. Li, J. </a:t>
+            </a:r>
+            <a:r>
+              <a:rPr lang="en-US" sz="1400" dirty="0" err="1" smtClean="0"/>
+              <a:t>Ruan</a:t>
+            </a:r>
+            <a:r>
+              <a:rPr lang="en-US" sz="1400" dirty="0" smtClean="0"/>
+              <a:t>, and R. Durbin.  Mapping short DNA sequencing reads and calling variants using mapping quality scores (MAQ).  </a:t>
+            </a:r>
+            <a:r>
+              <a:rPr lang="en-US" sz="1400" i="1" dirty="0" smtClean="0"/>
+              <a:t>Genome Research</a:t>
+            </a:r>
+            <a:r>
+              <a:rPr lang="en-US" sz="1400" dirty="0" smtClean="0"/>
+              <a:t>, 18, 1851-1858.</a:t>
+            </a:r>
           </a:p>
         </p:txBody>
       </p:sp>
@@ -25898,7 +26663,7 @@
             <a:spLocks noGrp="1"/>
           </p:cNvSpPr>
           <p:nvPr>
-            <p:ph type="ctrTitle"/>
+            <p:ph type="title"/>
           </p:nvPr>
         </p:nvSpPr>
         <p:spPr/>
@@ -25908,7 +26673,7 @@
           <a:p>
             <a:r>
               <a:rPr lang="en-US" dirty="0" smtClean="0"/>
-              <a:t>Backup/Pending</a:t>
+              <a:t>References</a:t>
             </a:r>
             <a:endParaRPr lang="en-US" dirty="0"/>
           </a:p>
@@ -25916,20 +26681,243 @@
       </p:sp>
       <p:sp>
         <p:nvSpPr>
-          <p:cNvPr id="3" name="Subtitle 2"/>
+          <p:cNvPr id="3" name="Content Placeholder 2"/>
           <p:cNvSpPr>
             <a:spLocks noGrp="1"/>
           </p:cNvSpPr>
           <p:nvPr>
-            <p:ph type="subTitle" idx="1"/>
+            <p:ph idx="1"/>
           </p:nvPr>
         </p:nvSpPr>
         <p:spPr/>
         <p:txBody>
-          <a:bodyPr/>
+          <a:bodyPr>
+            <a:normAutofit/>
+          </a:bodyPr>
           <a:lstStyle/>
           <a:p>
-            <a:endParaRPr lang="en-US"/>
+            <a:pPr>
+              <a:buNone/>
+            </a:pPr>
+            <a:r>
+              <a:rPr lang="en-US" sz="1400" dirty="0" smtClean="0"/>
+              <a:t>[H.Li09]  H. Li and R. Durbin.  Fast and accurate short read alignment with Burrows-Wheeler transform.  </a:t>
+            </a:r>
+            <a:r>
+              <a:rPr lang="en-US" sz="1400" i="1" dirty="0" smtClean="0"/>
+              <a:t>Bioinformatics</a:t>
+            </a:r>
+            <a:r>
+              <a:rPr lang="en-US" sz="1400" dirty="0" smtClean="0"/>
+              <a:t>, 25(14), 1754-1760.</a:t>
+            </a:r>
+          </a:p>
+          <a:p>
+            <a:pPr>
+              <a:buNone/>
+            </a:pPr>
+            <a:r>
+              <a:rPr lang="en-US" sz="1400" dirty="0" smtClean="0"/>
+              <a:t>[R.Li09]  R. Li, C. Yu, Y. Li, T. Lam, S. </a:t>
+            </a:r>
+            <a:r>
+              <a:rPr lang="en-US" sz="1400" dirty="0" err="1" smtClean="0"/>
+              <a:t>Yiu</a:t>
+            </a:r>
+            <a:r>
+              <a:rPr lang="en-US" sz="1400" dirty="0" smtClean="0"/>
+              <a:t>, K. Kristiansen, and J. Wang.  SOAP2:  an improved ultrafast tool for short read alignment.  </a:t>
+            </a:r>
+            <a:r>
+              <a:rPr lang="en-US" sz="1400" i="1" dirty="0" smtClean="0"/>
+              <a:t>Bioinformatics</a:t>
+            </a:r>
+            <a:r>
+              <a:rPr lang="en-US" sz="1400" dirty="0" smtClean="0"/>
+              <a:t>, 25(15), 1966-1967.</a:t>
+            </a:r>
+          </a:p>
+          <a:p>
+            <a:pPr>
+              <a:buNone/>
+            </a:pPr>
+            <a:r>
+              <a:rPr lang="en-US" sz="1400" dirty="0" smtClean="0"/>
+              <a:t>[Lunter11]  G. </a:t>
+            </a:r>
+            <a:r>
+              <a:rPr lang="en-US" sz="1400" dirty="0" err="1" smtClean="0"/>
+              <a:t>Lunter</a:t>
+            </a:r>
+            <a:r>
+              <a:rPr lang="en-US" sz="1400" dirty="0" smtClean="0"/>
+              <a:t> and M. Goodson.  </a:t>
+            </a:r>
+            <a:r>
+              <a:rPr lang="en-US" sz="1400" dirty="0" err="1" smtClean="0"/>
+              <a:t>Stampy</a:t>
+            </a:r>
+            <a:r>
+              <a:rPr lang="en-US" sz="1400" dirty="0" smtClean="0"/>
+              <a:t>:  A statistical algorithm for sensitive and fast mapping of </a:t>
+            </a:r>
+            <a:r>
+              <a:rPr lang="en-US" sz="1400" dirty="0" err="1" smtClean="0"/>
+              <a:t>Illumina</a:t>
+            </a:r>
+            <a:r>
+              <a:rPr lang="en-US" sz="1400" dirty="0" smtClean="0"/>
+              <a:t> sequence reads.  </a:t>
+            </a:r>
+            <a:r>
+              <a:rPr lang="en-US" sz="1400" i="1" dirty="0" smtClean="0"/>
+              <a:t>Genome Research</a:t>
+            </a:r>
+            <a:r>
+              <a:rPr lang="en-US" sz="1400" dirty="0" smtClean="0"/>
+              <a:t>, 936-939.</a:t>
+            </a:r>
+          </a:p>
+          <a:p>
+            <a:pPr>
+              <a:buNone/>
+            </a:pPr>
+            <a:r>
+              <a:rPr lang="en-US" sz="1400" dirty="0" smtClean="0"/>
+              <a:t>[Nguyen]  N. Nguyen et al.  Towards the Universal Human Reference Genome:  Building a Comprehensive Consensus Sequence for the Major </a:t>
+            </a:r>
+            <a:r>
+              <a:rPr lang="en-US" sz="1400" dirty="0" err="1" smtClean="0"/>
+              <a:t>Histocompatibility</a:t>
+            </a:r>
+            <a:r>
+              <a:rPr lang="en-US" sz="1400" dirty="0" smtClean="0"/>
+              <a:t> Complex.  Unpublished.</a:t>
+            </a:r>
+          </a:p>
+          <a:p>
+            <a:pPr>
+              <a:buNone/>
+            </a:pPr>
+            <a:r>
+              <a:rPr lang="en-US" sz="1400" dirty="0" smtClean="0"/>
+              <a:t>[Price05]  A. Price, N. Jones, and P. </a:t>
+            </a:r>
+            <a:r>
+              <a:rPr lang="en-US" sz="1400" dirty="0" err="1" smtClean="0"/>
+              <a:t>Pevzner</a:t>
+            </a:r>
+            <a:r>
+              <a:rPr lang="en-US" sz="1400" dirty="0" smtClean="0"/>
+              <a:t>.  De novo identification of repeat families in large genomes (</a:t>
+            </a:r>
+            <a:r>
+              <a:rPr lang="en-US" sz="1400" dirty="0" err="1" smtClean="0"/>
+              <a:t>RepeatScout</a:t>
+            </a:r>
+            <a:r>
+              <a:rPr lang="en-US" sz="1400" dirty="0" smtClean="0"/>
+              <a:t>).  </a:t>
+            </a:r>
+            <a:r>
+              <a:rPr lang="en-US" sz="1400" i="1" dirty="0" smtClean="0"/>
+              <a:t>Bioinformatics</a:t>
+            </a:r>
+            <a:r>
+              <a:rPr lang="en-US" sz="1400" dirty="0" smtClean="0"/>
+              <a:t>, 21, i351-i358.  </a:t>
+            </a:r>
+          </a:p>
+          <a:p>
+            <a:pPr>
+              <a:buNone/>
+            </a:pPr>
+            <a:r>
+              <a:rPr lang="en-US" sz="1400" dirty="0" smtClean="0"/>
+              <a:t>[Treangen12]  T. </a:t>
+            </a:r>
+            <a:r>
+              <a:rPr lang="en-US" sz="1400" dirty="0" err="1" smtClean="0"/>
+              <a:t>Treangen</a:t>
+            </a:r>
+            <a:r>
+              <a:rPr lang="en-US" sz="1400" dirty="0" smtClean="0"/>
+              <a:t> and S. </a:t>
+            </a:r>
+            <a:r>
+              <a:rPr lang="en-US" sz="1400" dirty="0" err="1" smtClean="0"/>
+              <a:t>Salzberg</a:t>
+            </a:r>
+            <a:r>
+              <a:rPr lang="en-US" sz="1400" dirty="0" smtClean="0"/>
+              <a:t>.  Repetitive DNA and next-generation sequencing:  computational challenges and solutions.  </a:t>
+            </a:r>
+            <a:r>
+              <a:rPr lang="en-US" sz="1400" i="1" dirty="0" smtClean="0"/>
+              <a:t>Nature Reviews Genetics</a:t>
+            </a:r>
+            <a:r>
+              <a:rPr lang="en-US" sz="1400" dirty="0" smtClean="0"/>
+              <a:t>, 13, 36-46.</a:t>
+            </a:r>
+          </a:p>
+          <a:p>
+            <a:pPr>
+              <a:buNone/>
+            </a:pPr>
+            <a:r>
+              <a:rPr lang="en-US" sz="1400" dirty="0" smtClean="0"/>
+              <a:t>[Volfovsky01]  N. </a:t>
+            </a:r>
+            <a:r>
+              <a:rPr lang="en-US" sz="1400" dirty="0" err="1" smtClean="0"/>
+              <a:t>Volfovsky</a:t>
+            </a:r>
+            <a:r>
+              <a:rPr lang="en-US" sz="1400" dirty="0" smtClean="0"/>
+              <a:t>, B. Haas, and S. </a:t>
+            </a:r>
+            <a:r>
+              <a:rPr lang="en-US" sz="1400" dirty="0" err="1" smtClean="0"/>
+              <a:t>Salzberg</a:t>
+            </a:r>
+            <a:r>
+              <a:rPr lang="en-US" sz="1400" dirty="0" smtClean="0"/>
+              <a:t>.  A clustering method for repeat analysis in DNA sequences (</a:t>
+            </a:r>
+            <a:r>
+              <a:rPr lang="en-US" sz="1400" dirty="0" err="1" smtClean="0"/>
+              <a:t>RepeatFinder</a:t>
+            </a:r>
+            <a:r>
+              <a:rPr lang="en-US" sz="1400" dirty="0" smtClean="0"/>
+              <a:t>).  </a:t>
+            </a:r>
+            <a:r>
+              <a:rPr lang="en-US" sz="1400" i="1" dirty="0" smtClean="0"/>
+              <a:t>Genome Biology</a:t>
+            </a:r>
+            <a:r>
+              <a:rPr lang="en-US" sz="1400" dirty="0" smtClean="0"/>
+              <a:t>, 2(8).</a:t>
+            </a:r>
+          </a:p>
+          <a:p>
+            <a:pPr>
+              <a:buNone/>
+            </a:pPr>
+            <a:r>
+              <a:rPr lang="en-US" sz="1400" dirty="0" smtClean="0"/>
+              <a:t>[Zaharia12]  M. </a:t>
+            </a:r>
+            <a:r>
+              <a:rPr lang="en-US" sz="1400" dirty="0" err="1" smtClean="0"/>
+              <a:t>Zaharia</a:t>
+            </a:r>
+            <a:r>
+              <a:rPr lang="en-US" sz="1400" dirty="0" smtClean="0"/>
+              <a:t> et al.  Resilient Distributed Datasets:  A Fault-Tolerant Abstraction for In-Memory Cluster Computing (Spark).  In Proceedings of NSDI 2012.</a:t>
+            </a:r>
           </a:p>
         </p:txBody>
       </p:sp>
@@ -26563,6 +27551,73 @@
 </file>
 
 <file path=ppt/slides/slide50.xml><?xml version="1.0" encoding="utf-8"?>
+<p:sld xmlns:a="http://schemas.openxmlformats.org/drawingml/2006/main" xmlns:r="http://schemas.openxmlformats.org/officeDocument/2006/relationships" xmlns:mc="http://schemas.openxmlformats.org/markup-compatibility/2006" xmlns:mv="urn:schemas-microsoft-com:mac:vml" xmlns:p="http://schemas.openxmlformats.org/presentationml/2006/main" mc:Ignorable="mv" mc:PreserveAttributes="mv:*">
+  <p:cSld>
+    <p:spTree>
+      <p:nvGrpSpPr>
+        <p:cNvPr id="1" name=""/>
+        <p:cNvGrpSpPr/>
+        <p:nvPr/>
+      </p:nvGrpSpPr>
+      <p:grpSpPr>
+        <a:xfrm>
+          <a:off x="0" y="0"/>
+          <a:ext cx="0" cy="0"/>
+          <a:chOff x="0" y="0"/>
+          <a:chExt cx="0" cy="0"/>
+        </a:xfrm>
+      </p:grpSpPr>
+      <p:sp>
+        <p:nvSpPr>
+          <p:cNvPr id="2" name="Title 1"/>
+          <p:cNvSpPr>
+            <a:spLocks noGrp="1"/>
+          </p:cNvSpPr>
+          <p:nvPr>
+            <p:ph type="ctrTitle"/>
+          </p:nvPr>
+        </p:nvSpPr>
+        <p:spPr/>
+        <p:txBody>
+          <a:bodyPr/>
+          <a:lstStyle/>
+          <a:p>
+            <a:r>
+              <a:rPr lang="en-US" dirty="0" smtClean="0"/>
+              <a:t>Backup/Pending</a:t>
+            </a:r>
+            <a:endParaRPr lang="en-US" dirty="0"/>
+          </a:p>
+        </p:txBody>
+      </p:sp>
+      <p:sp>
+        <p:nvSpPr>
+          <p:cNvPr id="3" name="Subtitle 2"/>
+          <p:cNvSpPr>
+            <a:spLocks noGrp="1"/>
+          </p:cNvSpPr>
+          <p:nvPr>
+            <p:ph type="subTitle" idx="1"/>
+          </p:nvPr>
+        </p:nvSpPr>
+        <p:spPr/>
+        <p:txBody>
+          <a:bodyPr/>
+          <a:lstStyle/>
+          <a:p>
+            <a:endParaRPr lang="en-US"/>
+          </a:p>
+        </p:txBody>
+      </p:sp>
+    </p:spTree>
+  </p:cSld>
+  <p:clrMapOvr>
+    <a:masterClrMapping/>
+  </p:clrMapOvr>
+</p:sld>
+</file>
+
+<file path=ppt/slides/slide51.xml><?xml version="1.0" encoding="utf-8"?>
 <p:sld xmlns:a="http://schemas.openxmlformats.org/drawingml/2006/main" xmlns:r="http://schemas.openxmlformats.org/officeDocument/2006/relationships" xmlns:mc="http://schemas.openxmlformats.org/markup-compatibility/2006" xmlns:mv="urn:schemas-microsoft-com:mac:vml" xmlns:p="http://schemas.openxmlformats.org/presentationml/2006/main" mc:Ignorable="mv" mc:PreserveAttributes="mv:*">
   <p:cSld>
     <p:spTree>
@@ -26922,7 +27977,7 @@
 </p:sld>
 </file>
 
-<file path=ppt/slides/slide51.xml><?xml version="1.0" encoding="utf-8"?>
+<file path=ppt/slides/slide52.xml><?xml version="1.0" encoding="utf-8"?>
 <p:sld xmlns:a="http://schemas.openxmlformats.org/drawingml/2006/main" xmlns:r="http://schemas.openxmlformats.org/officeDocument/2006/relationships" xmlns:mc="http://schemas.openxmlformats.org/markup-compatibility/2006" xmlns:mv="urn:schemas-microsoft-com:mac:vml" xmlns:p="http://schemas.openxmlformats.org/presentationml/2006/main" mc:Ignorable="mv" mc:PreserveAttributes="mv:*">
   <p:cSld>
     <p:spTree>

</xml_diff>

<commit_message>
changes to slides; updated bib; updated spreadsheet
</commit_message>
<xml_diff>
--- a/slides/11.26.12 Quals (v1b).pptx
+++ b/slides/11.26.12 Quals (v1b).pptx
@@ -303,11 +303,11 @@
           </c:yVal>
           <c:smooth val="1"/>
         </c:ser>
-        <c:axId val="555262200"/>
-        <c:axId val="547218888"/>
+        <c:axId val="546447672"/>
+        <c:axId val="546285800"/>
       </c:scatterChart>
       <c:valAx>
-        <c:axId val="555262200"/>
+        <c:axId val="546447672"/>
         <c:scaling>
           <c:orientation val="minMax"/>
         </c:scaling>
@@ -328,16 +328,15 @@
               </a:p>
             </c:rich>
           </c:tx>
-          <c:layout/>
         </c:title>
         <c:numFmt formatCode="General" sourceLinked="1"/>
         <c:tickLblPos val="nextTo"/>
-        <c:crossAx val="547218888"/>
+        <c:crossAx val="546285800"/>
         <c:crosses val="autoZero"/>
         <c:crossBetween val="midCat"/>
       </c:valAx>
       <c:valAx>
-        <c:axId val="547218888"/>
+        <c:axId val="546285800"/>
         <c:scaling>
           <c:orientation val="minMax"/>
         </c:scaling>
@@ -359,11 +358,10 @@
               </a:p>
             </c:rich>
           </c:tx>
-          <c:layout/>
         </c:title>
         <c:numFmt formatCode="General" sourceLinked="1"/>
         <c:tickLblPos val="nextTo"/>
-        <c:crossAx val="555262200"/>
+        <c:crossAx val="546447672"/>
         <c:crosses val="autoZero"/>
         <c:crossBetween val="midCat"/>
       </c:valAx>
@@ -511,8 +509,8 @@
           </c:yVal>
           <c:smooth val="1"/>
         </c:ser>
-        <c:axId val="554884056"/>
-        <c:axId val="547147896"/>
+        <c:axId val="546238952"/>
+        <c:axId val="546223992"/>
       </c:scatterChart>
       <c:scatterChart>
         <c:scatterStyle val="smoothMarker"/>
@@ -647,11 +645,11 @@
           </c:yVal>
           <c:smooth val="1"/>
         </c:ser>
-        <c:axId val="554954248"/>
-        <c:axId val="554948072"/>
+        <c:axId val="546364056"/>
+        <c:axId val="546319896"/>
       </c:scatterChart>
       <c:valAx>
-        <c:axId val="554884056"/>
+        <c:axId val="546238952"/>
         <c:scaling>
           <c:orientation val="minMax"/>
         </c:scaling>
@@ -672,16 +670,15 @@
               </a:p>
             </c:rich>
           </c:tx>
-          <c:layout/>
         </c:title>
         <c:numFmt formatCode="General" sourceLinked="1"/>
         <c:tickLblPos val="nextTo"/>
-        <c:crossAx val="547147896"/>
+        <c:crossAx val="546223992"/>
         <c:crosses val="autoZero"/>
         <c:crossBetween val="midCat"/>
       </c:valAx>
       <c:valAx>
-        <c:axId val="547147896"/>
+        <c:axId val="546223992"/>
         <c:scaling>
           <c:orientation val="minMax"/>
         </c:scaling>
@@ -703,16 +700,15 @@
               </a:p>
             </c:rich>
           </c:tx>
-          <c:layout/>
         </c:title>
         <c:numFmt formatCode="0.00%" sourceLinked="1"/>
         <c:tickLblPos val="nextTo"/>
-        <c:crossAx val="554884056"/>
+        <c:crossAx val="546238952"/>
         <c:crosses val="autoZero"/>
         <c:crossBetween val="midCat"/>
       </c:valAx>
       <c:valAx>
-        <c:axId val="554948072"/>
+        <c:axId val="546319896"/>
         <c:scaling>
           <c:orientation val="minMax"/>
         </c:scaling>
@@ -733,16 +729,15 @@
               </a:p>
             </c:rich>
           </c:tx>
-          <c:layout/>
         </c:title>
         <c:numFmt formatCode="0.00%" sourceLinked="1"/>
         <c:tickLblPos val="nextTo"/>
-        <c:crossAx val="554954248"/>
+        <c:crossAx val="546364056"/>
         <c:crosses val="max"/>
         <c:crossBetween val="midCat"/>
       </c:valAx>
       <c:valAx>
-        <c:axId val="554954248"/>
+        <c:axId val="546364056"/>
         <c:scaling>
           <c:orientation val="minMax"/>
         </c:scaling>
@@ -750,14 +745,13 @@
         <c:axPos val="b"/>
         <c:numFmt formatCode="General" sourceLinked="1"/>
         <c:tickLblPos val="nextTo"/>
-        <c:crossAx val="554948072"/>
+        <c:crossAx val="546319896"/>
         <c:crosses val="autoZero"/>
         <c:crossBetween val="midCat"/>
       </c:valAx>
     </c:plotArea>
     <c:legend>
       <c:legendPos val="b"/>
-      <c:layout/>
     </c:legend>
     <c:plotVisOnly val="1"/>
   </c:chart>
@@ -786,9 +780,7 @@
   <c:lang val="en-US"/>
   <c:style val="18"/>
   <c:chart>
-    <c:title>
-      <c:layout/>
-    </c:title>
+    <c:title/>
     <c:plotArea>
       <c:layout/>
       <c:pieChart>
@@ -842,7 +834,6 @@
     </c:plotArea>
     <c:legend>
       <c:legendPos val="r"/>
-      <c:layout/>
     </c:legend>
     <c:plotVisOnly val="1"/>
   </c:chart>
@@ -866,9 +857,7 @@
   <c:lang val="en-US"/>
   <c:style val="18"/>
   <c:chart>
-    <c:title>
-      <c:layout/>
-    </c:title>
+    <c:title/>
     <c:plotArea>
       <c:layout/>
       <c:pieChart>
@@ -922,7 +911,6 @@
     </c:plotArea>
     <c:legend>
       <c:legendPos val="r"/>
-      <c:layout/>
     </c:legend>
     <c:plotVisOnly val="1"/>
   </c:chart>
@@ -998,7 +986,7 @@
                   <c:v>15.33389557617113</c:v>
                 </c:pt>
                 <c:pt idx="2">
-                  <c:v>18.46892603195122</c:v>
+                  <c:v>18.46892603195121</c:v>
                 </c:pt>
                 <c:pt idx="3">
                   <c:v>21.36067499732992</c:v>
@@ -1013,7 +1001,7 @@
                   <c:v>29.79560216911984</c:v>
                 </c:pt>
                 <c:pt idx="7">
-                  <c:v>32.72893892779997</c:v>
+                  <c:v>32.72893892779998</c:v>
                 </c:pt>
                 <c:pt idx="8">
                   <c:v>36.12977816316208</c:v>
@@ -1022,16 +1010,16 @@
                   <c:v>48.0215136381099</c:v>
                 </c:pt>
                 <c:pt idx="10">
-                  <c:v>57.04831992697817</c:v>
+                  <c:v>57.04831992697818</c:v>
                 </c:pt>
                 <c:pt idx="11">
                   <c:v>59.93407252022775</c:v>
                 </c:pt>
                 <c:pt idx="12">
-                  <c:v>69.12283127116881</c:v>
+                  <c:v>69.12283127116879</c:v>
                 </c:pt>
                 <c:pt idx="13">
-                  <c:v>81.47967082212983</c:v>
+                  <c:v>81.4796708221298</c:v>
                 </c:pt>
                 <c:pt idx="14">
                   <c:v>77.724234416291</c:v>
@@ -1114,7 +1102,7 @@
                 <c:formatCode>General</c:formatCode>
                 <c:ptCount val="1"/>
                 <c:pt idx="0">
-                  <c:v>925.9259259259258</c:v>
+                  <c:v>925.9259259259256</c:v>
                 </c:pt>
               </c:numCache>
             </c:numRef>
@@ -1165,11 +1153,11 @@
           </c:yVal>
           <c:smooth val="1"/>
         </c:ser>
-        <c:axId val="69304440"/>
-        <c:axId val="481106520"/>
+        <c:axId val="546353272"/>
+        <c:axId val="546374440"/>
       </c:scatterChart>
       <c:valAx>
-        <c:axId val="69304440"/>
+        <c:axId val="546353272"/>
         <c:scaling>
           <c:logBase val="10.0"/>
           <c:orientation val="minMax"/>
@@ -1197,12 +1185,12 @@
         </c:title>
         <c:numFmt formatCode="General" sourceLinked="1"/>
         <c:tickLblPos val="nextTo"/>
-        <c:crossAx val="481106520"/>
+        <c:crossAx val="546374440"/>
         <c:crosses val="autoZero"/>
         <c:crossBetween val="midCat"/>
       </c:valAx>
       <c:valAx>
-        <c:axId val="481106520"/>
+        <c:axId val="546374440"/>
         <c:scaling>
           <c:orientation val="minMax"/>
         </c:scaling>
@@ -1228,7 +1216,7 @@
         </c:title>
         <c:numFmt formatCode="0.00%" sourceLinked="1"/>
         <c:tickLblPos val="nextTo"/>
-        <c:crossAx val="69304440"/>
+        <c:crossAx val="546353272"/>
         <c:crosses val="autoZero"/>
         <c:crossBetween val="midCat"/>
       </c:valAx>
@@ -1297,7 +1285,7 @@
                   <c:v>15.33389557617113</c:v>
                 </c:pt>
                 <c:pt idx="2">
-                  <c:v>18.46892603195122</c:v>
+                  <c:v>18.46892603195121</c:v>
                 </c:pt>
                 <c:pt idx="3">
                   <c:v>21.36067499732992</c:v>
@@ -1312,7 +1300,7 @@
                   <c:v>29.79560216911984</c:v>
                 </c:pt>
                 <c:pt idx="7">
-                  <c:v>32.72893892779997</c:v>
+                  <c:v>32.72893892779998</c:v>
                 </c:pt>
                 <c:pt idx="8">
                   <c:v>36.12977816316208</c:v>
@@ -1321,16 +1309,16 @@
                   <c:v>48.0215136381099</c:v>
                 </c:pt>
                 <c:pt idx="10">
-                  <c:v>57.04831992697817</c:v>
+                  <c:v>57.04831992697818</c:v>
                 </c:pt>
                 <c:pt idx="11">
                   <c:v>59.93407252022775</c:v>
                 </c:pt>
                 <c:pt idx="12">
-                  <c:v>69.12283127116881</c:v>
+                  <c:v>69.12283127116879</c:v>
                 </c:pt>
                 <c:pt idx="13">
-                  <c:v>81.47967082212983</c:v>
+                  <c:v>81.4796708221298</c:v>
                 </c:pt>
                 <c:pt idx="14">
                   <c:v>77.724234416291</c:v>
@@ -1413,7 +1401,7 @@
                 <c:formatCode>General</c:formatCode>
                 <c:ptCount val="1"/>
                 <c:pt idx="0">
-                  <c:v>925.9259259259258</c:v>
+                  <c:v>925.9259259259256</c:v>
                 </c:pt>
               </c:numCache>
             </c:numRef>
@@ -1464,11 +1452,11 @@
           </c:yVal>
           <c:smooth val="1"/>
         </c:ser>
-        <c:axId val="563632568"/>
-        <c:axId val="564035000"/>
+        <c:axId val="546431768"/>
+        <c:axId val="546552920"/>
       </c:scatterChart>
       <c:valAx>
-        <c:axId val="563632568"/>
+        <c:axId val="546431768"/>
         <c:scaling>
           <c:logBase val="10.0"/>
           <c:orientation val="minMax"/>
@@ -1496,12 +1484,12 @@
         </c:title>
         <c:numFmt formatCode="General" sourceLinked="1"/>
         <c:tickLblPos val="nextTo"/>
-        <c:crossAx val="564035000"/>
+        <c:crossAx val="546552920"/>
         <c:crosses val="autoZero"/>
         <c:crossBetween val="midCat"/>
       </c:valAx>
       <c:valAx>
-        <c:axId val="564035000"/>
+        <c:axId val="546552920"/>
         <c:scaling>
           <c:orientation val="minMax"/>
         </c:scaling>
@@ -1527,7 +1515,7 @@
         </c:title>
         <c:numFmt formatCode="0.0%" sourceLinked="1"/>
         <c:tickLblPos val="nextTo"/>
-        <c:crossAx val="563632568"/>
+        <c:crossAx val="546431768"/>
         <c:crosses val="autoZero"/>
         <c:crossBetween val="midCat"/>
       </c:valAx>
@@ -1621,7 +1609,7 @@
             <a:fld id="{275DB8CA-94BD-8D45-A455-2D119630D46C}" type="datetimeFigureOut">
               <a:rPr lang="en-US" smtClean="0"/>
               <a:pPr/>
-              <a:t>11/28/12</a:t>
+              <a:t>12/3/12</a:t>
             </a:fld>
             <a:endParaRPr lang="en-US"/>
           </a:p>
@@ -4637,7 +4625,7 @@
             <a:fld id="{8BF18853-1D5D-4D4C-9B2E-E0406925FFDC}" type="datetimeFigureOut">
               <a:rPr lang="en-US" smtClean="0"/>
               <a:pPr/>
-              <a:t>11/28/12</a:t>
+              <a:t>12/3/12</a:t>
             </a:fld>
             <a:endParaRPr lang="en-US"/>
           </a:p>
@@ -4804,7 +4792,7 @@
             <a:fld id="{8BF18853-1D5D-4D4C-9B2E-E0406925FFDC}" type="datetimeFigureOut">
               <a:rPr lang="en-US" smtClean="0"/>
               <a:pPr/>
-              <a:t>11/28/12</a:t>
+              <a:t>12/3/12</a:t>
             </a:fld>
             <a:endParaRPr lang="en-US"/>
           </a:p>
@@ -4981,7 +4969,7 @@
             <a:fld id="{8BF18853-1D5D-4D4C-9B2E-E0406925FFDC}" type="datetimeFigureOut">
               <a:rPr lang="en-US" smtClean="0"/>
               <a:pPr/>
-              <a:t>11/28/12</a:t>
+              <a:t>12/3/12</a:t>
             </a:fld>
             <a:endParaRPr lang="en-US"/>
           </a:p>
@@ -5148,7 +5136,7 @@
             <a:fld id="{8BF18853-1D5D-4D4C-9B2E-E0406925FFDC}" type="datetimeFigureOut">
               <a:rPr lang="en-US" smtClean="0"/>
               <a:pPr/>
-              <a:t>11/28/12</a:t>
+              <a:t>12/3/12</a:t>
             </a:fld>
             <a:endParaRPr lang="en-US"/>
           </a:p>
@@ -5391,7 +5379,7 @@
             <a:fld id="{8BF18853-1D5D-4D4C-9B2E-E0406925FFDC}" type="datetimeFigureOut">
               <a:rPr lang="en-US" smtClean="0"/>
               <a:pPr/>
-              <a:t>11/28/12</a:t>
+              <a:t>12/3/12</a:t>
             </a:fld>
             <a:endParaRPr lang="en-US"/>
           </a:p>
@@ -5676,7 +5664,7 @@
             <a:fld id="{8BF18853-1D5D-4D4C-9B2E-E0406925FFDC}" type="datetimeFigureOut">
               <a:rPr lang="en-US" smtClean="0"/>
               <a:pPr/>
-              <a:t>11/28/12</a:t>
+              <a:t>12/3/12</a:t>
             </a:fld>
             <a:endParaRPr lang="en-US"/>
           </a:p>
@@ -6095,7 +6083,7 @@
             <a:fld id="{8BF18853-1D5D-4D4C-9B2E-E0406925FFDC}" type="datetimeFigureOut">
               <a:rPr lang="en-US" smtClean="0"/>
               <a:pPr/>
-              <a:t>11/28/12</a:t>
+              <a:t>12/3/12</a:t>
             </a:fld>
             <a:endParaRPr lang="en-US"/>
           </a:p>
@@ -6210,7 +6198,7 @@
             <a:fld id="{8BF18853-1D5D-4D4C-9B2E-E0406925FFDC}" type="datetimeFigureOut">
               <a:rPr lang="en-US" smtClean="0"/>
               <a:pPr/>
-              <a:t>11/28/12</a:t>
+              <a:t>12/3/12</a:t>
             </a:fld>
             <a:endParaRPr lang="en-US"/>
           </a:p>
@@ -6302,7 +6290,7 @@
             <a:fld id="{8BF18853-1D5D-4D4C-9B2E-E0406925FFDC}" type="datetimeFigureOut">
               <a:rPr lang="en-US" smtClean="0"/>
               <a:pPr/>
-              <a:t>11/28/12</a:t>
+              <a:t>12/3/12</a:t>
             </a:fld>
             <a:endParaRPr lang="en-US"/>
           </a:p>
@@ -6576,7 +6564,7 @@
             <a:fld id="{8BF18853-1D5D-4D4C-9B2E-E0406925FFDC}" type="datetimeFigureOut">
               <a:rPr lang="en-US" smtClean="0"/>
               <a:pPr/>
-              <a:t>11/28/12</a:t>
+              <a:t>12/3/12</a:t>
             </a:fld>
             <a:endParaRPr lang="en-US"/>
           </a:p>
@@ -6826,7 +6814,7 @@
             <a:fld id="{8BF18853-1D5D-4D4C-9B2E-E0406925FFDC}" type="datetimeFigureOut">
               <a:rPr lang="en-US" smtClean="0"/>
               <a:pPr/>
-              <a:t>11/28/12</a:t>
+              <a:t>12/3/12</a:t>
             </a:fld>
             <a:endParaRPr lang="en-US"/>
           </a:p>
@@ -7036,7 +7024,7 @@
             <a:fld id="{8BF18853-1D5D-4D4C-9B2E-E0406925FFDC}" type="datetimeFigureOut">
               <a:rPr lang="en-US" smtClean="0"/>
               <a:pPr/>
-              <a:t>11/28/12</a:t>
+              <a:t>12/3/12</a:t>
             </a:fld>
             <a:endParaRPr lang="en-US"/>
           </a:p>
@@ -7585,7 +7573,7 @@
     </p:spTree>
     <p:extLst>
       <p:ext uri="{BB962C8B-B14F-4D97-AF65-F5344CB8AC3E}">
-        <p14:creationId xmlns="" xmlns:a="http://schemas.openxmlformats.org/drawingml/2006/main" xmlns:r="http://schemas.openxmlformats.org/officeDocument/2006/relationships" xmlns:p="http://schemas.openxmlformats.org/presentationml/2006/main" xmlns:p14="http://schemas.microsoft.com/office/powerpoint/2010/main" xmlns:mv="urn:schemas-microsoft-com:mac:vml" xmlns:mc="http://schemas.openxmlformats.org/markup-compatibility/2006" val="981594075"/>
+        <p14:creationId xmlns:mc="http://schemas.openxmlformats.org/markup-compatibility/2006" xmlns:mv="urn:schemas-microsoft-com:mac:vml" xmlns:p14="http://schemas.microsoft.com/office/powerpoint/2010/main" xmlns:p="http://schemas.openxmlformats.org/presentationml/2006/main" xmlns:r="http://schemas.openxmlformats.org/officeDocument/2006/relationships" xmlns:a="http://schemas.openxmlformats.org/drawingml/2006/main" xmlns="" val="981594075"/>
       </p:ext>
     </p:extLst>
   </p:cSld>
@@ -7753,7 +7741,7 @@
     </p:spTree>
     <p:extLst>
       <p:ext uri="{BB962C8B-B14F-4D97-AF65-F5344CB8AC3E}">
-        <p14:creationId xmlns="" xmlns:a="http://schemas.openxmlformats.org/drawingml/2006/main" xmlns:r="http://schemas.openxmlformats.org/officeDocument/2006/relationships" xmlns:p="http://schemas.openxmlformats.org/presentationml/2006/main" xmlns:p14="http://schemas.microsoft.com/office/powerpoint/2010/main" xmlns:mv="urn:schemas-microsoft-com:mac:vml" xmlns:mc="http://schemas.openxmlformats.org/markup-compatibility/2006" val="3868249374"/>
+        <p14:creationId xmlns:mc="http://schemas.openxmlformats.org/markup-compatibility/2006" xmlns:mv="urn:schemas-microsoft-com:mac:vml" xmlns:p14="http://schemas.microsoft.com/office/powerpoint/2010/main" xmlns:p="http://schemas.openxmlformats.org/presentationml/2006/main" xmlns:r="http://schemas.openxmlformats.org/officeDocument/2006/relationships" xmlns:a="http://schemas.openxmlformats.org/drawingml/2006/main" xmlns="" val="3868249374"/>
       </p:ext>
     </p:extLst>
   </p:cSld>
@@ -8069,7 +8057,7 @@
           <p:nvPr>
             <p:extLst>
               <p:ext uri="{D42A27DB-BD31-4B8C-83A1-F6EECF244321}">
-                <p14:modId xmlns="" xmlns:a="http://schemas.openxmlformats.org/drawingml/2006/main" xmlns:r="http://schemas.openxmlformats.org/officeDocument/2006/relationships" xmlns:p="http://schemas.openxmlformats.org/presentationml/2006/main" xmlns:p14="http://schemas.microsoft.com/office/powerpoint/2010/main" xmlns:mv="urn:schemas-microsoft-com:mac:vml" xmlns:mc="http://schemas.openxmlformats.org/markup-compatibility/2006" val="953455250"/>
+                <p14:modId xmlns:mc="http://schemas.openxmlformats.org/markup-compatibility/2006" xmlns:mv="urn:schemas-microsoft-com:mac:vml" xmlns:p14="http://schemas.microsoft.com/office/powerpoint/2010/main" xmlns:p="http://schemas.openxmlformats.org/presentationml/2006/main" xmlns:r="http://schemas.openxmlformats.org/officeDocument/2006/relationships" xmlns:a="http://schemas.openxmlformats.org/drawingml/2006/main" xmlns="" val="953455250"/>
               </p:ext>
             </p:extLst>
           </p:nvPr>
@@ -9207,7 +9195,7 @@
     </p:spTree>
     <p:extLst>
       <p:ext uri="{BB962C8B-B14F-4D97-AF65-F5344CB8AC3E}">
-        <p14:creationId xmlns="" xmlns:a="http://schemas.openxmlformats.org/drawingml/2006/main" xmlns:r="http://schemas.openxmlformats.org/officeDocument/2006/relationships" xmlns:p="http://schemas.openxmlformats.org/presentationml/2006/main" xmlns:p14="http://schemas.microsoft.com/office/powerpoint/2010/main" xmlns:mv="urn:schemas-microsoft-com:mac:vml" xmlns:mc="http://schemas.openxmlformats.org/markup-compatibility/2006" val="2105829494"/>
+        <p14:creationId xmlns:mc="http://schemas.openxmlformats.org/markup-compatibility/2006" xmlns:mv="urn:schemas-microsoft-com:mac:vml" xmlns:p14="http://schemas.microsoft.com/office/powerpoint/2010/main" xmlns:p="http://schemas.openxmlformats.org/presentationml/2006/main" xmlns:r="http://schemas.openxmlformats.org/officeDocument/2006/relationships" xmlns:a="http://schemas.openxmlformats.org/drawingml/2006/main" xmlns="" val="2105829494"/>
       </p:ext>
     </p:extLst>
   </p:cSld>
@@ -10534,7 +10522,7 @@
     </p:spTree>
     <p:extLst>
       <p:ext uri="{BB962C8B-B14F-4D97-AF65-F5344CB8AC3E}">
-        <p14:creationId xmlns="" xmlns:a="http://schemas.openxmlformats.org/drawingml/2006/main" xmlns:r="http://schemas.openxmlformats.org/officeDocument/2006/relationships" xmlns:p="http://schemas.openxmlformats.org/presentationml/2006/main" xmlns:p14="http://schemas.microsoft.com/office/powerpoint/2010/main" xmlns:mv="urn:schemas-microsoft-com:mac:vml" xmlns:mc="http://schemas.openxmlformats.org/markup-compatibility/2006" val="2917449314"/>
+        <p14:creationId xmlns:mc="http://schemas.openxmlformats.org/markup-compatibility/2006" xmlns:mv="urn:schemas-microsoft-com:mac:vml" xmlns:p14="http://schemas.microsoft.com/office/powerpoint/2010/main" xmlns:p="http://schemas.openxmlformats.org/presentationml/2006/main" xmlns:r="http://schemas.openxmlformats.org/officeDocument/2006/relationships" xmlns:a="http://schemas.openxmlformats.org/drawingml/2006/main" xmlns="" val="2917449314"/>
       </p:ext>
     </p:extLst>
   </p:cSld>
@@ -11251,7 +11239,7 @@
     </p:spTree>
     <p:extLst>
       <p:ext uri="{BB962C8B-B14F-4D97-AF65-F5344CB8AC3E}">
-        <p14:creationId xmlns="" xmlns:a="http://schemas.openxmlformats.org/drawingml/2006/main" xmlns:r="http://schemas.openxmlformats.org/officeDocument/2006/relationships" xmlns:p="http://schemas.openxmlformats.org/presentationml/2006/main" xmlns:p14="http://schemas.microsoft.com/office/powerpoint/2010/main" xmlns:mv="urn:schemas-microsoft-com:mac:vml" xmlns:mc="http://schemas.openxmlformats.org/markup-compatibility/2006" val="155552780"/>
+        <p14:creationId xmlns:mc="http://schemas.openxmlformats.org/markup-compatibility/2006" xmlns:mv="urn:schemas-microsoft-com:mac:vml" xmlns:p14="http://schemas.microsoft.com/office/powerpoint/2010/main" xmlns:p="http://schemas.openxmlformats.org/presentationml/2006/main" xmlns:r="http://schemas.openxmlformats.org/officeDocument/2006/relationships" xmlns:a="http://schemas.openxmlformats.org/drawingml/2006/main" xmlns="" val="155552780"/>
       </p:ext>
     </p:extLst>
   </p:cSld>
@@ -12494,7 +12482,7 @@
     </p:spTree>
     <p:extLst>
       <p:ext uri="{BB962C8B-B14F-4D97-AF65-F5344CB8AC3E}">
-        <p14:creationId xmlns="" xmlns:a="http://schemas.openxmlformats.org/drawingml/2006/main" xmlns:r="http://schemas.openxmlformats.org/officeDocument/2006/relationships" xmlns:p="http://schemas.openxmlformats.org/presentationml/2006/main" xmlns:p14="http://schemas.microsoft.com/office/powerpoint/2010/main" xmlns:mv="urn:schemas-microsoft-com:mac:vml" xmlns:mc="http://schemas.openxmlformats.org/markup-compatibility/2006" val="336287415"/>
+        <p14:creationId xmlns:mc="http://schemas.openxmlformats.org/markup-compatibility/2006" xmlns:mv="urn:schemas-microsoft-com:mac:vml" xmlns:p14="http://schemas.microsoft.com/office/powerpoint/2010/main" xmlns:p="http://schemas.openxmlformats.org/presentationml/2006/main" xmlns:r="http://schemas.openxmlformats.org/officeDocument/2006/relationships" xmlns:a="http://schemas.openxmlformats.org/drawingml/2006/main" xmlns="" val="336287415"/>
       </p:ext>
     </p:extLst>
   </p:cSld>
@@ -12943,7 +12931,7 @@
     </p:spTree>
     <p:extLst>
       <p:ext uri="{BB962C8B-B14F-4D97-AF65-F5344CB8AC3E}">
-        <p14:creationId xmlns="" xmlns:a="http://schemas.openxmlformats.org/drawingml/2006/main" xmlns:r="http://schemas.openxmlformats.org/officeDocument/2006/relationships" xmlns:p="http://schemas.openxmlformats.org/presentationml/2006/main" xmlns:p14="http://schemas.microsoft.com/office/powerpoint/2010/main" xmlns:mv="urn:schemas-microsoft-com:mac:vml" xmlns:mc="http://schemas.openxmlformats.org/markup-compatibility/2006" val="1975635498"/>
+        <p14:creationId xmlns:mc="http://schemas.openxmlformats.org/markup-compatibility/2006" xmlns:mv="urn:schemas-microsoft-com:mac:vml" xmlns:p14="http://schemas.microsoft.com/office/powerpoint/2010/main" xmlns:p="http://schemas.openxmlformats.org/presentationml/2006/main" xmlns:r="http://schemas.openxmlformats.org/officeDocument/2006/relationships" xmlns:a="http://schemas.openxmlformats.org/drawingml/2006/main" xmlns="" val="1975635498"/>
       </p:ext>
     </p:extLst>
   </p:cSld>
@@ -13009,7 +12997,7 @@
           <p:nvPr>
             <p:extLst>
               <p:ext uri="{D42A27DB-BD31-4B8C-83A1-F6EECF244321}">
-                <p14:modId xmlns="" xmlns:a="http://schemas.openxmlformats.org/drawingml/2006/main" xmlns:r="http://schemas.openxmlformats.org/officeDocument/2006/relationships" xmlns:p="http://schemas.openxmlformats.org/presentationml/2006/main" xmlns:p14="http://schemas.microsoft.com/office/powerpoint/2010/main" xmlns:mv="urn:schemas-microsoft-com:mac:vml" xmlns:mc="http://schemas.openxmlformats.org/markup-compatibility/2006" val="465859062"/>
+                <p14:modId xmlns:mc="http://schemas.openxmlformats.org/markup-compatibility/2006" xmlns:mv="urn:schemas-microsoft-com:mac:vml" xmlns:p14="http://schemas.microsoft.com/office/powerpoint/2010/main" xmlns:p="http://schemas.openxmlformats.org/presentationml/2006/main" xmlns:r="http://schemas.openxmlformats.org/officeDocument/2006/relationships" xmlns:a="http://schemas.openxmlformats.org/drawingml/2006/main" xmlns="" val="465859062"/>
               </p:ext>
             </p:extLst>
           </p:nvPr>
@@ -13693,7 +13681,7 @@
     </p:spTree>
     <p:extLst>
       <p:ext uri="{BB962C8B-B14F-4D97-AF65-F5344CB8AC3E}">
-        <p14:creationId xmlns:mc="http://schemas.openxmlformats.org/markup-compatibility/2006" xmlns:mv="urn:schemas-microsoft-com:mac:vml" xmlns:p14="http://schemas.microsoft.com/office/powerpoint/2010/main" xmlns:p="http://schemas.openxmlformats.org/presentationml/2006/main" xmlns:r="http://schemas.openxmlformats.org/officeDocument/2006/relationships" xmlns:a="http://schemas.openxmlformats.org/drawingml/2006/main" xmlns="" val="1535462898"/>
+        <p14:creationId xmlns="" xmlns:a="http://schemas.openxmlformats.org/drawingml/2006/main" xmlns:r="http://schemas.openxmlformats.org/officeDocument/2006/relationships" xmlns:p="http://schemas.openxmlformats.org/presentationml/2006/main" xmlns:p14="http://schemas.microsoft.com/office/powerpoint/2010/main" xmlns:mv="urn:schemas-microsoft-com:mac:vml" xmlns:mc="http://schemas.openxmlformats.org/markup-compatibility/2006" val="1535462898"/>
       </p:ext>
     </p:extLst>
   </p:cSld>
@@ -19349,7 +19337,7 @@
           <a:blip r:embed="rId2">
             <a:extLst>
               <a:ext uri="{28A0092B-C50C-407E-A947-70E740481C1C}">
-                <a14:useLocalDpi xmlns="" xmlns:a="http://schemas.openxmlformats.org/drawingml/2006/main" xmlns:r="http://schemas.openxmlformats.org/officeDocument/2006/relationships" xmlns:p="http://schemas.openxmlformats.org/presentationml/2006/main" xmlns:a14="http://schemas.microsoft.com/office/drawing/2010/main" xmlns:mv="urn:schemas-microsoft-com:mac:vml" xmlns:mc="http://schemas.openxmlformats.org/markup-compatibility/2006" val="0"/>
+                <a14:useLocalDpi xmlns:mc="http://schemas.openxmlformats.org/markup-compatibility/2006" xmlns:mv="urn:schemas-microsoft-com:mac:vml" xmlns:a14="http://schemas.microsoft.com/office/drawing/2010/main" xmlns:p="http://schemas.openxmlformats.org/presentationml/2006/main" xmlns:r="http://schemas.openxmlformats.org/officeDocument/2006/relationships" xmlns:a="http://schemas.openxmlformats.org/drawingml/2006/main" xmlns="" val="0"/>
               </a:ext>
             </a:extLst>
           </a:blip>
@@ -19430,7 +19418,7 @@
     </p:spTree>
     <p:extLst>
       <p:ext uri="{BB962C8B-B14F-4D97-AF65-F5344CB8AC3E}">
-        <p14:creationId xmlns="" xmlns:a="http://schemas.openxmlformats.org/drawingml/2006/main" xmlns:r="http://schemas.openxmlformats.org/officeDocument/2006/relationships" xmlns:p="http://schemas.openxmlformats.org/presentationml/2006/main" xmlns:p14="http://schemas.microsoft.com/office/powerpoint/2010/main" xmlns:mv="urn:schemas-microsoft-com:mac:vml" xmlns:mc="http://schemas.openxmlformats.org/markup-compatibility/2006" val="2317773805"/>
+        <p14:creationId xmlns:mc="http://schemas.openxmlformats.org/markup-compatibility/2006" xmlns:mv="urn:schemas-microsoft-com:mac:vml" xmlns:p14="http://schemas.microsoft.com/office/powerpoint/2010/main" xmlns:p="http://schemas.openxmlformats.org/presentationml/2006/main" xmlns:r="http://schemas.openxmlformats.org/officeDocument/2006/relationships" xmlns:a="http://schemas.openxmlformats.org/drawingml/2006/main" xmlns="" val="2317773805"/>
       </p:ext>
     </p:extLst>
   </p:cSld>
@@ -21365,7 +21353,7 @@
     </p:spTree>
     <p:extLst>
       <p:ext uri="{BB962C8B-B14F-4D97-AF65-F5344CB8AC3E}">
-        <p14:creationId xmlns:mc="http://schemas.openxmlformats.org/markup-compatibility/2006" xmlns:mv="urn:schemas-microsoft-com:mac:vml" xmlns:p14="http://schemas.microsoft.com/office/powerpoint/2010/main" xmlns:p="http://schemas.openxmlformats.org/presentationml/2006/main" xmlns:r="http://schemas.openxmlformats.org/officeDocument/2006/relationships" xmlns:a="http://schemas.openxmlformats.org/drawingml/2006/main" xmlns="" val="3914231263"/>
+        <p14:creationId xmlns="" xmlns:a="http://schemas.openxmlformats.org/drawingml/2006/main" xmlns:r="http://schemas.openxmlformats.org/officeDocument/2006/relationships" xmlns:p="http://schemas.openxmlformats.org/presentationml/2006/main" xmlns:p14="http://schemas.microsoft.com/office/powerpoint/2010/main" xmlns:mv="urn:schemas-microsoft-com:mac:vml" xmlns:mc="http://schemas.openxmlformats.org/markup-compatibility/2006" val="3914231263"/>
       </p:ext>
     </p:extLst>
   </p:cSld>
@@ -21641,7 +21629,7 @@
     </p:spTree>
     <p:extLst>
       <p:ext uri="{BB962C8B-B14F-4D97-AF65-F5344CB8AC3E}">
-        <p14:creationId xmlns:mc="http://schemas.openxmlformats.org/markup-compatibility/2006" xmlns:mv="urn:schemas-microsoft-com:mac:vml" xmlns:p14="http://schemas.microsoft.com/office/powerpoint/2010/main" xmlns:p="http://schemas.openxmlformats.org/presentationml/2006/main" xmlns:r="http://schemas.openxmlformats.org/officeDocument/2006/relationships" xmlns:a="http://schemas.openxmlformats.org/drawingml/2006/main" xmlns="" val="58810801"/>
+        <p14:creationId xmlns="" xmlns:a="http://schemas.openxmlformats.org/drawingml/2006/main" xmlns:r="http://schemas.openxmlformats.org/officeDocument/2006/relationships" xmlns:p="http://schemas.openxmlformats.org/presentationml/2006/main" xmlns:p14="http://schemas.microsoft.com/office/powerpoint/2010/main" xmlns:mv="urn:schemas-microsoft-com:mac:vml" xmlns:mc="http://schemas.openxmlformats.org/markup-compatibility/2006" val="58810801"/>
       </p:ext>
     </p:extLst>
   </p:cSld>
@@ -23902,7 +23890,7 @@
     </p:spTree>
     <p:extLst>
       <p:ext uri="{BB962C8B-B14F-4D97-AF65-F5344CB8AC3E}">
-        <p14:creationId xmlns:mc="http://schemas.openxmlformats.org/markup-compatibility/2006" xmlns:mv="urn:schemas-microsoft-com:mac:vml" xmlns:p14="http://schemas.microsoft.com/office/powerpoint/2010/main" xmlns:p="http://schemas.openxmlformats.org/presentationml/2006/main" xmlns:r="http://schemas.openxmlformats.org/officeDocument/2006/relationships" xmlns:a="http://schemas.openxmlformats.org/drawingml/2006/main" xmlns="" val="131646654"/>
+        <p14:creationId xmlns="" xmlns:a="http://schemas.openxmlformats.org/drawingml/2006/main" xmlns:r="http://schemas.openxmlformats.org/officeDocument/2006/relationships" xmlns:p="http://schemas.openxmlformats.org/presentationml/2006/main" xmlns:p14="http://schemas.microsoft.com/office/powerpoint/2010/main" xmlns:mv="urn:schemas-microsoft-com:mac:vml" xmlns:mc="http://schemas.openxmlformats.org/markup-compatibility/2006" val="131646654"/>
       </p:ext>
     </p:extLst>
   </p:cSld>
@@ -25238,7 +25226,7 @@
     </p:spTree>
     <p:extLst>
       <p:ext uri="{BB962C8B-B14F-4D97-AF65-F5344CB8AC3E}">
-        <p14:creationId xmlns="" xmlns:a="http://schemas.openxmlformats.org/drawingml/2006/main" xmlns:r="http://schemas.openxmlformats.org/officeDocument/2006/relationships" xmlns:p="http://schemas.openxmlformats.org/presentationml/2006/main" xmlns:p14="http://schemas.microsoft.com/office/powerpoint/2010/main" xmlns:mv="urn:schemas-microsoft-com:mac:vml" xmlns:mc="http://schemas.openxmlformats.org/markup-compatibility/2006" val="585510965"/>
+        <p14:creationId xmlns:mc="http://schemas.openxmlformats.org/markup-compatibility/2006" xmlns:mv="urn:schemas-microsoft-com:mac:vml" xmlns:p14="http://schemas.microsoft.com/office/powerpoint/2010/main" xmlns:p="http://schemas.openxmlformats.org/presentationml/2006/main" xmlns:r="http://schemas.openxmlformats.org/officeDocument/2006/relationships" xmlns:a="http://schemas.openxmlformats.org/drawingml/2006/main" xmlns="" val="585510965"/>
       </p:ext>
     </p:extLst>
   </p:cSld>
@@ -25304,7 +25292,7 @@
           <p:nvPr>
             <p:extLst>
               <p:ext uri="{D42A27DB-BD31-4B8C-83A1-F6EECF244321}">
-                <p14:modId xmlns="" xmlns:a="http://schemas.openxmlformats.org/drawingml/2006/main" xmlns:r="http://schemas.openxmlformats.org/officeDocument/2006/relationships" xmlns:p="http://schemas.openxmlformats.org/presentationml/2006/main" xmlns:p14="http://schemas.microsoft.com/office/powerpoint/2010/main" xmlns:mv="urn:schemas-microsoft-com:mac:vml" xmlns:mc="http://schemas.openxmlformats.org/markup-compatibility/2006" val="465859062"/>
+                <p14:modId xmlns:mc="http://schemas.openxmlformats.org/markup-compatibility/2006" xmlns:mv="urn:schemas-microsoft-com:mac:vml" xmlns:p14="http://schemas.microsoft.com/office/powerpoint/2010/main" xmlns:p="http://schemas.openxmlformats.org/presentationml/2006/main" xmlns:r="http://schemas.openxmlformats.org/officeDocument/2006/relationships" xmlns:a="http://schemas.openxmlformats.org/drawingml/2006/main" xmlns="" val="465859062"/>
               </p:ext>
             </p:extLst>
           </p:nvPr>
@@ -27667,7 +27655,7 @@
             <p:ph idx="1"/>
             <p:extLst>
               <p:ext uri="{D42A27DB-BD31-4B8C-83A1-F6EECF244321}">
-                <p14:modId xmlns="" xmlns:a="http://schemas.openxmlformats.org/drawingml/2006/main" xmlns:r="http://schemas.openxmlformats.org/officeDocument/2006/relationships" xmlns:p="http://schemas.openxmlformats.org/presentationml/2006/main" xmlns:p14="http://schemas.microsoft.com/office/powerpoint/2010/main" xmlns:mv="urn:schemas-microsoft-com:mac:vml" xmlns:mc="http://schemas.openxmlformats.org/markup-compatibility/2006" val="465859062"/>
+                <p14:modId xmlns:mc="http://schemas.openxmlformats.org/markup-compatibility/2006" xmlns:mv="urn:schemas-microsoft-com:mac:vml" xmlns:p14="http://schemas.microsoft.com/office/powerpoint/2010/main" xmlns:p="http://schemas.openxmlformats.org/presentationml/2006/main" xmlns:r="http://schemas.openxmlformats.org/officeDocument/2006/relationships" xmlns:a="http://schemas.openxmlformats.org/drawingml/2006/main" xmlns="" val="465859062"/>
               </p:ext>
             </p:extLst>
           </p:nvPr>
@@ -29912,7 +29900,7 @@
     </p:spTree>
     <p:extLst>
       <p:ext uri="{BB962C8B-B14F-4D97-AF65-F5344CB8AC3E}">
-        <p14:creationId xmlns="" xmlns:a="http://schemas.openxmlformats.org/drawingml/2006/main" xmlns:r="http://schemas.openxmlformats.org/officeDocument/2006/relationships" xmlns:p="http://schemas.openxmlformats.org/presentationml/2006/main" xmlns:p14="http://schemas.microsoft.com/office/powerpoint/2010/main" xmlns:mv="urn:schemas-microsoft-com:mac:vml" xmlns:mc="http://schemas.openxmlformats.org/markup-compatibility/2006" val="1394716155"/>
+        <p14:creationId xmlns:mc="http://schemas.openxmlformats.org/markup-compatibility/2006" xmlns:mv="urn:schemas-microsoft-com:mac:vml" xmlns:p14="http://schemas.microsoft.com/office/powerpoint/2010/main" xmlns:p="http://schemas.openxmlformats.org/presentationml/2006/main" xmlns:r="http://schemas.openxmlformats.org/officeDocument/2006/relationships" xmlns:a="http://schemas.openxmlformats.org/drawingml/2006/main" xmlns="" val="1394716155"/>
       </p:ext>
     </p:extLst>
   </p:cSld>
@@ -31627,7 +31615,7 @@
     </p:spTree>
     <p:extLst>
       <p:ext uri="{BB962C8B-B14F-4D97-AF65-F5344CB8AC3E}">
-        <p14:creationId xmlns="" xmlns:a="http://schemas.openxmlformats.org/drawingml/2006/main" xmlns:r="http://schemas.openxmlformats.org/officeDocument/2006/relationships" xmlns:p="http://schemas.openxmlformats.org/presentationml/2006/main" xmlns:p14="http://schemas.microsoft.com/office/powerpoint/2010/main" xmlns:mv="urn:schemas-microsoft-com:mac:vml" xmlns:mc="http://schemas.openxmlformats.org/markup-compatibility/2006" val="3825052853"/>
+        <p14:creationId xmlns:mc="http://schemas.openxmlformats.org/markup-compatibility/2006" xmlns:mv="urn:schemas-microsoft-com:mac:vml" xmlns:p14="http://schemas.microsoft.com/office/powerpoint/2010/main" xmlns:p="http://schemas.openxmlformats.org/presentationml/2006/main" xmlns:r="http://schemas.openxmlformats.org/officeDocument/2006/relationships" xmlns:a="http://schemas.openxmlformats.org/drawingml/2006/main" xmlns="" val="3825052853"/>
       </p:ext>
     </p:extLst>
   </p:cSld>

</xml_diff>